<commit_message>
Update parts list, add cap to schematic
</commit_message>
<xml_diff>
--- a/images.pptx
+++ b/images.pptx
@@ -105,6 +105,11 @@
       </a:defRPr>
     </a:lvl9pPr>
   </p:defaultTextStyle>
+  <p:extLst>
+    <p:ext uri="{EFAFB233-063F-42B5-8137-9DF3F51BA10A}">
+      <p15:sldGuideLst xmlns:p15="http://schemas.microsoft.com/office/powerpoint/2012/main"/>
+    </p:ext>
+  </p:extLst>
 </p:presentation>
 </file>
 
@@ -153,7 +158,6 @@
               <a:rPr lang="en-US"/>
               <a:t>Click to edit Master title style</a:t>
             </a:r>
-            <a:endParaRPr lang="en-US"/>
           </a:p>
         </p:txBody>
       </p:sp>
@@ -218,7 +222,6 @@
               <a:rPr lang="en-US"/>
               <a:t>Click to edit Master subtitle style</a:t>
             </a:r>
-            <a:endParaRPr lang="en-US"/>
           </a:p>
         </p:txBody>
       </p:sp>
@@ -239,7 +242,7 @@
           <a:p>
             <a:fld id="{56032651-1328-4865-BAD1-4C12A4D92860}" type="datetimeFigureOut">
               <a:rPr lang="en-US" smtClean="0"/>
-              <a:t>3/30/2017</a:t>
+              <a:t>4/18/2017</a:t>
             </a:fld>
             <a:endParaRPr lang="en-US"/>
           </a:p>
@@ -336,7 +339,6 @@
               <a:rPr lang="en-US"/>
               <a:t>Click to edit Master title style</a:t>
             </a:r>
-            <a:endParaRPr lang="en-US"/>
           </a:p>
         </p:txBody>
       </p:sp>
@@ -388,7 +390,6 @@
               <a:rPr lang="en-US"/>
               <a:t>Fifth level</a:t>
             </a:r>
-            <a:endParaRPr lang="en-US"/>
           </a:p>
         </p:txBody>
       </p:sp>
@@ -409,7 +410,7 @@
           <a:p>
             <a:fld id="{56032651-1328-4865-BAD1-4C12A4D92860}" type="datetimeFigureOut">
               <a:rPr lang="en-US" smtClean="0"/>
-              <a:t>3/30/2017</a:t>
+              <a:t>4/18/2017</a:t>
             </a:fld>
             <a:endParaRPr lang="en-US"/>
           </a:p>
@@ -511,7 +512,6 @@
               <a:rPr lang="en-US"/>
               <a:t>Click to edit Master title style</a:t>
             </a:r>
-            <a:endParaRPr lang="en-US"/>
           </a:p>
         </p:txBody>
       </p:sp>
@@ -568,7 +568,6 @@
               <a:rPr lang="en-US"/>
               <a:t>Fifth level</a:t>
             </a:r>
-            <a:endParaRPr lang="en-US"/>
           </a:p>
         </p:txBody>
       </p:sp>
@@ -589,7 +588,7 @@
           <a:p>
             <a:fld id="{56032651-1328-4865-BAD1-4C12A4D92860}" type="datetimeFigureOut">
               <a:rPr lang="en-US" smtClean="0"/>
-              <a:t>3/30/2017</a:t>
+              <a:t>4/18/2017</a:t>
             </a:fld>
             <a:endParaRPr lang="en-US"/>
           </a:p>
@@ -686,7 +685,6 @@
               <a:rPr lang="en-US"/>
               <a:t>Click to edit Master title style</a:t>
             </a:r>
-            <a:endParaRPr lang="en-US"/>
           </a:p>
         </p:txBody>
       </p:sp>
@@ -738,7 +736,6 @@
               <a:rPr lang="en-US"/>
               <a:t>Fifth level</a:t>
             </a:r>
-            <a:endParaRPr lang="en-US"/>
           </a:p>
         </p:txBody>
       </p:sp>
@@ -759,7 +756,7 @@
           <a:p>
             <a:fld id="{56032651-1328-4865-BAD1-4C12A4D92860}" type="datetimeFigureOut">
               <a:rPr lang="en-US" smtClean="0"/>
-              <a:t>3/30/2017</a:t>
+              <a:t>4/18/2017</a:t>
             </a:fld>
             <a:endParaRPr lang="en-US"/>
           </a:p>
@@ -865,7 +862,6 @@
               <a:rPr lang="en-US"/>
               <a:t>Click to edit Master title style</a:t>
             </a:r>
-            <a:endParaRPr lang="en-US"/>
           </a:p>
         </p:txBody>
       </p:sp>
@@ -1005,7 +1001,7 @@
           <a:p>
             <a:fld id="{56032651-1328-4865-BAD1-4C12A4D92860}" type="datetimeFigureOut">
               <a:rPr lang="en-US" smtClean="0"/>
-              <a:t>3/30/2017</a:t>
+              <a:t>4/18/2017</a:t>
             </a:fld>
             <a:endParaRPr lang="en-US"/>
           </a:p>
@@ -1102,7 +1098,6 @@
               <a:rPr lang="en-US"/>
               <a:t>Click to edit Master title style</a:t>
             </a:r>
-            <a:endParaRPr lang="en-US"/>
           </a:p>
         </p:txBody>
       </p:sp>
@@ -1159,7 +1154,6 @@
               <a:rPr lang="en-US"/>
               <a:t>Fifth level</a:t>
             </a:r>
-            <a:endParaRPr lang="en-US"/>
           </a:p>
         </p:txBody>
       </p:sp>
@@ -1216,7 +1210,6 @@
               <a:rPr lang="en-US"/>
               <a:t>Fifth level</a:t>
             </a:r>
-            <a:endParaRPr lang="en-US"/>
           </a:p>
         </p:txBody>
       </p:sp>
@@ -1237,7 +1230,7 @@
           <a:p>
             <a:fld id="{56032651-1328-4865-BAD1-4C12A4D92860}" type="datetimeFigureOut">
               <a:rPr lang="en-US" smtClean="0"/>
-              <a:t>3/30/2017</a:t>
+              <a:t>4/18/2017</a:t>
             </a:fld>
             <a:endParaRPr lang="en-US"/>
           </a:p>
@@ -1339,7 +1332,6 @@
               <a:rPr lang="en-US"/>
               <a:t>Click to edit Master title style</a:t>
             </a:r>
-            <a:endParaRPr lang="en-US"/>
           </a:p>
         </p:txBody>
       </p:sp>
@@ -1461,7 +1453,6 @@
               <a:rPr lang="en-US"/>
               <a:t>Fifth level</a:t>
             </a:r>
-            <a:endParaRPr lang="en-US"/>
           </a:p>
         </p:txBody>
       </p:sp>
@@ -1583,7 +1574,6 @@
               <a:rPr lang="en-US"/>
               <a:t>Fifth level</a:t>
             </a:r>
-            <a:endParaRPr lang="en-US"/>
           </a:p>
         </p:txBody>
       </p:sp>
@@ -1604,7 +1594,7 @@
           <a:p>
             <a:fld id="{56032651-1328-4865-BAD1-4C12A4D92860}" type="datetimeFigureOut">
               <a:rPr lang="en-US" smtClean="0"/>
-              <a:t>3/30/2017</a:t>
+              <a:t>4/18/2017</a:t>
             </a:fld>
             <a:endParaRPr lang="en-US"/>
           </a:p>
@@ -1701,7 +1691,6 @@
               <a:rPr lang="en-US"/>
               <a:t>Click to edit Master title style</a:t>
             </a:r>
-            <a:endParaRPr lang="en-US"/>
           </a:p>
         </p:txBody>
       </p:sp>
@@ -1722,7 +1711,7 @@
           <a:p>
             <a:fld id="{56032651-1328-4865-BAD1-4C12A4D92860}" type="datetimeFigureOut">
               <a:rPr lang="en-US" smtClean="0"/>
-              <a:t>3/30/2017</a:t>
+              <a:t>4/18/2017</a:t>
             </a:fld>
             <a:endParaRPr lang="en-US"/>
           </a:p>
@@ -1817,7 +1806,7 @@
           <a:p>
             <a:fld id="{56032651-1328-4865-BAD1-4C12A4D92860}" type="datetimeFigureOut">
               <a:rPr lang="en-US" smtClean="0"/>
-              <a:t>3/30/2017</a:t>
+              <a:t>4/18/2017</a:t>
             </a:fld>
             <a:endParaRPr lang="en-US"/>
           </a:p>
@@ -1923,7 +1912,6 @@
               <a:rPr lang="en-US"/>
               <a:t>Click to edit Master title style</a:t>
             </a:r>
-            <a:endParaRPr lang="en-US"/>
           </a:p>
         </p:txBody>
       </p:sp>
@@ -2008,7 +1996,6 @@
               <a:rPr lang="en-US"/>
               <a:t>Fifth level</a:t>
             </a:r>
-            <a:endParaRPr lang="en-US"/>
           </a:p>
         </p:txBody>
       </p:sp>
@@ -2094,7 +2081,7 @@
           <a:p>
             <a:fld id="{56032651-1328-4865-BAD1-4C12A4D92860}" type="datetimeFigureOut">
               <a:rPr lang="en-US" smtClean="0"/>
-              <a:t>3/30/2017</a:t>
+              <a:t>4/18/2017</a:t>
             </a:fld>
             <a:endParaRPr lang="en-US"/>
           </a:p>
@@ -2200,7 +2187,6 @@
               <a:rPr lang="en-US"/>
               <a:t>Click to edit Master title style</a:t>
             </a:r>
-            <a:endParaRPr lang="en-US"/>
           </a:p>
         </p:txBody>
       </p:sp>
@@ -2347,7 +2333,7 @@
           <a:p>
             <a:fld id="{56032651-1328-4865-BAD1-4C12A4D92860}" type="datetimeFigureOut">
               <a:rPr lang="en-US" smtClean="0"/>
-              <a:t>3/30/2017</a:t>
+              <a:t>4/18/2017</a:t>
             </a:fld>
             <a:endParaRPr lang="en-US"/>
           </a:p>
@@ -2459,7 +2445,6 @@
               <a:rPr lang="en-US"/>
               <a:t>Click to edit Master title style</a:t>
             </a:r>
-            <a:endParaRPr lang="en-US"/>
           </a:p>
         </p:txBody>
       </p:sp>
@@ -2521,7 +2506,6 @@
               <a:rPr lang="en-US"/>
               <a:t>Fifth level</a:t>
             </a:r>
-            <a:endParaRPr lang="en-US"/>
           </a:p>
         </p:txBody>
       </p:sp>
@@ -2560,7 +2544,7 @@
           <a:p>
             <a:fld id="{56032651-1328-4865-BAD1-4C12A4D92860}" type="datetimeFigureOut">
               <a:rPr lang="en-US" smtClean="0"/>
-              <a:t>3/30/2017</a:t>
+              <a:t>4/18/2017</a:t>
             </a:fld>
             <a:endParaRPr lang="en-US"/>
           </a:p>
@@ -3214,10 +3198,6 @@
               </a:rPr>
               <a:t>14 - UART (TX)</a:t>
             </a:r>
-            <a:endParaRPr lang="en-US" b="1" dirty="0">
-              <a:latin typeface="Courier New" panose="02070309020205020404" pitchFamily="49" charset="0"/>
-              <a:cs typeface="Courier New" panose="02070309020205020404" pitchFamily="49" charset="0"/>
-            </a:endParaRPr>
           </a:p>
           <a:p>
             <a:r>
@@ -3252,59 +3232,26 @@
                 <a:latin typeface="Courier New" panose="02070309020205020404" pitchFamily="49" charset="0"/>
                 <a:cs typeface="Courier New" panose="02070309020205020404" pitchFamily="49" charset="0"/>
               </a:rPr>
-              <a:t>18 - </a:t>
-            </a:r>
-            <a:r>
-              <a:rPr lang="en-US" b="1" dirty="0">
-                <a:latin typeface="Courier New" panose="02070309020205020404" pitchFamily="49" charset="0"/>
-                <a:cs typeface="Courier New" panose="02070309020205020404" pitchFamily="49" charset="0"/>
-              </a:rPr>
-              <a:t>BUTTON 3</a:t>
-            </a:r>
-            <a:endParaRPr lang="en-US" b="1" dirty="0">
-              <a:latin typeface="Courier New" panose="02070309020205020404" pitchFamily="49" charset="0"/>
-              <a:cs typeface="Courier New" panose="02070309020205020404" pitchFamily="49" charset="0"/>
-            </a:endParaRPr>
-          </a:p>
-          <a:p>
-            <a:r>
-              <a:rPr lang="en-US" b="1" dirty="0">
-                <a:latin typeface="Courier New" panose="02070309020205020404" pitchFamily="49" charset="0"/>
-                <a:cs typeface="Courier New" panose="02070309020205020404" pitchFamily="49" charset="0"/>
-              </a:rPr>
-              <a:t>19 - </a:t>
-            </a:r>
-            <a:r>
-              <a:rPr lang="en-US" b="1" dirty="0">
-                <a:latin typeface="Courier New" panose="02070309020205020404" pitchFamily="49" charset="0"/>
-                <a:cs typeface="Courier New" panose="02070309020205020404" pitchFamily="49" charset="0"/>
-              </a:rPr>
-              <a:t>BUTTON 4</a:t>
-            </a:r>
-            <a:endParaRPr lang="en-US" b="1" dirty="0">
-              <a:latin typeface="Courier New" panose="02070309020205020404" pitchFamily="49" charset="0"/>
-              <a:cs typeface="Courier New" panose="02070309020205020404" pitchFamily="49" charset="0"/>
-            </a:endParaRPr>
-          </a:p>
-          <a:p>
-            <a:r>
-              <a:rPr lang="en-US" b="1" dirty="0">
-                <a:latin typeface="Courier New" panose="02070309020205020404" pitchFamily="49" charset="0"/>
-                <a:cs typeface="Courier New" panose="02070309020205020404" pitchFamily="49" charset="0"/>
-              </a:rPr>
-              <a:t>20 - </a:t>
-            </a:r>
-            <a:r>
-              <a:rPr lang="en-US" b="1" dirty="0">
-                <a:latin typeface="Courier New" panose="02070309020205020404" pitchFamily="49" charset="0"/>
-                <a:cs typeface="Courier New" panose="02070309020205020404" pitchFamily="49" charset="0"/>
-              </a:rPr>
-              <a:t>BUTTON 5</a:t>
-            </a:r>
-            <a:endParaRPr lang="en-US" b="1" dirty="0">
-              <a:latin typeface="Courier New" panose="02070309020205020404" pitchFamily="49" charset="0"/>
-              <a:cs typeface="Courier New" panose="02070309020205020404" pitchFamily="49" charset="0"/>
-            </a:endParaRPr>
+              <a:t>18 - BUTTON 3</a:t>
+            </a:r>
+          </a:p>
+          <a:p>
+            <a:r>
+              <a:rPr lang="en-US" b="1" dirty="0">
+                <a:latin typeface="Courier New" panose="02070309020205020404" pitchFamily="49" charset="0"/>
+                <a:cs typeface="Courier New" panose="02070309020205020404" pitchFamily="49" charset="0"/>
+              </a:rPr>
+              <a:t>19 - BUTTON 4</a:t>
+            </a:r>
+          </a:p>
+          <a:p>
+            <a:r>
+              <a:rPr lang="en-US" b="1" dirty="0">
+                <a:latin typeface="Courier New" panose="02070309020205020404" pitchFamily="49" charset="0"/>
+                <a:cs typeface="Courier New" panose="02070309020205020404" pitchFamily="49" charset="0"/>
+              </a:rPr>
+              <a:t>20 - BUTTON 5</a:t>
+            </a:r>
           </a:p>
           <a:p>
             <a:r>
@@ -3446,7 +3393,7 @@
                 <a:latin typeface="Courier New" panose="02070309020205020404" pitchFamily="49" charset="0"/>
                 <a:cs typeface="Courier New" panose="02070309020205020404" pitchFamily="49" charset="0"/>
               </a:rPr>
-              <a:t>C7-13:		0.1µF</a:t>
+              <a:t>C7-14:		0.1µF</a:t>
             </a:r>
           </a:p>
           <a:p>
@@ -3536,14 +3483,7 @@
                 <a:latin typeface="Courier New" panose="02070309020205020404" pitchFamily="49" charset="0"/>
                 <a:cs typeface="Courier New" panose="02070309020205020404" pitchFamily="49" charset="0"/>
               </a:rPr>
-              <a:t>R24, 28:		330</a:t>
-            </a:r>
-            <a:r>
-              <a:rPr lang="en-US" b="1" dirty="0">
-                <a:latin typeface="Courier New" panose="02070309020205020404" pitchFamily="49" charset="0"/>
-                <a:cs typeface="Courier New" panose="02070309020205020404" pitchFamily="49" charset="0"/>
-              </a:rPr>
-              <a:t>Ω</a:t>
+              <a:t>R24, 28:		330Ω</a:t>
             </a:r>
           </a:p>
         </p:txBody>

</xml_diff>

<commit_message>
Tweaks V1.5 Adjust all text labels and make them better BCM/PHYS pin numbers Flip 47K net
</commit_message>
<xml_diff>
--- a/images.pptx
+++ b/images.pptx
@@ -4,9 +4,13 @@
   <p:sldMasterIdLst>
     <p:sldMasterId id="2147483648" r:id="rId1"/>
   </p:sldMasterIdLst>
+  <p:notesMasterIdLst>
+    <p:notesMasterId r:id="rId5"/>
+  </p:notesMasterIdLst>
   <p:sldIdLst>
     <p:sldId id="256" r:id="rId2"/>
-    <p:sldId id="257" r:id="rId3"/>
+    <p:sldId id="258" r:id="rId3"/>
+    <p:sldId id="257" r:id="rId4"/>
   </p:sldIdLst>
   <p:sldSz cx="12192000" cy="6858000"/>
   <p:notesSz cx="6858000" cy="9144000"/>
@@ -113,6 +117,356 @@
 </p:presentation>
 </file>
 
+<file path=ppt/notesMasters/notesMaster1.xml><?xml version="1.0" encoding="utf-8"?>
+<p:notesMaster xmlns:a="http://schemas.openxmlformats.org/drawingml/2006/main" xmlns:r="http://schemas.openxmlformats.org/officeDocument/2006/relationships" xmlns:p="http://schemas.openxmlformats.org/presentationml/2006/main">
+  <p:cSld>
+    <p:bg>
+      <p:bgRef idx="1001">
+        <a:schemeClr val="bg1"/>
+      </p:bgRef>
+    </p:bg>
+    <p:spTree>
+      <p:nvGrpSpPr>
+        <p:cNvPr id="1" name=""/>
+        <p:cNvGrpSpPr/>
+        <p:nvPr/>
+      </p:nvGrpSpPr>
+      <p:grpSpPr>
+        <a:xfrm>
+          <a:off x="0" y="0"/>
+          <a:ext cx="0" cy="0"/>
+          <a:chOff x="0" y="0"/>
+          <a:chExt cx="0" cy="0"/>
+        </a:xfrm>
+      </p:grpSpPr>
+      <p:sp>
+        <p:nvSpPr>
+          <p:cNvPr id="2" name="Header Placeholder 1"/>
+          <p:cNvSpPr>
+            <a:spLocks noGrp="1"/>
+          </p:cNvSpPr>
+          <p:nvPr>
+            <p:ph type="hdr" sz="quarter"/>
+          </p:nvPr>
+        </p:nvSpPr>
+        <p:spPr>
+          <a:xfrm>
+            <a:off x="0" y="0"/>
+            <a:ext cx="2971800" cy="458788"/>
+          </a:xfrm>
+          <a:prstGeom prst="rect">
+            <a:avLst/>
+          </a:prstGeom>
+        </p:spPr>
+        <p:txBody>
+          <a:bodyPr vert="horz" lIns="91440" tIns="45720" rIns="91440" bIns="45720" rtlCol="0"/>
+          <a:lstStyle>
+            <a:lvl1pPr algn="l">
+              <a:defRPr sz="1200"/>
+            </a:lvl1pPr>
+          </a:lstStyle>
+          <a:p>
+            <a:endParaRPr lang="en-US"/>
+          </a:p>
+        </p:txBody>
+      </p:sp>
+      <p:sp>
+        <p:nvSpPr>
+          <p:cNvPr id="3" name="Date Placeholder 2"/>
+          <p:cNvSpPr>
+            <a:spLocks noGrp="1"/>
+          </p:cNvSpPr>
+          <p:nvPr>
+            <p:ph type="dt" idx="1"/>
+          </p:nvPr>
+        </p:nvSpPr>
+        <p:spPr>
+          <a:xfrm>
+            <a:off x="3884613" y="0"/>
+            <a:ext cx="2971800" cy="458788"/>
+          </a:xfrm>
+          <a:prstGeom prst="rect">
+            <a:avLst/>
+          </a:prstGeom>
+        </p:spPr>
+        <p:txBody>
+          <a:bodyPr vert="horz" lIns="91440" tIns="45720" rIns="91440" bIns="45720" rtlCol="0"/>
+          <a:lstStyle>
+            <a:lvl1pPr algn="r">
+              <a:defRPr sz="1200"/>
+            </a:lvl1pPr>
+          </a:lstStyle>
+          <a:p>
+            <a:fld id="{989E12F8-4E6E-9F47-809F-90362755178F}" type="datetimeFigureOut">
+              <a:rPr lang="en-US" smtClean="0"/>
+              <a:t>4/28/17</a:t>
+            </a:fld>
+            <a:endParaRPr lang="en-US"/>
+          </a:p>
+        </p:txBody>
+      </p:sp>
+      <p:sp>
+        <p:nvSpPr>
+          <p:cNvPr id="4" name="Slide Image Placeholder 3"/>
+          <p:cNvSpPr>
+            <a:spLocks noGrp="1" noRot="1" noChangeAspect="1"/>
+          </p:cNvSpPr>
+          <p:nvPr>
+            <p:ph type="sldImg" idx="2"/>
+          </p:nvPr>
+        </p:nvSpPr>
+        <p:spPr>
+          <a:xfrm>
+            <a:off x="685800" y="1143000"/>
+            <a:ext cx="5486400" cy="3086100"/>
+          </a:xfrm>
+          <a:prstGeom prst="rect">
+            <a:avLst/>
+          </a:prstGeom>
+          <a:noFill/>
+          <a:ln w="12700">
+            <a:solidFill>
+              <a:prstClr val="black"/>
+            </a:solidFill>
+          </a:ln>
+        </p:spPr>
+        <p:txBody>
+          <a:bodyPr vert="horz" lIns="91440" tIns="45720" rIns="91440" bIns="45720" rtlCol="0" anchor="ctr"/>
+          <a:lstStyle/>
+          <a:p>
+            <a:endParaRPr lang="en-US"/>
+          </a:p>
+        </p:txBody>
+      </p:sp>
+      <p:sp>
+        <p:nvSpPr>
+          <p:cNvPr id="5" name="Notes Placeholder 4"/>
+          <p:cNvSpPr>
+            <a:spLocks noGrp="1"/>
+          </p:cNvSpPr>
+          <p:nvPr>
+            <p:ph type="body" sz="quarter" idx="3"/>
+          </p:nvPr>
+        </p:nvSpPr>
+        <p:spPr>
+          <a:xfrm>
+            <a:off x="685800" y="4400550"/>
+            <a:ext cx="5486400" cy="3600450"/>
+          </a:xfrm>
+          <a:prstGeom prst="rect">
+            <a:avLst/>
+          </a:prstGeom>
+        </p:spPr>
+        <p:txBody>
+          <a:bodyPr vert="horz" lIns="91440" tIns="45720" rIns="91440" bIns="45720" rtlCol="0"/>
+          <a:lstStyle/>
+          <a:p>
+            <a:pPr lvl="0"/>
+            <a:r>
+              <a:rPr lang="en-US" smtClean="0"/>
+              <a:t>Click to edit Master text styles</a:t>
+            </a:r>
+          </a:p>
+          <a:p>
+            <a:pPr lvl="1"/>
+            <a:r>
+              <a:rPr lang="en-US" smtClean="0"/>
+              <a:t>Second level</a:t>
+            </a:r>
+          </a:p>
+          <a:p>
+            <a:pPr lvl="2"/>
+            <a:r>
+              <a:rPr lang="en-US" smtClean="0"/>
+              <a:t>Third level</a:t>
+            </a:r>
+          </a:p>
+          <a:p>
+            <a:pPr lvl="3"/>
+            <a:r>
+              <a:rPr lang="en-US" smtClean="0"/>
+              <a:t>Fourth level</a:t>
+            </a:r>
+          </a:p>
+          <a:p>
+            <a:pPr lvl="4"/>
+            <a:r>
+              <a:rPr lang="en-US" smtClean="0"/>
+              <a:t>Fifth level</a:t>
+            </a:r>
+            <a:endParaRPr lang="en-US"/>
+          </a:p>
+        </p:txBody>
+      </p:sp>
+      <p:sp>
+        <p:nvSpPr>
+          <p:cNvPr id="6" name="Footer Placeholder 5"/>
+          <p:cNvSpPr>
+            <a:spLocks noGrp="1"/>
+          </p:cNvSpPr>
+          <p:nvPr>
+            <p:ph type="ftr" sz="quarter" idx="4"/>
+          </p:nvPr>
+        </p:nvSpPr>
+        <p:spPr>
+          <a:xfrm>
+            <a:off x="0" y="8685213"/>
+            <a:ext cx="2971800" cy="458787"/>
+          </a:xfrm>
+          <a:prstGeom prst="rect">
+            <a:avLst/>
+          </a:prstGeom>
+        </p:spPr>
+        <p:txBody>
+          <a:bodyPr vert="horz" lIns="91440" tIns="45720" rIns="91440" bIns="45720" rtlCol="0" anchor="b"/>
+          <a:lstStyle>
+            <a:lvl1pPr algn="l">
+              <a:defRPr sz="1200"/>
+            </a:lvl1pPr>
+          </a:lstStyle>
+          <a:p>
+            <a:endParaRPr lang="en-US"/>
+          </a:p>
+        </p:txBody>
+      </p:sp>
+      <p:sp>
+        <p:nvSpPr>
+          <p:cNvPr id="7" name="Slide Number Placeholder 6"/>
+          <p:cNvSpPr>
+            <a:spLocks noGrp="1"/>
+          </p:cNvSpPr>
+          <p:nvPr>
+            <p:ph type="sldNum" sz="quarter" idx="5"/>
+          </p:nvPr>
+        </p:nvSpPr>
+        <p:spPr>
+          <a:xfrm>
+            <a:off x="3884613" y="8685213"/>
+            <a:ext cx="2971800" cy="458787"/>
+          </a:xfrm>
+          <a:prstGeom prst="rect">
+            <a:avLst/>
+          </a:prstGeom>
+        </p:spPr>
+        <p:txBody>
+          <a:bodyPr vert="horz" lIns="91440" tIns="45720" rIns="91440" bIns="45720" rtlCol="0" anchor="b"/>
+          <a:lstStyle>
+            <a:lvl1pPr algn="r">
+              <a:defRPr sz="1200"/>
+            </a:lvl1pPr>
+          </a:lstStyle>
+          <a:p>
+            <a:fld id="{3B4D3BAE-2B3C-634A-8BC8-D06DA07B0F0E}" type="slidenum">
+              <a:rPr lang="en-US" smtClean="0"/>
+              <a:t>‹#›</a:t>
+            </a:fld>
+            <a:endParaRPr lang="en-US"/>
+          </a:p>
+        </p:txBody>
+      </p:sp>
+    </p:spTree>
+    <p:extLst>
+      <p:ext uri="{BB962C8B-B14F-4D97-AF65-F5344CB8AC3E}">
+        <p14:creationId xmlns:p14="http://schemas.microsoft.com/office/powerpoint/2010/main" val="1066977765"/>
+      </p:ext>
+    </p:extLst>
+  </p:cSld>
+  <p:clrMap bg1="lt1" tx1="dk1" bg2="lt2" tx2="dk2" accent1="accent1" accent2="accent2" accent3="accent3" accent4="accent4" accent5="accent5" accent6="accent6" hlink="hlink" folHlink="folHlink"/>
+  <p:notesStyle>
+    <a:lvl1pPr marL="0" algn="l" defTabSz="914400" rtl="0" eaLnBrk="1" latinLnBrk="0" hangingPunct="1">
+      <a:defRPr sz="1200" kern="1200">
+        <a:solidFill>
+          <a:schemeClr val="tx1"/>
+        </a:solidFill>
+        <a:latin typeface="+mn-lt"/>
+        <a:ea typeface="+mn-ea"/>
+        <a:cs typeface="+mn-cs"/>
+      </a:defRPr>
+    </a:lvl1pPr>
+    <a:lvl2pPr marL="457200" algn="l" defTabSz="914400" rtl="0" eaLnBrk="1" latinLnBrk="0" hangingPunct="1">
+      <a:defRPr sz="1200" kern="1200">
+        <a:solidFill>
+          <a:schemeClr val="tx1"/>
+        </a:solidFill>
+        <a:latin typeface="+mn-lt"/>
+        <a:ea typeface="+mn-ea"/>
+        <a:cs typeface="+mn-cs"/>
+      </a:defRPr>
+    </a:lvl2pPr>
+    <a:lvl3pPr marL="914400" algn="l" defTabSz="914400" rtl="0" eaLnBrk="1" latinLnBrk="0" hangingPunct="1">
+      <a:defRPr sz="1200" kern="1200">
+        <a:solidFill>
+          <a:schemeClr val="tx1"/>
+        </a:solidFill>
+        <a:latin typeface="+mn-lt"/>
+        <a:ea typeface="+mn-ea"/>
+        <a:cs typeface="+mn-cs"/>
+      </a:defRPr>
+    </a:lvl3pPr>
+    <a:lvl4pPr marL="1371600" algn="l" defTabSz="914400" rtl="0" eaLnBrk="1" latinLnBrk="0" hangingPunct="1">
+      <a:defRPr sz="1200" kern="1200">
+        <a:solidFill>
+          <a:schemeClr val="tx1"/>
+        </a:solidFill>
+        <a:latin typeface="+mn-lt"/>
+        <a:ea typeface="+mn-ea"/>
+        <a:cs typeface="+mn-cs"/>
+      </a:defRPr>
+    </a:lvl4pPr>
+    <a:lvl5pPr marL="1828800" algn="l" defTabSz="914400" rtl="0" eaLnBrk="1" latinLnBrk="0" hangingPunct="1">
+      <a:defRPr sz="1200" kern="1200">
+        <a:solidFill>
+          <a:schemeClr val="tx1"/>
+        </a:solidFill>
+        <a:latin typeface="+mn-lt"/>
+        <a:ea typeface="+mn-ea"/>
+        <a:cs typeface="+mn-cs"/>
+      </a:defRPr>
+    </a:lvl5pPr>
+    <a:lvl6pPr marL="2286000" algn="l" defTabSz="914400" rtl="0" eaLnBrk="1" latinLnBrk="0" hangingPunct="1">
+      <a:defRPr sz="1200" kern="1200">
+        <a:solidFill>
+          <a:schemeClr val="tx1"/>
+        </a:solidFill>
+        <a:latin typeface="+mn-lt"/>
+        <a:ea typeface="+mn-ea"/>
+        <a:cs typeface="+mn-cs"/>
+      </a:defRPr>
+    </a:lvl6pPr>
+    <a:lvl7pPr marL="2743200" algn="l" defTabSz="914400" rtl="0" eaLnBrk="1" latinLnBrk="0" hangingPunct="1">
+      <a:defRPr sz="1200" kern="1200">
+        <a:solidFill>
+          <a:schemeClr val="tx1"/>
+        </a:solidFill>
+        <a:latin typeface="+mn-lt"/>
+        <a:ea typeface="+mn-ea"/>
+        <a:cs typeface="+mn-cs"/>
+      </a:defRPr>
+    </a:lvl7pPr>
+    <a:lvl8pPr marL="3200400" algn="l" defTabSz="914400" rtl="0" eaLnBrk="1" latinLnBrk="0" hangingPunct="1">
+      <a:defRPr sz="1200" kern="1200">
+        <a:solidFill>
+          <a:schemeClr val="tx1"/>
+        </a:solidFill>
+        <a:latin typeface="+mn-lt"/>
+        <a:ea typeface="+mn-ea"/>
+        <a:cs typeface="+mn-cs"/>
+      </a:defRPr>
+    </a:lvl8pPr>
+    <a:lvl9pPr marL="3657600" algn="l" defTabSz="914400" rtl="0" eaLnBrk="1" latinLnBrk="0" hangingPunct="1">
+      <a:defRPr sz="1200" kern="1200">
+        <a:solidFill>
+          <a:schemeClr val="tx1"/>
+        </a:solidFill>
+        <a:latin typeface="+mn-lt"/>
+        <a:ea typeface="+mn-ea"/>
+        <a:cs typeface="+mn-cs"/>
+      </a:defRPr>
+    </a:lvl9pPr>
+  </p:notesStyle>
+</p:notesMaster>
+</file>
+
 <file path=ppt/slideLayouts/slideLayout1.xml><?xml version="1.0" encoding="utf-8"?>
 <p:sldLayout xmlns:a="http://schemas.openxmlformats.org/drawingml/2006/main" xmlns:r="http://schemas.openxmlformats.org/officeDocument/2006/relationships" xmlns:p="http://schemas.openxmlformats.org/presentationml/2006/main" type="title" preserve="1">
   <p:cSld name="Title Slide">
@@ -242,7 +596,7 @@
           <a:p>
             <a:fld id="{56032651-1328-4865-BAD1-4C12A4D92860}" type="datetimeFigureOut">
               <a:rPr lang="en-US" smtClean="0"/>
-              <a:t>4/19/2017</a:t>
+              <a:t>4/28/17</a:t>
             </a:fld>
             <a:endParaRPr lang="en-US"/>
           </a:p>
@@ -410,7 +764,7 @@
           <a:p>
             <a:fld id="{56032651-1328-4865-BAD1-4C12A4D92860}" type="datetimeFigureOut">
               <a:rPr lang="en-US" smtClean="0"/>
-              <a:t>4/19/2017</a:t>
+              <a:t>4/28/17</a:t>
             </a:fld>
             <a:endParaRPr lang="en-US"/>
           </a:p>
@@ -588,7 +942,7 @@
           <a:p>
             <a:fld id="{56032651-1328-4865-BAD1-4C12A4D92860}" type="datetimeFigureOut">
               <a:rPr lang="en-US" smtClean="0"/>
-              <a:t>4/19/2017</a:t>
+              <a:t>4/28/17</a:t>
             </a:fld>
             <a:endParaRPr lang="en-US"/>
           </a:p>
@@ -756,7 +1110,7 @@
           <a:p>
             <a:fld id="{56032651-1328-4865-BAD1-4C12A4D92860}" type="datetimeFigureOut">
               <a:rPr lang="en-US" smtClean="0"/>
-              <a:t>4/19/2017</a:t>
+              <a:t>4/28/17</a:t>
             </a:fld>
             <a:endParaRPr lang="en-US"/>
           </a:p>
@@ -1001,7 +1355,7 @@
           <a:p>
             <a:fld id="{56032651-1328-4865-BAD1-4C12A4D92860}" type="datetimeFigureOut">
               <a:rPr lang="en-US" smtClean="0"/>
-              <a:t>4/19/2017</a:t>
+              <a:t>4/28/17</a:t>
             </a:fld>
             <a:endParaRPr lang="en-US"/>
           </a:p>
@@ -1230,7 +1584,7 @@
           <a:p>
             <a:fld id="{56032651-1328-4865-BAD1-4C12A4D92860}" type="datetimeFigureOut">
               <a:rPr lang="en-US" smtClean="0"/>
-              <a:t>4/19/2017</a:t>
+              <a:t>4/28/17</a:t>
             </a:fld>
             <a:endParaRPr lang="en-US"/>
           </a:p>
@@ -1594,7 +1948,7 @@
           <a:p>
             <a:fld id="{56032651-1328-4865-BAD1-4C12A4D92860}" type="datetimeFigureOut">
               <a:rPr lang="en-US" smtClean="0"/>
-              <a:t>4/19/2017</a:t>
+              <a:t>4/28/17</a:t>
             </a:fld>
             <a:endParaRPr lang="en-US"/>
           </a:p>
@@ -1711,7 +2065,7 @@
           <a:p>
             <a:fld id="{56032651-1328-4865-BAD1-4C12A4D92860}" type="datetimeFigureOut">
               <a:rPr lang="en-US" smtClean="0"/>
-              <a:t>4/19/2017</a:t>
+              <a:t>4/28/17</a:t>
             </a:fld>
             <a:endParaRPr lang="en-US"/>
           </a:p>
@@ -1806,7 +2160,7 @@
           <a:p>
             <a:fld id="{56032651-1328-4865-BAD1-4C12A4D92860}" type="datetimeFigureOut">
               <a:rPr lang="en-US" smtClean="0"/>
-              <a:t>4/19/2017</a:t>
+              <a:t>4/28/17</a:t>
             </a:fld>
             <a:endParaRPr lang="en-US"/>
           </a:p>
@@ -2081,7 +2435,7 @@
           <a:p>
             <a:fld id="{56032651-1328-4865-BAD1-4C12A4D92860}" type="datetimeFigureOut">
               <a:rPr lang="en-US" smtClean="0"/>
-              <a:t>4/19/2017</a:t>
+              <a:t>4/28/17</a:t>
             </a:fld>
             <a:endParaRPr lang="en-US"/>
           </a:p>
@@ -2333,7 +2687,7 @@
           <a:p>
             <a:fld id="{56032651-1328-4865-BAD1-4C12A4D92860}" type="datetimeFigureOut">
               <a:rPr lang="en-US" smtClean="0"/>
-              <a:t>4/19/2017</a:t>
+              <a:t>4/28/17</a:t>
             </a:fld>
             <a:endParaRPr lang="en-US"/>
           </a:p>
@@ -2544,7 +2898,7 @@
           <a:p>
             <a:fld id="{56032651-1328-4865-BAD1-4C12A4D92860}" type="datetimeFigureOut">
               <a:rPr lang="en-US" smtClean="0"/>
-              <a:t>4/19/2017</a:t>
+              <a:t>4/28/17</a:t>
             </a:fld>
             <a:endParaRPr lang="en-US"/>
           </a:p>
@@ -3348,16 +3702,102 @@
           <a:chExt cx="0" cy="0"/>
         </a:xfrm>
       </p:grpSpPr>
-      <p:sp>
-        <p:nvSpPr>
-          <p:cNvPr id="4" name="TextBox 3"/>
+      <p:grpSp>
+        <p:nvGrpSpPr>
+          <p:cNvPr id="2" name="Group 1"/>
+          <p:cNvGrpSpPr/>
+          <p:nvPr/>
+        </p:nvGrpSpPr>
+        <p:grpSpPr>
+          <a:xfrm>
+            <a:off x="5423458" y="2852211"/>
+            <a:ext cx="276999" cy="1850766"/>
+            <a:chOff x="5592793" y="2581275"/>
+            <a:chExt cx="276999" cy="1850766"/>
+          </a:xfrm>
+        </p:grpSpPr>
+        <p:cxnSp>
+          <p:nvCxnSpPr>
+            <p:cNvPr id="7" name="Straight Connector 6"/>
+            <p:cNvCxnSpPr>
+              <a:cxnSpLocks/>
+            </p:cNvCxnSpPr>
+            <p:nvPr/>
+          </p:nvCxnSpPr>
+          <p:spPr>
+            <a:xfrm>
+              <a:off x="5731293" y="2581275"/>
+              <a:ext cx="0" cy="1850766"/>
+            </a:xfrm>
+            <a:prstGeom prst="line">
+              <a:avLst/>
+            </a:prstGeom>
+            <a:ln w="76200">
+              <a:solidFill>
+                <a:schemeClr val="tx1"/>
+              </a:solidFill>
+            </a:ln>
+          </p:spPr>
+          <p:style>
+            <a:lnRef idx="1">
+              <a:schemeClr val="accent1"/>
+            </a:lnRef>
+            <a:fillRef idx="0">
+              <a:schemeClr val="accent1"/>
+            </a:fillRef>
+            <a:effectRef idx="0">
+              <a:schemeClr val="accent1"/>
+            </a:effectRef>
+            <a:fontRef idx="minor">
+              <a:schemeClr val="tx1"/>
+            </a:fontRef>
+          </p:style>
+        </p:cxnSp>
+        <p:sp>
+          <p:nvSpPr>
+            <p:cNvPr id="9" name="TextBox 8"/>
+            <p:cNvSpPr txBox="1"/>
+            <p:nvPr/>
+          </p:nvSpPr>
+          <p:spPr>
+            <a:xfrm rot="16200000">
+              <a:off x="5404201" y="3368158"/>
+              <a:ext cx="654184" cy="276999"/>
+            </a:xfrm>
+            <a:prstGeom prst="rect">
+              <a:avLst/>
+            </a:prstGeom>
+            <a:solidFill>
+              <a:schemeClr val="bg1"/>
+            </a:solidFill>
+          </p:spPr>
+          <p:txBody>
+            <a:bodyPr wrap="square" rtlCol="0">
+              <a:spAutoFit/>
+            </a:bodyPr>
+            <a:lstStyle/>
+            <a:p>
+              <a:r>
+                <a:rPr lang="en-US" sz="1200" b="1" dirty="0">
+                  <a:latin typeface="Courier New" panose="02070309020205020404" pitchFamily="49" charset="0"/>
+                  <a:cs typeface="Courier New" panose="02070309020205020404" pitchFamily="49" charset="0"/>
+                </a:rPr>
+                <a:t>7-SEG</a:t>
+              </a:r>
+            </a:p>
+          </p:txBody>
+        </p:sp>
+      </p:grpSp>
+      <p:sp>
+        <p:nvSpPr>
+          <p:cNvPr id="5" name="TextBox 4"/>
           <p:cNvSpPr txBox="1"/>
           <p:nvPr/>
         </p:nvSpPr>
         <p:spPr>
           <a:xfrm>
-            <a:off x="4023360" y="1371600"/>
-            <a:ext cx="4003019" cy="3693319"/>
+            <a:off x="5416846" y="596348"/>
+            <a:ext cx="2812751" cy="4247317"/>
           </a:xfrm>
           <a:prstGeom prst="rect">
             <a:avLst/>
@@ -3365,6 +3805,754 @@
           <a:noFill/>
         </p:spPr>
         <p:txBody>
+          <a:bodyPr wrap="square" rtlCol="0">
+            <a:spAutoFit/>
+          </a:bodyPr>
+          <a:lstStyle/>
+          <a:p>
+            <a:r>
+              <a:rPr lang="en-US" b="1" dirty="0" smtClean="0">
+                <a:latin typeface="Courier New" panose="02070309020205020404" pitchFamily="49" charset="0"/>
+                <a:cs typeface="Courier New" panose="02070309020205020404" pitchFamily="49" charset="0"/>
+              </a:rPr>
+              <a:t>PIN BCM</a:t>
+            </a:r>
+          </a:p>
+          <a:p>
+            <a:r>
+              <a:rPr lang="en-US" b="1" dirty="0" smtClean="0">
+                <a:latin typeface="Courier New" panose="02070309020205020404" pitchFamily="49" charset="0"/>
+                <a:cs typeface="Courier New" panose="02070309020205020404" pitchFamily="49" charset="0"/>
+              </a:rPr>
+              <a:t>  8 </a:t>
+            </a:r>
+            <a:r>
+              <a:rPr lang="en-US" b="1" dirty="0" smtClean="0">
+                <a:latin typeface="Courier New" panose="02070309020205020404" pitchFamily="49" charset="0"/>
+                <a:cs typeface="Courier New" panose="02070309020205020404" pitchFamily="49" charset="0"/>
+              </a:rPr>
+              <a:t>14 </a:t>
+            </a:r>
+            <a:r>
+              <a:rPr lang="en-US" b="1" dirty="0">
+                <a:latin typeface="Courier New" panose="02070309020205020404" pitchFamily="49" charset="0"/>
+                <a:cs typeface="Courier New" panose="02070309020205020404" pitchFamily="49" charset="0"/>
+              </a:rPr>
+              <a:t>- UART (TX)</a:t>
+            </a:r>
+          </a:p>
+          <a:p>
+            <a:r>
+              <a:rPr lang="en-US" b="1" dirty="0" smtClean="0">
+                <a:latin typeface="Courier New" panose="02070309020205020404" pitchFamily="49" charset="0"/>
+                <a:cs typeface="Courier New" panose="02070309020205020404" pitchFamily="49" charset="0"/>
+              </a:rPr>
+              <a:t> 10 </a:t>
+            </a:r>
+            <a:r>
+              <a:rPr lang="en-US" b="1" dirty="0" smtClean="0">
+                <a:latin typeface="Courier New" panose="02070309020205020404" pitchFamily="49" charset="0"/>
+                <a:cs typeface="Courier New" panose="02070309020205020404" pitchFamily="49" charset="0"/>
+              </a:rPr>
+              <a:t>15 </a:t>
+            </a:r>
+            <a:r>
+              <a:rPr lang="en-US" b="1" dirty="0">
+                <a:latin typeface="Courier New" panose="02070309020205020404" pitchFamily="49" charset="0"/>
+                <a:cs typeface="Courier New" panose="02070309020205020404" pitchFamily="49" charset="0"/>
+              </a:rPr>
+              <a:t>- UART (RX)</a:t>
+            </a:r>
+          </a:p>
+          <a:p>
+            <a:r>
+              <a:rPr lang="en-US" b="1" dirty="0" smtClean="0">
+                <a:latin typeface="Courier New" panose="02070309020205020404" pitchFamily="49" charset="0"/>
+                <a:cs typeface="Courier New" panose="02070309020205020404" pitchFamily="49" charset="0"/>
+              </a:rPr>
+              <a:t> 36 </a:t>
+            </a:r>
+            <a:r>
+              <a:rPr lang="en-US" b="1" dirty="0" smtClean="0">
+                <a:latin typeface="Courier New" panose="02070309020205020404" pitchFamily="49" charset="0"/>
+                <a:cs typeface="Courier New" panose="02070309020205020404" pitchFamily="49" charset="0"/>
+              </a:rPr>
+              <a:t>16 </a:t>
+            </a:r>
+            <a:r>
+              <a:rPr lang="en-US" b="1" dirty="0">
+                <a:latin typeface="Courier New" panose="02070309020205020404" pitchFamily="49" charset="0"/>
+                <a:cs typeface="Courier New" panose="02070309020205020404" pitchFamily="49" charset="0"/>
+              </a:rPr>
+              <a:t>- BUTTON 1</a:t>
+            </a:r>
+          </a:p>
+          <a:p>
+            <a:r>
+              <a:rPr lang="en-US" b="1" dirty="0" smtClean="0">
+                <a:latin typeface="Courier New" panose="02070309020205020404" pitchFamily="49" charset="0"/>
+                <a:cs typeface="Courier New" panose="02070309020205020404" pitchFamily="49" charset="0"/>
+              </a:rPr>
+              <a:t> 11 </a:t>
+            </a:r>
+            <a:r>
+              <a:rPr lang="en-US" b="1" dirty="0" smtClean="0">
+                <a:latin typeface="Courier New" panose="02070309020205020404" pitchFamily="49" charset="0"/>
+                <a:cs typeface="Courier New" panose="02070309020205020404" pitchFamily="49" charset="0"/>
+              </a:rPr>
+              <a:t>17 </a:t>
+            </a:r>
+            <a:r>
+              <a:rPr lang="en-US" b="1" dirty="0">
+                <a:latin typeface="Courier New" panose="02070309020205020404" pitchFamily="49" charset="0"/>
+                <a:cs typeface="Courier New" panose="02070309020205020404" pitchFamily="49" charset="0"/>
+              </a:rPr>
+              <a:t>- BUTTON 2</a:t>
+            </a:r>
+          </a:p>
+          <a:p>
+            <a:r>
+              <a:rPr lang="en-US" b="1" dirty="0" smtClean="0">
+                <a:latin typeface="Courier New" panose="02070309020205020404" pitchFamily="49" charset="0"/>
+                <a:cs typeface="Courier New" panose="02070309020205020404" pitchFamily="49" charset="0"/>
+              </a:rPr>
+              <a:t> 12 </a:t>
+            </a:r>
+            <a:r>
+              <a:rPr lang="en-US" b="1" dirty="0" smtClean="0">
+                <a:latin typeface="Courier New" panose="02070309020205020404" pitchFamily="49" charset="0"/>
+                <a:cs typeface="Courier New" panose="02070309020205020404" pitchFamily="49" charset="0"/>
+              </a:rPr>
+              <a:t>18 </a:t>
+            </a:r>
+            <a:r>
+              <a:rPr lang="en-US" b="1" dirty="0">
+                <a:latin typeface="Courier New" panose="02070309020205020404" pitchFamily="49" charset="0"/>
+                <a:cs typeface="Courier New" panose="02070309020205020404" pitchFamily="49" charset="0"/>
+              </a:rPr>
+              <a:t>- BUTTON 3</a:t>
+            </a:r>
+          </a:p>
+          <a:p>
+            <a:r>
+              <a:rPr lang="en-US" b="1" dirty="0" smtClean="0">
+                <a:latin typeface="Courier New" panose="02070309020205020404" pitchFamily="49" charset="0"/>
+                <a:cs typeface="Courier New" panose="02070309020205020404" pitchFamily="49" charset="0"/>
+              </a:rPr>
+              <a:t> 35 </a:t>
+            </a:r>
+            <a:r>
+              <a:rPr lang="en-US" b="1" dirty="0" smtClean="0">
+                <a:latin typeface="Courier New" panose="02070309020205020404" pitchFamily="49" charset="0"/>
+                <a:cs typeface="Courier New" panose="02070309020205020404" pitchFamily="49" charset="0"/>
+              </a:rPr>
+              <a:t>19 </a:t>
+            </a:r>
+            <a:r>
+              <a:rPr lang="en-US" b="1" dirty="0">
+                <a:latin typeface="Courier New" panose="02070309020205020404" pitchFamily="49" charset="0"/>
+                <a:cs typeface="Courier New" panose="02070309020205020404" pitchFamily="49" charset="0"/>
+              </a:rPr>
+              <a:t>- BUTTON 4</a:t>
+            </a:r>
+          </a:p>
+          <a:p>
+            <a:r>
+              <a:rPr lang="en-US" b="1" dirty="0" smtClean="0">
+                <a:latin typeface="Courier New" panose="02070309020205020404" pitchFamily="49" charset="0"/>
+                <a:cs typeface="Courier New" panose="02070309020205020404" pitchFamily="49" charset="0"/>
+              </a:rPr>
+              <a:t> 38 </a:t>
+            </a:r>
+            <a:r>
+              <a:rPr lang="en-US" b="1" dirty="0" smtClean="0">
+                <a:latin typeface="Courier New" panose="02070309020205020404" pitchFamily="49" charset="0"/>
+                <a:cs typeface="Courier New" panose="02070309020205020404" pitchFamily="49" charset="0"/>
+              </a:rPr>
+              <a:t>20 </a:t>
+            </a:r>
+            <a:r>
+              <a:rPr lang="en-US" b="1" dirty="0">
+                <a:latin typeface="Courier New" panose="02070309020205020404" pitchFamily="49" charset="0"/>
+                <a:cs typeface="Courier New" panose="02070309020205020404" pitchFamily="49" charset="0"/>
+              </a:rPr>
+              <a:t>- BUTTON 5</a:t>
+            </a:r>
+          </a:p>
+          <a:p>
+            <a:r>
+              <a:rPr lang="en-US" b="1" dirty="0" smtClean="0">
+                <a:latin typeface="Courier New" panose="02070309020205020404" pitchFamily="49" charset="0"/>
+                <a:cs typeface="Courier New" panose="02070309020205020404" pitchFamily="49" charset="0"/>
+              </a:rPr>
+              <a:t> 40 </a:t>
+            </a:r>
+            <a:r>
+              <a:rPr lang="en-US" b="1" dirty="0" smtClean="0">
+                <a:latin typeface="Courier New" panose="02070309020205020404" pitchFamily="49" charset="0"/>
+                <a:cs typeface="Courier New" panose="02070309020205020404" pitchFamily="49" charset="0"/>
+              </a:rPr>
+              <a:t>21 </a:t>
+            </a:r>
+            <a:r>
+              <a:rPr lang="en-US" b="1" dirty="0">
+                <a:latin typeface="Courier New" panose="02070309020205020404" pitchFamily="49" charset="0"/>
+                <a:cs typeface="Courier New" panose="02070309020205020404" pitchFamily="49" charset="0"/>
+              </a:rPr>
+              <a:t>- ENABLE</a:t>
+            </a:r>
+          </a:p>
+          <a:p>
+            <a:r>
+              <a:rPr lang="en-US" b="1" dirty="0" smtClean="0">
+                <a:latin typeface="Courier New" panose="02070309020205020404" pitchFamily="49" charset="0"/>
+                <a:cs typeface="Courier New" panose="02070309020205020404" pitchFamily="49" charset="0"/>
+              </a:rPr>
+              <a:t> 15 </a:t>
+            </a:r>
+            <a:r>
+              <a:rPr lang="en-US" b="1" dirty="0" smtClean="0">
+                <a:latin typeface="Courier New" panose="02070309020205020404" pitchFamily="49" charset="0"/>
+                <a:cs typeface="Courier New" panose="02070309020205020404" pitchFamily="49" charset="0"/>
+              </a:rPr>
+              <a:t>22 </a:t>
+            </a:r>
+            <a:r>
+              <a:rPr lang="en-US" b="1" dirty="0">
+                <a:latin typeface="Courier New" panose="02070309020205020404" pitchFamily="49" charset="0"/>
+                <a:cs typeface="Courier New" panose="02070309020205020404" pitchFamily="49" charset="0"/>
+              </a:rPr>
+              <a:t>- NC</a:t>
+            </a:r>
+          </a:p>
+          <a:p>
+            <a:r>
+              <a:rPr lang="en-US" b="1" dirty="0" smtClean="0">
+                <a:latin typeface="Courier New" panose="02070309020205020404" pitchFamily="49" charset="0"/>
+                <a:cs typeface="Courier New" panose="02070309020205020404" pitchFamily="49" charset="0"/>
+              </a:rPr>
+              <a:t> 16 </a:t>
+            </a:r>
+            <a:r>
+              <a:rPr lang="en-US" b="1" dirty="0" smtClean="0">
+                <a:latin typeface="Courier New" panose="02070309020205020404" pitchFamily="49" charset="0"/>
+                <a:cs typeface="Courier New" panose="02070309020205020404" pitchFamily="49" charset="0"/>
+              </a:rPr>
+              <a:t>23 </a:t>
+            </a:r>
+            <a:r>
+              <a:rPr lang="en-US" b="1" dirty="0">
+                <a:latin typeface="Courier New" panose="02070309020205020404" pitchFamily="49" charset="0"/>
+                <a:cs typeface="Courier New" panose="02070309020205020404" pitchFamily="49" charset="0"/>
+              </a:rPr>
+              <a:t>- DP</a:t>
+            </a:r>
+          </a:p>
+          <a:p>
+            <a:r>
+              <a:rPr lang="en-US" b="1" dirty="0" smtClean="0">
+                <a:latin typeface="Courier New" panose="02070309020205020404" pitchFamily="49" charset="0"/>
+                <a:cs typeface="Courier New" panose="02070309020205020404" pitchFamily="49" charset="0"/>
+              </a:rPr>
+              <a:t> 18 </a:t>
+            </a:r>
+            <a:r>
+              <a:rPr lang="en-US" b="1" dirty="0" smtClean="0">
+                <a:latin typeface="Courier New" panose="02070309020205020404" pitchFamily="49" charset="0"/>
+                <a:cs typeface="Courier New" panose="02070309020205020404" pitchFamily="49" charset="0"/>
+              </a:rPr>
+              <a:t>24 </a:t>
+            </a:r>
+            <a:r>
+              <a:rPr lang="en-US" b="1" dirty="0">
+                <a:latin typeface="Courier New" panose="02070309020205020404" pitchFamily="49" charset="0"/>
+                <a:cs typeface="Courier New" panose="02070309020205020404" pitchFamily="49" charset="0"/>
+              </a:rPr>
+              <a:t>– A (LSB)</a:t>
+            </a:r>
+          </a:p>
+          <a:p>
+            <a:r>
+              <a:rPr lang="en-US" b="1" dirty="0" smtClean="0">
+                <a:latin typeface="Courier New" panose="02070309020205020404" pitchFamily="49" charset="0"/>
+                <a:cs typeface="Courier New" panose="02070309020205020404" pitchFamily="49" charset="0"/>
+              </a:rPr>
+              <a:t> 22 </a:t>
+            </a:r>
+            <a:r>
+              <a:rPr lang="en-US" b="1" dirty="0" smtClean="0">
+                <a:latin typeface="Courier New" panose="02070309020205020404" pitchFamily="49" charset="0"/>
+                <a:cs typeface="Courier New" panose="02070309020205020404" pitchFamily="49" charset="0"/>
+              </a:rPr>
+              <a:t>25 </a:t>
+            </a:r>
+            <a:r>
+              <a:rPr lang="en-US" b="1" dirty="0">
+                <a:latin typeface="Courier New" panose="02070309020205020404" pitchFamily="49" charset="0"/>
+                <a:cs typeface="Courier New" panose="02070309020205020404" pitchFamily="49" charset="0"/>
+              </a:rPr>
+              <a:t>- B</a:t>
+            </a:r>
+          </a:p>
+          <a:p>
+            <a:r>
+              <a:rPr lang="en-US" b="1" dirty="0" smtClean="0">
+                <a:latin typeface="Courier New" panose="02070309020205020404" pitchFamily="49" charset="0"/>
+                <a:cs typeface="Courier New" panose="02070309020205020404" pitchFamily="49" charset="0"/>
+              </a:rPr>
+              <a:t> 37 </a:t>
+            </a:r>
+            <a:r>
+              <a:rPr lang="en-US" b="1" dirty="0" smtClean="0">
+                <a:latin typeface="Courier New" panose="02070309020205020404" pitchFamily="49" charset="0"/>
+                <a:cs typeface="Courier New" panose="02070309020205020404" pitchFamily="49" charset="0"/>
+              </a:rPr>
+              <a:t>26 </a:t>
+            </a:r>
+            <a:r>
+              <a:rPr lang="en-US" b="1" dirty="0">
+                <a:latin typeface="Courier New" panose="02070309020205020404" pitchFamily="49" charset="0"/>
+                <a:cs typeface="Courier New" panose="02070309020205020404" pitchFamily="49" charset="0"/>
+              </a:rPr>
+              <a:t>- C</a:t>
+            </a:r>
+          </a:p>
+          <a:p>
+            <a:r>
+              <a:rPr lang="en-US" b="1" dirty="0" smtClean="0">
+                <a:latin typeface="Courier New" panose="02070309020205020404" pitchFamily="49" charset="0"/>
+                <a:cs typeface="Courier New" panose="02070309020205020404" pitchFamily="49" charset="0"/>
+              </a:rPr>
+              <a:t> 13 </a:t>
+            </a:r>
+            <a:r>
+              <a:rPr lang="en-US" b="1" dirty="0" smtClean="0">
+                <a:latin typeface="Courier New" panose="02070309020205020404" pitchFamily="49" charset="0"/>
+                <a:cs typeface="Courier New" panose="02070309020205020404" pitchFamily="49" charset="0"/>
+              </a:rPr>
+              <a:t>27 </a:t>
+            </a:r>
+            <a:r>
+              <a:rPr lang="en-US" b="1" dirty="0">
+                <a:latin typeface="Courier New" panose="02070309020205020404" pitchFamily="49" charset="0"/>
+                <a:cs typeface="Courier New" panose="02070309020205020404" pitchFamily="49" charset="0"/>
+              </a:rPr>
+              <a:t>– </a:t>
+            </a:r>
+            <a:r>
+              <a:rPr lang="en-US" b="1" dirty="0" smtClean="0">
+                <a:latin typeface="Courier New" panose="02070309020205020404" pitchFamily="49" charset="0"/>
+                <a:cs typeface="Courier New" panose="02070309020205020404" pitchFamily="49" charset="0"/>
+              </a:rPr>
+              <a:t>D </a:t>
+            </a:r>
+            <a:r>
+              <a:rPr lang="en-US" b="1" dirty="0">
+                <a:latin typeface="Courier New" panose="02070309020205020404" pitchFamily="49" charset="0"/>
+                <a:cs typeface="Courier New" panose="02070309020205020404" pitchFamily="49" charset="0"/>
+              </a:rPr>
+              <a:t>(MSB</a:t>
+            </a:r>
+            <a:r>
+              <a:rPr lang="en-US" b="1" dirty="0" smtClean="0">
+                <a:latin typeface="Courier New" panose="02070309020205020404" pitchFamily="49" charset="0"/>
+                <a:cs typeface="Courier New" panose="02070309020205020404" pitchFamily="49" charset="0"/>
+              </a:rPr>
+              <a:t>)</a:t>
+            </a:r>
+          </a:p>
+        </p:txBody>
+      </p:sp>
+      <p:sp>
+        <p:nvSpPr>
+          <p:cNvPr id="4" name="TextBox 3"/>
+          <p:cNvSpPr txBox="1"/>
+          <p:nvPr/>
+        </p:nvSpPr>
+        <p:spPr>
+          <a:xfrm>
+            <a:off x="2682081" y="596348"/>
+            <a:ext cx="2889780" cy="4247317"/>
+          </a:xfrm>
+          <a:prstGeom prst="rect">
+            <a:avLst/>
+          </a:prstGeom>
+          <a:noFill/>
+        </p:spPr>
+        <p:txBody>
+          <a:bodyPr wrap="square" rtlCol="0">
+            <a:spAutoFit/>
+          </a:bodyPr>
+          <a:lstStyle/>
+          <a:p>
+            <a:r>
+              <a:rPr lang="en-US" b="1" dirty="0" smtClean="0">
+                <a:latin typeface="Courier New" panose="02070309020205020404" pitchFamily="49" charset="0"/>
+                <a:cs typeface="Courier New" panose="02070309020205020404" pitchFamily="49" charset="0"/>
+              </a:rPr>
+              <a:t>PIN BCM</a:t>
+            </a:r>
+          </a:p>
+          <a:p>
+            <a:r>
+              <a:rPr lang="en-US" b="1" dirty="0" smtClean="0">
+                <a:latin typeface="Courier New" panose="02070309020205020404" pitchFamily="49" charset="0"/>
+                <a:cs typeface="Courier New" panose="02070309020205020404" pitchFamily="49" charset="0"/>
+              </a:rPr>
+              <a:t> 27  </a:t>
+            </a:r>
+            <a:r>
+              <a:rPr lang="en-US" b="1" dirty="0">
+                <a:latin typeface="Courier New" panose="02070309020205020404" pitchFamily="49" charset="0"/>
+                <a:cs typeface="Courier New" panose="02070309020205020404" pitchFamily="49" charset="0"/>
+              </a:rPr>
+              <a:t>0 - NC</a:t>
+            </a:r>
+          </a:p>
+          <a:p>
+            <a:r>
+              <a:rPr lang="en-US" b="1" dirty="0" smtClean="0">
+                <a:latin typeface="Courier New" panose="02070309020205020404" pitchFamily="49" charset="0"/>
+                <a:cs typeface="Courier New" panose="02070309020205020404" pitchFamily="49" charset="0"/>
+              </a:rPr>
+              <a:t> 28  </a:t>
+            </a:r>
+            <a:r>
+              <a:rPr lang="en-US" b="1" dirty="0">
+                <a:latin typeface="Courier New" panose="02070309020205020404" pitchFamily="49" charset="0"/>
+                <a:cs typeface="Courier New" panose="02070309020205020404" pitchFamily="49" charset="0"/>
+              </a:rPr>
+              <a:t>1 - NC</a:t>
+            </a:r>
+          </a:p>
+          <a:p>
+            <a:r>
+              <a:rPr lang="en-US" b="1" dirty="0" smtClean="0">
+                <a:latin typeface="Courier New" panose="02070309020205020404" pitchFamily="49" charset="0"/>
+                <a:cs typeface="Courier New" panose="02070309020205020404" pitchFamily="49" charset="0"/>
+              </a:rPr>
+              <a:t>  3  </a:t>
+            </a:r>
+            <a:r>
+              <a:rPr lang="en-US" b="1" dirty="0">
+                <a:latin typeface="Courier New" panose="02070309020205020404" pitchFamily="49" charset="0"/>
+                <a:cs typeface="Courier New" panose="02070309020205020404" pitchFamily="49" charset="0"/>
+              </a:rPr>
+              <a:t>2 - RED</a:t>
+            </a:r>
+          </a:p>
+          <a:p>
+            <a:r>
+              <a:rPr lang="en-US" b="1" dirty="0" smtClean="0">
+                <a:latin typeface="Courier New" panose="02070309020205020404" pitchFamily="49" charset="0"/>
+                <a:cs typeface="Courier New" panose="02070309020205020404" pitchFamily="49" charset="0"/>
+              </a:rPr>
+              <a:t>  5  3 - </a:t>
+            </a:r>
+            <a:r>
+              <a:rPr lang="en-US" b="1" dirty="0">
+                <a:latin typeface="Courier New" panose="02070309020205020404" pitchFamily="49" charset="0"/>
+                <a:cs typeface="Courier New" panose="02070309020205020404" pitchFamily="49" charset="0"/>
+              </a:rPr>
+              <a:t>YELLOW</a:t>
+            </a:r>
+          </a:p>
+          <a:p>
+            <a:r>
+              <a:rPr lang="en-US" b="1" dirty="0" smtClean="0">
+                <a:latin typeface="Courier New" panose="02070309020205020404" pitchFamily="49" charset="0"/>
+                <a:cs typeface="Courier New" panose="02070309020205020404" pitchFamily="49" charset="0"/>
+              </a:rPr>
+              <a:t>  7  </a:t>
+            </a:r>
+            <a:r>
+              <a:rPr lang="en-US" b="1" dirty="0">
+                <a:latin typeface="Courier New" panose="02070309020205020404" pitchFamily="49" charset="0"/>
+                <a:cs typeface="Courier New" panose="02070309020205020404" pitchFamily="49" charset="0"/>
+              </a:rPr>
+              <a:t>4 - GREEN</a:t>
+            </a:r>
+          </a:p>
+          <a:p>
+            <a:r>
+              <a:rPr lang="en-US" b="1" dirty="0" smtClean="0">
+                <a:latin typeface="Courier New" panose="02070309020205020404" pitchFamily="49" charset="0"/>
+                <a:cs typeface="Courier New" panose="02070309020205020404" pitchFamily="49" charset="0"/>
+              </a:rPr>
+              <a:t> 29  </a:t>
+            </a:r>
+            <a:r>
+              <a:rPr lang="en-US" b="1" dirty="0">
+                <a:latin typeface="Courier New" panose="02070309020205020404" pitchFamily="49" charset="0"/>
+                <a:cs typeface="Courier New" panose="02070309020205020404" pitchFamily="49" charset="0"/>
+              </a:rPr>
+              <a:t>5 - BLUE</a:t>
+            </a:r>
+          </a:p>
+          <a:p>
+            <a:r>
+              <a:rPr lang="en-US" b="1" dirty="0" smtClean="0">
+                <a:latin typeface="Courier New" panose="02070309020205020404" pitchFamily="49" charset="0"/>
+                <a:cs typeface="Courier New" panose="02070309020205020404" pitchFamily="49" charset="0"/>
+              </a:rPr>
+              <a:t> 31  </a:t>
+            </a:r>
+            <a:r>
+              <a:rPr lang="en-US" b="1" dirty="0">
+                <a:latin typeface="Courier New" panose="02070309020205020404" pitchFamily="49" charset="0"/>
+                <a:cs typeface="Courier New" panose="02070309020205020404" pitchFamily="49" charset="0"/>
+              </a:rPr>
+              <a:t>6 - SPEAKER</a:t>
+            </a:r>
+          </a:p>
+          <a:p>
+            <a:r>
+              <a:rPr lang="en-US" b="1" dirty="0" smtClean="0">
+                <a:latin typeface="Courier New" panose="02070309020205020404" pitchFamily="49" charset="0"/>
+                <a:cs typeface="Courier New" panose="02070309020205020404" pitchFamily="49" charset="0"/>
+              </a:rPr>
+              <a:t> 26  </a:t>
+            </a:r>
+            <a:r>
+              <a:rPr lang="en-US" b="1" dirty="0">
+                <a:latin typeface="Courier New" panose="02070309020205020404" pitchFamily="49" charset="0"/>
+                <a:cs typeface="Courier New" panose="02070309020205020404" pitchFamily="49" charset="0"/>
+              </a:rPr>
+              <a:t>7 - SPI (CE1)</a:t>
+            </a:r>
+          </a:p>
+          <a:p>
+            <a:r>
+              <a:rPr lang="en-US" b="1" dirty="0" smtClean="0">
+                <a:latin typeface="Courier New" panose="02070309020205020404" pitchFamily="49" charset="0"/>
+                <a:cs typeface="Courier New" panose="02070309020205020404" pitchFamily="49" charset="0"/>
+              </a:rPr>
+              <a:t> 24  </a:t>
+            </a:r>
+            <a:r>
+              <a:rPr lang="en-US" b="1" dirty="0">
+                <a:latin typeface="Courier New" panose="02070309020205020404" pitchFamily="49" charset="0"/>
+                <a:cs typeface="Courier New" panose="02070309020205020404" pitchFamily="49" charset="0"/>
+              </a:rPr>
+              <a:t>8 - SPI (CE0)</a:t>
+            </a:r>
+          </a:p>
+          <a:p>
+            <a:r>
+              <a:rPr lang="en-US" b="1" dirty="0" smtClean="0">
+                <a:latin typeface="Courier New" panose="02070309020205020404" pitchFamily="49" charset="0"/>
+                <a:cs typeface="Courier New" panose="02070309020205020404" pitchFamily="49" charset="0"/>
+              </a:rPr>
+              <a:t> 21  </a:t>
+            </a:r>
+            <a:r>
+              <a:rPr lang="en-US" b="1" dirty="0">
+                <a:latin typeface="Courier New" panose="02070309020205020404" pitchFamily="49" charset="0"/>
+                <a:cs typeface="Courier New" panose="02070309020205020404" pitchFamily="49" charset="0"/>
+              </a:rPr>
+              <a:t>9 - SPI (</a:t>
+            </a:r>
+            <a:r>
+              <a:rPr lang="en-US" b="1" dirty="0" smtClean="0">
+                <a:latin typeface="Courier New" panose="02070309020205020404" pitchFamily="49" charset="0"/>
+                <a:cs typeface="Courier New" panose="02070309020205020404" pitchFamily="49" charset="0"/>
+              </a:rPr>
+              <a:t>MISO</a:t>
+            </a:r>
+            <a:r>
+              <a:rPr lang="en-US" b="1" dirty="0">
+                <a:latin typeface="Courier New" panose="02070309020205020404" pitchFamily="49" charset="0"/>
+                <a:cs typeface="Courier New" panose="02070309020205020404" pitchFamily="49" charset="0"/>
+              </a:rPr>
+              <a:t>)</a:t>
+            </a:r>
+          </a:p>
+          <a:p>
+            <a:r>
+              <a:rPr lang="en-US" b="1" dirty="0" smtClean="0">
+                <a:latin typeface="Courier New" panose="02070309020205020404" pitchFamily="49" charset="0"/>
+                <a:cs typeface="Courier New" panose="02070309020205020404" pitchFamily="49" charset="0"/>
+              </a:rPr>
+              <a:t> 19 10 </a:t>
+            </a:r>
+            <a:r>
+              <a:rPr lang="en-US" b="1" dirty="0">
+                <a:latin typeface="Courier New" panose="02070309020205020404" pitchFamily="49" charset="0"/>
+                <a:cs typeface="Courier New" panose="02070309020205020404" pitchFamily="49" charset="0"/>
+              </a:rPr>
+              <a:t>- SPI (MOSI)</a:t>
+            </a:r>
+          </a:p>
+          <a:p>
+            <a:r>
+              <a:rPr lang="en-US" b="1" dirty="0" smtClean="0">
+                <a:latin typeface="Courier New" panose="02070309020205020404" pitchFamily="49" charset="0"/>
+                <a:cs typeface="Courier New" panose="02070309020205020404" pitchFamily="49" charset="0"/>
+              </a:rPr>
+              <a:t> 23 11 </a:t>
+            </a:r>
+            <a:r>
+              <a:rPr lang="en-US" b="1" dirty="0">
+                <a:latin typeface="Courier New" panose="02070309020205020404" pitchFamily="49" charset="0"/>
+                <a:cs typeface="Courier New" panose="02070309020205020404" pitchFamily="49" charset="0"/>
+              </a:rPr>
+              <a:t>- SPI (SCLK)</a:t>
+            </a:r>
+          </a:p>
+          <a:p>
+            <a:r>
+              <a:rPr lang="en-US" b="1" dirty="0" smtClean="0">
+                <a:latin typeface="Courier New" panose="02070309020205020404" pitchFamily="49" charset="0"/>
+                <a:cs typeface="Courier New" panose="02070309020205020404" pitchFamily="49" charset="0"/>
+              </a:rPr>
+              <a:t> 32 12 </a:t>
+            </a:r>
+            <a:r>
+              <a:rPr lang="en-US" b="1" dirty="0">
+                <a:latin typeface="Courier New" panose="02070309020205020404" pitchFamily="49" charset="0"/>
+                <a:cs typeface="Courier New" panose="02070309020205020404" pitchFamily="49" charset="0"/>
+              </a:rPr>
+              <a:t>- SWITCH 1</a:t>
+            </a:r>
+          </a:p>
+          <a:p>
+            <a:r>
+              <a:rPr lang="en-US" b="1" dirty="0" smtClean="0">
+                <a:latin typeface="Courier New" panose="02070309020205020404" pitchFamily="49" charset="0"/>
+                <a:cs typeface="Courier New" panose="02070309020205020404" pitchFamily="49" charset="0"/>
+              </a:rPr>
+              <a:t> 33 13 </a:t>
+            </a:r>
+            <a:r>
+              <a:rPr lang="en-US" b="1" dirty="0">
+                <a:latin typeface="Courier New" panose="02070309020205020404" pitchFamily="49" charset="0"/>
+                <a:cs typeface="Courier New" panose="02070309020205020404" pitchFamily="49" charset="0"/>
+              </a:rPr>
+              <a:t>- SWITCH </a:t>
+            </a:r>
+            <a:r>
+              <a:rPr lang="en-US" b="1" dirty="0" smtClean="0">
+                <a:latin typeface="Courier New" panose="02070309020205020404" pitchFamily="49" charset="0"/>
+                <a:cs typeface="Courier New" panose="02070309020205020404" pitchFamily="49" charset="0"/>
+              </a:rPr>
+              <a:t>2</a:t>
+            </a:r>
+          </a:p>
+        </p:txBody>
+      </p:sp>
+      <p:sp>
+        <p:nvSpPr>
+          <p:cNvPr id="10" name="TextBox 9"/>
+          <p:cNvSpPr txBox="1"/>
+          <p:nvPr/>
+        </p:nvSpPr>
+        <p:spPr>
+          <a:xfrm>
+            <a:off x="8569236" y="1332653"/>
+            <a:ext cx="2395126" cy="1200329"/>
+          </a:xfrm>
+          <a:prstGeom prst="rect">
+            <a:avLst/>
+          </a:prstGeom>
+          <a:noFill/>
+        </p:spPr>
+        <p:txBody>
+          <a:bodyPr wrap="square" rtlCol="0">
+            <a:spAutoFit/>
+          </a:bodyPr>
+          <a:lstStyle/>
+          <a:p>
+            <a:r>
+              <a:rPr lang="en-US" b="1" dirty="0" smtClean="0">
+                <a:latin typeface="Courier New" panose="02070309020205020404" pitchFamily="49" charset="0"/>
+                <a:cs typeface="Courier New" panose="02070309020205020404" pitchFamily="49" charset="0"/>
+              </a:rPr>
+              <a:t>PIN</a:t>
+            </a:r>
+          </a:p>
+          <a:p>
+            <a:r>
+              <a:rPr lang="en-US" b="1" dirty="0" smtClean="0">
+                <a:latin typeface="Courier New" panose="02070309020205020404" pitchFamily="49" charset="0"/>
+                <a:cs typeface="Courier New" panose="02070309020205020404" pitchFamily="49" charset="0"/>
+              </a:rPr>
+              <a:t> 2 - +5V</a:t>
+            </a:r>
+          </a:p>
+          <a:p>
+            <a:r>
+              <a:rPr lang="en-US" b="1" dirty="0" smtClean="0">
+                <a:latin typeface="Courier New" panose="02070309020205020404" pitchFamily="49" charset="0"/>
+                <a:cs typeface="Courier New" panose="02070309020205020404" pitchFamily="49" charset="0"/>
+              </a:rPr>
+              <a:t> 4 - +5V (SPKR)</a:t>
+            </a:r>
+          </a:p>
+          <a:p>
+            <a:r>
+              <a:rPr lang="en-US" b="1" dirty="0" smtClean="0">
+                <a:latin typeface="Courier New" panose="02070309020205020404" pitchFamily="49" charset="0"/>
+                <a:cs typeface="Courier New" panose="02070309020205020404" pitchFamily="49" charset="0"/>
+              </a:rPr>
+              <a:t> 6 - </a:t>
+            </a:r>
+            <a:r>
+              <a:rPr lang="en-US" b="1" dirty="0">
+                <a:latin typeface="Courier New" panose="02070309020205020404" pitchFamily="49" charset="0"/>
+                <a:cs typeface="Courier New" panose="02070309020205020404" pitchFamily="49" charset="0"/>
+              </a:rPr>
+              <a:t>GND</a:t>
+            </a:r>
+          </a:p>
+        </p:txBody>
+      </p:sp>
+    </p:spTree>
+    <p:extLst>
+      <p:ext uri="{BB962C8B-B14F-4D97-AF65-F5344CB8AC3E}">
+        <p14:creationId xmlns:p14="http://schemas.microsoft.com/office/powerpoint/2010/main" val="1206843905"/>
+      </p:ext>
+    </p:extLst>
+  </p:cSld>
+  <p:clrMapOvr>
+    <a:masterClrMapping/>
+  </p:clrMapOvr>
+</p:sld>
+</file>
+
+<file path=ppt/slides/slide3.xml><?xml version="1.0" encoding="utf-8"?>
+<p:sld xmlns:a="http://schemas.openxmlformats.org/drawingml/2006/main" xmlns:r="http://schemas.openxmlformats.org/officeDocument/2006/relationships" xmlns:p="http://schemas.openxmlformats.org/presentationml/2006/main">
+  <p:cSld>
+    <p:spTree>
+      <p:nvGrpSpPr>
+        <p:cNvPr id="1" name=""/>
+        <p:cNvGrpSpPr/>
+        <p:nvPr/>
+      </p:nvGrpSpPr>
+      <p:grpSpPr>
+        <a:xfrm>
+          <a:off x="0" y="0"/>
+          <a:ext cx="0" cy="0"/>
+          <a:chOff x="0" y="0"/>
+          <a:chExt cx="0" cy="0"/>
+        </a:xfrm>
+      </p:grpSpPr>
+      <p:sp>
+        <p:nvSpPr>
+          <p:cNvPr id="4" name="TextBox 3"/>
+          <p:cNvSpPr txBox="1"/>
+          <p:nvPr/>
+        </p:nvSpPr>
+        <p:spPr>
+          <a:xfrm>
+            <a:off x="4023360" y="1371600"/>
+            <a:ext cx="4003019" cy="3970318"/>
+          </a:xfrm>
+          <a:prstGeom prst="rect">
+            <a:avLst/>
+          </a:prstGeom>
+          <a:noFill/>
+        </p:spPr>
+        <p:txBody>
           <a:bodyPr wrap="none" rtlCol="0">
             <a:spAutoFit/>
           </a:bodyPr>
@@ -3375,44 +4563,120 @@
                 <a:latin typeface="Courier New" panose="02070309020205020404" pitchFamily="49" charset="0"/>
                 <a:cs typeface="Courier New" panose="02070309020205020404" pitchFamily="49" charset="0"/>
               </a:rPr>
-              <a:t>C1-5:		1µF</a:t>
-            </a:r>
-          </a:p>
-          <a:p>
-            <a:r>
-              <a:rPr lang="en-US" b="1" dirty="0">
-                <a:latin typeface="Courier New" panose="02070309020205020404" pitchFamily="49" charset="0"/>
-                <a:cs typeface="Courier New" panose="02070309020205020404" pitchFamily="49" charset="0"/>
-              </a:rPr>
-              <a:t>C6:		10µF</a:t>
-            </a:r>
-          </a:p>
-          <a:p>
-            <a:r>
-              <a:rPr lang="en-US" b="1" dirty="0">
-                <a:latin typeface="Courier New" panose="02070309020205020404" pitchFamily="49" charset="0"/>
-                <a:cs typeface="Courier New" panose="02070309020205020404" pitchFamily="49" charset="0"/>
-              </a:rPr>
-              <a:t>C7-14:		0.1µF</a:t>
-            </a:r>
-          </a:p>
-          <a:p>
-            <a:r>
-              <a:rPr lang="en-US" b="1" dirty="0">
-                <a:latin typeface="Courier New" panose="02070309020205020404" pitchFamily="49" charset="0"/>
-                <a:cs typeface="Courier New" panose="02070309020205020404" pitchFamily="49" charset="0"/>
-              </a:rPr>
-              <a:t>SP1:		8Ω, 0.1W</a:t>
-            </a:r>
-          </a:p>
-          <a:p>
-            <a:r>
-              <a:rPr lang="en-US" b="1" dirty="0">
-                <a:latin typeface="Courier New" panose="02070309020205020404" pitchFamily="49" charset="0"/>
-                <a:cs typeface="Courier New" panose="02070309020205020404" pitchFamily="49" charset="0"/>
-              </a:rPr>
-              <a:t>Q1-7:		NPN</a:t>
-            </a:r>
+              <a:t>C1-5:	</a:t>
+            </a:r>
+            <a:r>
+              <a:rPr lang="en-US" b="1">
+                <a:latin typeface="Courier New" panose="02070309020205020404" pitchFamily="49" charset="0"/>
+                <a:cs typeface="Courier New" panose="02070309020205020404" pitchFamily="49" charset="0"/>
+              </a:rPr>
+              <a:t>	</a:t>
+            </a:r>
+            <a:r>
+              <a:rPr lang="en-US" b="1" smtClean="0">
+                <a:latin typeface="Courier New" panose="02070309020205020404" pitchFamily="49" charset="0"/>
+                <a:cs typeface="Courier New" panose="02070309020205020404" pitchFamily="49" charset="0"/>
+              </a:rPr>
+              <a:t>   1µF</a:t>
+            </a:r>
+            <a:endParaRPr lang="en-US" b="1" dirty="0">
+              <a:latin typeface="Courier New" panose="02070309020205020404" pitchFamily="49" charset="0"/>
+              <a:cs typeface="Courier New" panose="02070309020205020404" pitchFamily="49" charset="0"/>
+            </a:endParaRPr>
+          </a:p>
+          <a:p>
+            <a:r>
+              <a:rPr lang="en-US" b="1" dirty="0">
+                <a:latin typeface="Courier New" panose="02070309020205020404" pitchFamily="49" charset="0"/>
+                <a:cs typeface="Courier New" panose="02070309020205020404" pitchFamily="49" charset="0"/>
+              </a:rPr>
+              <a:t>C6:		</a:t>
+            </a:r>
+            <a:r>
+              <a:rPr lang="en-US" b="1" dirty="0" smtClean="0">
+                <a:latin typeface="Courier New" panose="02070309020205020404" pitchFamily="49" charset="0"/>
+                <a:cs typeface="Courier New" panose="02070309020205020404" pitchFamily="49" charset="0"/>
+              </a:rPr>
+              <a:t>   10µF</a:t>
+            </a:r>
+            <a:endParaRPr lang="en-US" b="1" dirty="0">
+              <a:latin typeface="Courier New" panose="02070309020205020404" pitchFamily="49" charset="0"/>
+              <a:cs typeface="Courier New" panose="02070309020205020404" pitchFamily="49" charset="0"/>
+            </a:endParaRPr>
+          </a:p>
+          <a:p>
+            <a:r>
+              <a:rPr lang="en-US" b="1" dirty="0">
+                <a:latin typeface="Courier New" panose="02070309020205020404" pitchFamily="49" charset="0"/>
+                <a:cs typeface="Courier New" panose="02070309020205020404" pitchFamily="49" charset="0"/>
+              </a:rPr>
+              <a:t>C7-14:		</a:t>
+            </a:r>
+            <a:r>
+              <a:rPr lang="en-US" b="1" dirty="0" smtClean="0">
+                <a:latin typeface="Courier New" panose="02070309020205020404" pitchFamily="49" charset="0"/>
+                <a:cs typeface="Courier New" panose="02070309020205020404" pitchFamily="49" charset="0"/>
+              </a:rPr>
+              <a:t>   0.1µF</a:t>
+            </a:r>
+            <a:endParaRPr lang="en-US" b="1" dirty="0">
+              <a:latin typeface="Courier New" panose="02070309020205020404" pitchFamily="49" charset="0"/>
+              <a:cs typeface="Courier New" panose="02070309020205020404" pitchFamily="49" charset="0"/>
+            </a:endParaRPr>
+          </a:p>
+          <a:p>
+            <a:r>
+              <a:rPr lang="en-US" b="1" dirty="0">
+                <a:latin typeface="Courier New" panose="02070309020205020404" pitchFamily="49" charset="0"/>
+                <a:cs typeface="Courier New" panose="02070309020205020404" pitchFamily="49" charset="0"/>
+              </a:rPr>
+              <a:t>SP1:		</a:t>
+            </a:r>
+            <a:r>
+              <a:rPr lang="en-US" b="1" dirty="0" smtClean="0">
+                <a:latin typeface="Courier New" panose="02070309020205020404" pitchFamily="49" charset="0"/>
+                <a:cs typeface="Courier New" panose="02070309020205020404" pitchFamily="49" charset="0"/>
+              </a:rPr>
+              <a:t>   8Ω</a:t>
+            </a:r>
+            <a:r>
+              <a:rPr lang="en-US" b="1" dirty="0">
+                <a:latin typeface="Courier New" panose="02070309020205020404" pitchFamily="49" charset="0"/>
+                <a:cs typeface="Courier New" panose="02070309020205020404" pitchFamily="49" charset="0"/>
+              </a:rPr>
+              <a:t>, </a:t>
+            </a:r>
+            <a:r>
+              <a:rPr lang="en-US" b="1" dirty="0" smtClean="0">
+                <a:latin typeface="Courier New" panose="02070309020205020404" pitchFamily="49" charset="0"/>
+                <a:cs typeface="Courier New" panose="02070309020205020404" pitchFamily="49" charset="0"/>
+              </a:rPr>
+              <a:t>&gt; 0.15W</a:t>
+            </a:r>
+            <a:endParaRPr lang="en-US" b="1" dirty="0">
+              <a:latin typeface="Courier New" panose="02070309020205020404" pitchFamily="49" charset="0"/>
+              <a:cs typeface="Courier New" panose="02070309020205020404" pitchFamily="49" charset="0"/>
+            </a:endParaRPr>
+          </a:p>
+          <a:p>
+            <a:r>
+              <a:rPr lang="en-US" b="1" dirty="0">
+                <a:latin typeface="Courier New" panose="02070309020205020404" pitchFamily="49" charset="0"/>
+                <a:cs typeface="Courier New" panose="02070309020205020404" pitchFamily="49" charset="0"/>
+              </a:rPr>
+              <a:t>Q1-7:		</a:t>
+            </a:r>
+            <a:r>
+              <a:rPr lang="en-US" b="1" dirty="0" smtClean="0">
+                <a:latin typeface="Courier New" panose="02070309020205020404" pitchFamily="49" charset="0"/>
+                <a:cs typeface="Courier New" panose="02070309020205020404" pitchFamily="49" charset="0"/>
+              </a:rPr>
+              <a:t>   NPN</a:t>
+            </a:r>
+            <a:endParaRPr lang="en-US" b="1" dirty="0">
+              <a:latin typeface="Courier New" panose="02070309020205020404" pitchFamily="49" charset="0"/>
+              <a:cs typeface="Courier New" panose="02070309020205020404" pitchFamily="49" charset="0"/>
+            </a:endParaRPr>
           </a:p>
           <a:p>
             <a:r>
@@ -3423,7 +4687,7 @@
               <a:t>Q8:	</a:t>
             </a:r>
             <a:r>
-              <a:rPr lang="en-US" b="1" dirty="0" err="1">
+              <a:rPr lang="en-US" b="1" dirty="0" err="1" smtClean="0">
                 <a:latin typeface="Courier New" panose="02070309020205020404" pitchFamily="49" charset="0"/>
                 <a:cs typeface="Courier New" panose="02070309020205020404" pitchFamily="49" charset="0"/>
               </a:rPr>
@@ -3443,62 +4707,155 @@
                 <a:latin typeface="Courier New" panose="02070309020205020404" pitchFamily="49" charset="0"/>
                 <a:cs typeface="Courier New" panose="02070309020205020404" pitchFamily="49" charset="0"/>
               </a:rPr>
-              <a:t>POT1:			10kΩ</a:t>
-            </a:r>
-          </a:p>
-          <a:p>
-            <a:r>
-              <a:rPr lang="en-US" b="1" dirty="0">
-                <a:latin typeface="Courier New" panose="02070309020205020404" pitchFamily="49" charset="0"/>
-                <a:cs typeface="Courier New" panose="02070309020205020404" pitchFamily="49" charset="0"/>
-              </a:rPr>
-              <a:t>R1-10, 15-19:		47kΩ</a:t>
-            </a:r>
-          </a:p>
-          <a:p>
-            <a:r>
-              <a:rPr lang="en-US" b="1" dirty="0">
-                <a:latin typeface="Courier New" panose="02070309020205020404" pitchFamily="49" charset="0"/>
-                <a:cs typeface="Courier New" panose="02070309020205020404" pitchFamily="49" charset="0"/>
-              </a:rPr>
-              <a:t>R25, 26:		47kΩ</a:t>
-            </a:r>
-          </a:p>
-          <a:p>
-            <a:r>
-              <a:rPr lang="en-US" b="1" dirty="0">
-                <a:latin typeface="Courier New" panose="02070309020205020404" pitchFamily="49" charset="0"/>
-                <a:cs typeface="Courier New" panose="02070309020205020404" pitchFamily="49" charset="0"/>
-              </a:rPr>
-              <a:t>R11-14, R27:		220kΩ</a:t>
-            </a:r>
-          </a:p>
-          <a:p>
-            <a:r>
-              <a:rPr lang="en-US" b="1" dirty="0">
-                <a:latin typeface="Courier New" panose="02070309020205020404" pitchFamily="49" charset="0"/>
-                <a:cs typeface="Courier New" panose="02070309020205020404" pitchFamily="49" charset="0"/>
-              </a:rPr>
-              <a:t>R20-22:		100Ω</a:t>
-            </a:r>
-          </a:p>
-          <a:p>
-            <a:r>
-              <a:rPr lang="en-US" b="1" dirty="0">
-                <a:latin typeface="Courier New" panose="02070309020205020404" pitchFamily="49" charset="0"/>
-                <a:cs typeface="Courier New" panose="02070309020205020404" pitchFamily="49" charset="0"/>
-              </a:rPr>
-              <a:t>R23:			22kΩ</a:t>
-            </a:r>
-          </a:p>
-          <a:p>
-            <a:r>
-              <a:rPr lang="en-US" b="1" dirty="0">
-                <a:latin typeface="Courier New" panose="02070309020205020404" pitchFamily="49" charset="0"/>
-                <a:cs typeface="Courier New" panose="02070309020205020404" pitchFamily="49" charset="0"/>
-              </a:rPr>
-              <a:t>R24, 28:		330Ω</a:t>
-            </a:r>
+              <a:t>POT1:		</a:t>
+            </a:r>
+            <a:r>
+              <a:rPr lang="en-US" b="1" dirty="0" smtClean="0">
+                <a:latin typeface="Courier New" panose="02070309020205020404" pitchFamily="49" charset="0"/>
+                <a:cs typeface="Courier New" panose="02070309020205020404" pitchFamily="49" charset="0"/>
+              </a:rPr>
+              <a:t>   10kΩ</a:t>
+            </a:r>
+            <a:endParaRPr lang="en-US" b="1" dirty="0">
+              <a:latin typeface="Courier New" panose="02070309020205020404" pitchFamily="49" charset="0"/>
+              <a:cs typeface="Courier New" panose="02070309020205020404" pitchFamily="49" charset="0"/>
+            </a:endParaRPr>
+          </a:p>
+          <a:p>
+            <a:r>
+              <a:rPr lang="en-US" b="1" dirty="0">
+                <a:latin typeface="Courier New" panose="02070309020205020404" pitchFamily="49" charset="0"/>
+                <a:cs typeface="Courier New" panose="02070309020205020404" pitchFamily="49" charset="0"/>
+              </a:rPr>
+              <a:t>R1-10, 15-19:	</a:t>
+            </a:r>
+            <a:r>
+              <a:rPr lang="en-US" b="1" dirty="0" smtClean="0">
+                <a:latin typeface="Courier New" panose="02070309020205020404" pitchFamily="49" charset="0"/>
+                <a:cs typeface="Courier New" panose="02070309020205020404" pitchFamily="49" charset="0"/>
+              </a:rPr>
+              <a:t>   47kΩ</a:t>
+            </a:r>
+            <a:endParaRPr lang="en-US" b="1" dirty="0">
+              <a:latin typeface="Courier New" panose="02070309020205020404" pitchFamily="49" charset="0"/>
+              <a:cs typeface="Courier New" panose="02070309020205020404" pitchFamily="49" charset="0"/>
+            </a:endParaRPr>
+          </a:p>
+          <a:p>
+            <a:r>
+              <a:rPr lang="en-US" b="1" dirty="0">
+                <a:latin typeface="Courier New" panose="02070309020205020404" pitchFamily="49" charset="0"/>
+                <a:cs typeface="Courier New" panose="02070309020205020404" pitchFamily="49" charset="0"/>
+              </a:rPr>
+              <a:t>R25, 26:	</a:t>
+            </a:r>
+            <a:r>
+              <a:rPr lang="en-US" b="1" dirty="0" smtClean="0">
+                <a:latin typeface="Courier New" panose="02070309020205020404" pitchFamily="49" charset="0"/>
+                <a:cs typeface="Courier New" panose="02070309020205020404" pitchFamily="49" charset="0"/>
+              </a:rPr>
+              <a:t>   47kΩ</a:t>
+            </a:r>
+            <a:endParaRPr lang="en-US" b="1" dirty="0">
+              <a:latin typeface="Courier New" panose="02070309020205020404" pitchFamily="49" charset="0"/>
+              <a:cs typeface="Courier New" panose="02070309020205020404" pitchFamily="49" charset="0"/>
+            </a:endParaRPr>
+          </a:p>
+          <a:p>
+            <a:r>
+              <a:rPr lang="en-US" b="1" dirty="0" smtClean="0">
+                <a:latin typeface="Courier New" panose="02070309020205020404" pitchFamily="49" charset="0"/>
+                <a:cs typeface="Courier New" panose="02070309020205020404" pitchFamily="49" charset="0"/>
+              </a:rPr>
+              <a:t>R11-14:</a:t>
+            </a:r>
+            <a:r>
+              <a:rPr lang="en-US" b="1" dirty="0">
+                <a:latin typeface="Courier New" panose="02070309020205020404" pitchFamily="49" charset="0"/>
+                <a:cs typeface="Courier New" panose="02070309020205020404" pitchFamily="49" charset="0"/>
+              </a:rPr>
+              <a:t>	</a:t>
+            </a:r>
+            <a:r>
+              <a:rPr lang="en-US" b="1" dirty="0" smtClean="0">
+                <a:latin typeface="Courier New" panose="02070309020205020404" pitchFamily="49" charset="0"/>
+                <a:cs typeface="Courier New" panose="02070309020205020404" pitchFamily="49" charset="0"/>
+              </a:rPr>
+              <a:t>   220kΩ</a:t>
+            </a:r>
+            <a:endParaRPr lang="en-US" b="1" dirty="0">
+              <a:latin typeface="Courier New" panose="02070309020205020404" pitchFamily="49" charset="0"/>
+              <a:cs typeface="Courier New" panose="02070309020205020404" pitchFamily="49" charset="0"/>
+            </a:endParaRPr>
+          </a:p>
+          <a:p>
+            <a:r>
+              <a:rPr lang="en-US" b="1" dirty="0">
+                <a:latin typeface="Courier New" panose="02070309020205020404" pitchFamily="49" charset="0"/>
+                <a:cs typeface="Courier New" panose="02070309020205020404" pitchFamily="49" charset="0"/>
+              </a:rPr>
+              <a:t>R20-22:	</a:t>
+            </a:r>
+            <a:r>
+              <a:rPr lang="en-US" b="1" dirty="0" smtClean="0">
+                <a:latin typeface="Courier New" panose="02070309020205020404" pitchFamily="49" charset="0"/>
+                <a:cs typeface="Courier New" panose="02070309020205020404" pitchFamily="49" charset="0"/>
+              </a:rPr>
+              <a:t>   100Ω</a:t>
+            </a:r>
+            <a:endParaRPr lang="en-US" b="1" dirty="0">
+              <a:latin typeface="Courier New" panose="02070309020205020404" pitchFamily="49" charset="0"/>
+              <a:cs typeface="Courier New" panose="02070309020205020404" pitchFamily="49" charset="0"/>
+            </a:endParaRPr>
+          </a:p>
+          <a:p>
+            <a:r>
+              <a:rPr lang="en-US" b="1" dirty="0">
+                <a:latin typeface="Courier New" panose="02070309020205020404" pitchFamily="49" charset="0"/>
+                <a:cs typeface="Courier New" panose="02070309020205020404" pitchFamily="49" charset="0"/>
+              </a:rPr>
+              <a:t>R23:		</a:t>
+            </a:r>
+            <a:r>
+              <a:rPr lang="en-US" b="1" dirty="0" smtClean="0">
+                <a:latin typeface="Courier New" panose="02070309020205020404" pitchFamily="49" charset="0"/>
+                <a:cs typeface="Courier New" panose="02070309020205020404" pitchFamily="49" charset="0"/>
+              </a:rPr>
+              <a:t>   22kΩ</a:t>
+            </a:r>
+            <a:endParaRPr lang="en-US" b="1" dirty="0">
+              <a:latin typeface="Courier New" panose="02070309020205020404" pitchFamily="49" charset="0"/>
+              <a:cs typeface="Courier New" panose="02070309020205020404" pitchFamily="49" charset="0"/>
+            </a:endParaRPr>
+          </a:p>
+          <a:p>
+            <a:r>
+              <a:rPr lang="en-US" b="1" dirty="0">
+                <a:latin typeface="Courier New" panose="02070309020205020404" pitchFamily="49" charset="0"/>
+                <a:cs typeface="Courier New" panose="02070309020205020404" pitchFamily="49" charset="0"/>
+              </a:rPr>
+              <a:t>R24, 28:	</a:t>
+            </a:r>
+            <a:r>
+              <a:rPr lang="en-US" b="1" dirty="0" smtClean="0">
+                <a:latin typeface="Courier New" panose="02070309020205020404" pitchFamily="49" charset="0"/>
+                <a:cs typeface="Courier New" panose="02070309020205020404" pitchFamily="49" charset="0"/>
+              </a:rPr>
+              <a:t>   330Ω</a:t>
+            </a:r>
+          </a:p>
+          <a:p>
+            <a:r>
+              <a:rPr lang="en-US" b="1" dirty="0" smtClean="0">
+                <a:latin typeface="Courier New" panose="02070309020205020404" pitchFamily="49" charset="0"/>
+                <a:cs typeface="Courier New" panose="02070309020205020404" pitchFamily="49" charset="0"/>
+              </a:rPr>
+              <a:t>R27:		   100kΩ</a:t>
+            </a:r>
+            <a:endParaRPr lang="en-US" b="1" dirty="0">
+              <a:latin typeface="Courier New" panose="02070309020205020404" pitchFamily="49" charset="0"/>
+              <a:cs typeface="Courier New" panose="02070309020205020404" pitchFamily="49" charset="0"/>
+            </a:endParaRPr>
           </a:p>
         </p:txBody>
       </p:sp>
@@ -3808,4 +5165,265 @@
     </a:ext>
   </a:extLst>
 </a:theme>
+</file>
+
+<file path=ppt/theme/theme2.xml><?xml version="1.0" encoding="utf-8"?>
+<a:theme xmlns:a="http://schemas.openxmlformats.org/drawingml/2006/main" name="Office Theme">
+  <a:themeElements>
+    <a:clrScheme name="Office">
+      <a:dk1>
+        <a:sysClr val="windowText" lastClr="000000"/>
+      </a:dk1>
+      <a:lt1>
+        <a:sysClr val="window" lastClr="FFFFFF"/>
+      </a:lt1>
+      <a:dk2>
+        <a:srgbClr val="44546A"/>
+      </a:dk2>
+      <a:lt2>
+        <a:srgbClr val="E7E6E6"/>
+      </a:lt2>
+      <a:accent1>
+        <a:srgbClr val="4472C4"/>
+      </a:accent1>
+      <a:accent2>
+        <a:srgbClr val="ED7D31"/>
+      </a:accent2>
+      <a:accent3>
+        <a:srgbClr val="A5A5A5"/>
+      </a:accent3>
+      <a:accent4>
+        <a:srgbClr val="FFC000"/>
+      </a:accent4>
+      <a:accent5>
+        <a:srgbClr val="5B9BD5"/>
+      </a:accent5>
+      <a:accent6>
+        <a:srgbClr val="70AD47"/>
+      </a:accent6>
+      <a:hlink>
+        <a:srgbClr val="0563C1"/>
+      </a:hlink>
+      <a:folHlink>
+        <a:srgbClr val="954F72"/>
+      </a:folHlink>
+    </a:clrScheme>
+    <a:fontScheme name="Office">
+      <a:majorFont>
+        <a:latin typeface="Calibri Light" panose="020F0302020204030204"/>
+        <a:ea typeface=""/>
+        <a:cs typeface=""/>
+        <a:font script="Jpan" typeface="Yu Gothic Light"/>
+        <a:font script="Hang" typeface="맑은 고딕"/>
+        <a:font script="Hans" typeface="DengXian Light"/>
+        <a:font script="Hant" typeface="新細明體"/>
+        <a:font script="Arab" typeface="Times New Roman"/>
+        <a:font script="Hebr" typeface="Times New Roman"/>
+        <a:font script="Thai" typeface="Angsana New"/>
+        <a:font script="Ethi" typeface="Nyala"/>
+        <a:font script="Beng" typeface="Vrinda"/>
+        <a:font script="Gujr" typeface="Shruti"/>
+        <a:font script="Khmr" typeface="MoolBoran"/>
+        <a:font script="Knda" typeface="Tunga"/>
+        <a:font script="Guru" typeface="Raavi"/>
+        <a:font script="Cans" typeface="Euphemia"/>
+        <a:font script="Cher" typeface="Plantagenet Cherokee"/>
+        <a:font script="Yiii" typeface="Microsoft Yi Baiti"/>
+        <a:font script="Tibt" typeface="Microsoft Himalaya"/>
+        <a:font script="Thaa" typeface="MV Boli"/>
+        <a:font script="Deva" typeface="Mangal"/>
+        <a:font script="Telu" typeface="Gautami"/>
+        <a:font script="Taml" typeface="Latha"/>
+        <a:font script="Syrc" typeface="Estrangelo Edessa"/>
+        <a:font script="Orya" typeface="Kalinga"/>
+        <a:font script="Mlym" typeface="Kartika"/>
+        <a:font script="Laoo" typeface="DokChampa"/>
+        <a:font script="Sinh" typeface="Iskoola Pota"/>
+        <a:font script="Mong" typeface="Mongolian Baiti"/>
+        <a:font script="Viet" typeface="Times New Roman"/>
+        <a:font script="Uigh" typeface="Microsoft Uighur"/>
+        <a:font script="Geor" typeface="Sylfaen"/>
+      </a:majorFont>
+      <a:minorFont>
+        <a:latin typeface="Calibri" panose="020F0502020204030204"/>
+        <a:ea typeface=""/>
+        <a:cs typeface=""/>
+        <a:font script="Jpan" typeface="Yu Gothic"/>
+        <a:font script="Hang" typeface="맑은 고딕"/>
+        <a:font script="Hans" typeface="DengXian"/>
+        <a:font script="Hant" typeface="新細明體"/>
+        <a:font script="Arab" typeface="Arial"/>
+        <a:font script="Hebr" typeface="Arial"/>
+        <a:font script="Thai" typeface="Cordia New"/>
+        <a:font script="Ethi" typeface="Nyala"/>
+        <a:font script="Beng" typeface="Vrinda"/>
+        <a:font script="Gujr" typeface="Shruti"/>
+        <a:font script="Khmr" typeface="DaunPenh"/>
+        <a:font script="Knda" typeface="Tunga"/>
+        <a:font script="Guru" typeface="Raavi"/>
+        <a:font script="Cans" typeface="Euphemia"/>
+        <a:font script="Cher" typeface="Plantagenet Cherokee"/>
+        <a:font script="Yiii" typeface="Microsoft Yi Baiti"/>
+        <a:font script="Tibt" typeface="Microsoft Himalaya"/>
+        <a:font script="Thaa" typeface="MV Boli"/>
+        <a:font script="Deva" typeface="Mangal"/>
+        <a:font script="Telu" typeface="Gautami"/>
+        <a:font script="Taml" typeface="Latha"/>
+        <a:font script="Syrc" typeface="Estrangelo Edessa"/>
+        <a:font script="Orya" typeface="Kalinga"/>
+        <a:font script="Mlym" typeface="Kartika"/>
+        <a:font script="Laoo" typeface="DokChampa"/>
+        <a:font script="Sinh" typeface="Iskoola Pota"/>
+        <a:font script="Mong" typeface="Mongolian Baiti"/>
+        <a:font script="Viet" typeface="Arial"/>
+        <a:font script="Uigh" typeface="Microsoft Uighur"/>
+        <a:font script="Geor" typeface="Sylfaen"/>
+      </a:minorFont>
+    </a:fontScheme>
+    <a:fmtScheme name="Office">
+      <a:fillStyleLst>
+        <a:solidFill>
+          <a:schemeClr val="phClr"/>
+        </a:solidFill>
+        <a:gradFill rotWithShape="1">
+          <a:gsLst>
+            <a:gs pos="0">
+              <a:schemeClr val="phClr">
+                <a:lumMod val="110000"/>
+                <a:satMod val="105000"/>
+                <a:tint val="67000"/>
+              </a:schemeClr>
+            </a:gs>
+            <a:gs pos="50000">
+              <a:schemeClr val="phClr">
+                <a:lumMod val="105000"/>
+                <a:satMod val="103000"/>
+                <a:tint val="73000"/>
+              </a:schemeClr>
+            </a:gs>
+            <a:gs pos="100000">
+              <a:schemeClr val="phClr">
+                <a:lumMod val="105000"/>
+                <a:satMod val="109000"/>
+                <a:tint val="81000"/>
+              </a:schemeClr>
+            </a:gs>
+          </a:gsLst>
+          <a:lin ang="5400000" scaled="0"/>
+        </a:gradFill>
+        <a:gradFill rotWithShape="1">
+          <a:gsLst>
+            <a:gs pos="0">
+              <a:schemeClr val="phClr">
+                <a:satMod val="103000"/>
+                <a:lumMod val="102000"/>
+                <a:tint val="94000"/>
+              </a:schemeClr>
+            </a:gs>
+            <a:gs pos="50000">
+              <a:schemeClr val="phClr">
+                <a:satMod val="110000"/>
+                <a:lumMod val="100000"/>
+                <a:shade val="100000"/>
+              </a:schemeClr>
+            </a:gs>
+            <a:gs pos="100000">
+              <a:schemeClr val="phClr">
+                <a:lumMod val="99000"/>
+                <a:satMod val="120000"/>
+                <a:shade val="78000"/>
+              </a:schemeClr>
+            </a:gs>
+          </a:gsLst>
+          <a:lin ang="5400000" scaled="0"/>
+        </a:gradFill>
+      </a:fillStyleLst>
+      <a:lnStyleLst>
+        <a:ln w="6350" cap="flat" cmpd="sng" algn="ctr">
+          <a:solidFill>
+            <a:schemeClr val="phClr"/>
+          </a:solidFill>
+          <a:prstDash val="solid"/>
+          <a:miter lim="800000"/>
+        </a:ln>
+        <a:ln w="12700" cap="flat" cmpd="sng" algn="ctr">
+          <a:solidFill>
+            <a:schemeClr val="phClr"/>
+          </a:solidFill>
+          <a:prstDash val="solid"/>
+          <a:miter lim="800000"/>
+        </a:ln>
+        <a:ln w="19050" cap="flat" cmpd="sng" algn="ctr">
+          <a:solidFill>
+            <a:schemeClr val="phClr"/>
+          </a:solidFill>
+          <a:prstDash val="solid"/>
+          <a:miter lim="800000"/>
+        </a:ln>
+      </a:lnStyleLst>
+      <a:effectStyleLst>
+        <a:effectStyle>
+          <a:effectLst/>
+        </a:effectStyle>
+        <a:effectStyle>
+          <a:effectLst/>
+        </a:effectStyle>
+        <a:effectStyle>
+          <a:effectLst>
+            <a:outerShdw blurRad="57150" dist="19050" dir="5400000" algn="ctr" rotWithShape="0">
+              <a:srgbClr val="000000">
+                <a:alpha val="63000"/>
+              </a:srgbClr>
+            </a:outerShdw>
+          </a:effectLst>
+        </a:effectStyle>
+      </a:effectStyleLst>
+      <a:bgFillStyleLst>
+        <a:solidFill>
+          <a:schemeClr val="phClr"/>
+        </a:solidFill>
+        <a:solidFill>
+          <a:schemeClr val="phClr">
+            <a:tint val="95000"/>
+            <a:satMod val="170000"/>
+          </a:schemeClr>
+        </a:solidFill>
+        <a:gradFill rotWithShape="1">
+          <a:gsLst>
+            <a:gs pos="0">
+              <a:schemeClr val="phClr">
+                <a:tint val="93000"/>
+                <a:satMod val="150000"/>
+                <a:shade val="98000"/>
+                <a:lumMod val="102000"/>
+              </a:schemeClr>
+            </a:gs>
+            <a:gs pos="50000">
+              <a:schemeClr val="phClr">
+                <a:tint val="98000"/>
+                <a:satMod val="130000"/>
+                <a:shade val="90000"/>
+                <a:lumMod val="103000"/>
+              </a:schemeClr>
+            </a:gs>
+            <a:gs pos="100000">
+              <a:schemeClr val="phClr">
+                <a:shade val="63000"/>
+                <a:satMod val="120000"/>
+              </a:schemeClr>
+            </a:gs>
+          </a:gsLst>
+          <a:lin ang="5400000" scaled="0"/>
+        </a:gradFill>
+      </a:bgFillStyleLst>
+    </a:fmtScheme>
+  </a:themeElements>
+  <a:objectDefaults/>
+  <a:extraClrSchemeLst/>
+  <a:extLst>
+    <a:ext uri="{05A4C25C-085E-4340-85A3-A5531E510DB2}">
+      <thm15:themeFamily xmlns:thm15="http://schemas.microsoft.com/office/thememl/2012/main" name="Office Theme" id="{62F939B6-93AF-4DB8-9C6B-D6C7DFDC589F}" vid="{4A3C46E8-61CC-4603-A589-7422A47A8E4A}"/>
+    </a:ext>
+  </a:extLst>
+</a:theme>
 </file>
</xml_diff>

<commit_message>
New speaker stuff, pin 1 label, updated text, caps everywhere
</commit_message>
<xml_diff>
--- a/images.pptx
+++ b/images.pptx
@@ -199,7 +199,7 @@
           <a:p>
             <a:fld id="{989E12F8-4E6E-9F47-809F-90362755178F}" type="datetimeFigureOut">
               <a:rPr lang="en-US" smtClean="0"/>
-              <a:t>4/28/17</a:t>
+              <a:t>5/6/17</a:t>
             </a:fld>
             <a:endParaRPr lang="en-US"/>
           </a:p>
@@ -596,7 +596,7 @@
           <a:p>
             <a:fld id="{56032651-1328-4865-BAD1-4C12A4D92860}" type="datetimeFigureOut">
               <a:rPr lang="en-US" smtClean="0"/>
-              <a:t>4/28/17</a:t>
+              <a:t>5/6/17</a:t>
             </a:fld>
             <a:endParaRPr lang="en-US"/>
           </a:p>
@@ -764,7 +764,7 @@
           <a:p>
             <a:fld id="{56032651-1328-4865-BAD1-4C12A4D92860}" type="datetimeFigureOut">
               <a:rPr lang="en-US" smtClean="0"/>
-              <a:t>4/28/17</a:t>
+              <a:t>5/6/17</a:t>
             </a:fld>
             <a:endParaRPr lang="en-US"/>
           </a:p>
@@ -942,7 +942,7 @@
           <a:p>
             <a:fld id="{56032651-1328-4865-BAD1-4C12A4D92860}" type="datetimeFigureOut">
               <a:rPr lang="en-US" smtClean="0"/>
-              <a:t>4/28/17</a:t>
+              <a:t>5/6/17</a:t>
             </a:fld>
             <a:endParaRPr lang="en-US"/>
           </a:p>
@@ -1110,7 +1110,7 @@
           <a:p>
             <a:fld id="{56032651-1328-4865-BAD1-4C12A4D92860}" type="datetimeFigureOut">
               <a:rPr lang="en-US" smtClean="0"/>
-              <a:t>4/28/17</a:t>
+              <a:t>5/6/17</a:t>
             </a:fld>
             <a:endParaRPr lang="en-US"/>
           </a:p>
@@ -1355,7 +1355,7 @@
           <a:p>
             <a:fld id="{56032651-1328-4865-BAD1-4C12A4D92860}" type="datetimeFigureOut">
               <a:rPr lang="en-US" smtClean="0"/>
-              <a:t>4/28/17</a:t>
+              <a:t>5/6/17</a:t>
             </a:fld>
             <a:endParaRPr lang="en-US"/>
           </a:p>
@@ -1584,7 +1584,7 @@
           <a:p>
             <a:fld id="{56032651-1328-4865-BAD1-4C12A4D92860}" type="datetimeFigureOut">
               <a:rPr lang="en-US" smtClean="0"/>
-              <a:t>4/28/17</a:t>
+              <a:t>5/6/17</a:t>
             </a:fld>
             <a:endParaRPr lang="en-US"/>
           </a:p>
@@ -1948,7 +1948,7 @@
           <a:p>
             <a:fld id="{56032651-1328-4865-BAD1-4C12A4D92860}" type="datetimeFigureOut">
               <a:rPr lang="en-US" smtClean="0"/>
-              <a:t>4/28/17</a:t>
+              <a:t>5/6/17</a:t>
             </a:fld>
             <a:endParaRPr lang="en-US"/>
           </a:p>
@@ -2065,7 +2065,7 @@
           <a:p>
             <a:fld id="{56032651-1328-4865-BAD1-4C12A4D92860}" type="datetimeFigureOut">
               <a:rPr lang="en-US" smtClean="0"/>
-              <a:t>4/28/17</a:t>
+              <a:t>5/6/17</a:t>
             </a:fld>
             <a:endParaRPr lang="en-US"/>
           </a:p>
@@ -2160,7 +2160,7 @@
           <a:p>
             <a:fld id="{56032651-1328-4865-BAD1-4C12A4D92860}" type="datetimeFigureOut">
               <a:rPr lang="en-US" smtClean="0"/>
-              <a:t>4/28/17</a:t>
+              <a:t>5/6/17</a:t>
             </a:fld>
             <a:endParaRPr lang="en-US"/>
           </a:p>
@@ -2435,7 +2435,7 @@
           <a:p>
             <a:fld id="{56032651-1328-4865-BAD1-4C12A4D92860}" type="datetimeFigureOut">
               <a:rPr lang="en-US" smtClean="0"/>
-              <a:t>4/28/17</a:t>
+              <a:t>5/6/17</a:t>
             </a:fld>
             <a:endParaRPr lang="en-US"/>
           </a:p>
@@ -2687,7 +2687,7 @@
           <a:p>
             <a:fld id="{56032651-1328-4865-BAD1-4C12A4D92860}" type="datetimeFigureOut">
               <a:rPr lang="en-US" smtClean="0"/>
-              <a:t>4/28/17</a:t>
+              <a:t>5/6/17</a:t>
             </a:fld>
             <a:endParaRPr lang="en-US"/>
           </a:p>
@@ -2898,7 +2898,7 @@
           <a:p>
             <a:fld id="{56032651-1328-4865-BAD1-4C12A4D92860}" type="datetimeFigureOut">
               <a:rPr lang="en-US" smtClean="0"/>
-              <a:t>4/28/17</a:t>
+              <a:t>5/6/17</a:t>
             </a:fld>
             <a:endParaRPr lang="en-US"/>
           </a:p>
@@ -3824,14 +3824,7 @@
                 <a:latin typeface="Courier New" panose="02070309020205020404" pitchFamily="49" charset="0"/>
                 <a:cs typeface="Courier New" panose="02070309020205020404" pitchFamily="49" charset="0"/>
               </a:rPr>
-              <a:t>  8 </a:t>
-            </a:r>
-            <a:r>
-              <a:rPr lang="en-US" b="1" dirty="0" smtClean="0">
-                <a:latin typeface="Courier New" panose="02070309020205020404" pitchFamily="49" charset="0"/>
-                <a:cs typeface="Courier New" panose="02070309020205020404" pitchFamily="49" charset="0"/>
-              </a:rPr>
-              <a:t>14 </a:t>
+              <a:t>  8 14 </a:t>
             </a:r>
             <a:r>
               <a:rPr lang="en-US" b="1" dirty="0">
@@ -3847,14 +3840,7 @@
                 <a:latin typeface="Courier New" panose="02070309020205020404" pitchFamily="49" charset="0"/>
                 <a:cs typeface="Courier New" panose="02070309020205020404" pitchFamily="49" charset="0"/>
               </a:rPr>
-              <a:t> 10 </a:t>
-            </a:r>
-            <a:r>
-              <a:rPr lang="en-US" b="1" dirty="0" smtClean="0">
-                <a:latin typeface="Courier New" panose="02070309020205020404" pitchFamily="49" charset="0"/>
-                <a:cs typeface="Courier New" panose="02070309020205020404" pitchFamily="49" charset="0"/>
-              </a:rPr>
-              <a:t>15 </a:t>
+              <a:t> 10 15 </a:t>
             </a:r>
             <a:r>
               <a:rPr lang="en-US" b="1" dirty="0">
@@ -3870,14 +3856,7 @@
                 <a:latin typeface="Courier New" panose="02070309020205020404" pitchFamily="49" charset="0"/>
                 <a:cs typeface="Courier New" panose="02070309020205020404" pitchFamily="49" charset="0"/>
               </a:rPr>
-              <a:t> 36 </a:t>
-            </a:r>
-            <a:r>
-              <a:rPr lang="en-US" b="1" dirty="0" smtClean="0">
-                <a:latin typeface="Courier New" panose="02070309020205020404" pitchFamily="49" charset="0"/>
-                <a:cs typeface="Courier New" panose="02070309020205020404" pitchFamily="49" charset="0"/>
-              </a:rPr>
-              <a:t>16 </a:t>
+              <a:t> 36 16 </a:t>
             </a:r>
             <a:r>
               <a:rPr lang="en-US" b="1" dirty="0">
@@ -3893,14 +3872,7 @@
                 <a:latin typeface="Courier New" panose="02070309020205020404" pitchFamily="49" charset="0"/>
                 <a:cs typeface="Courier New" panose="02070309020205020404" pitchFamily="49" charset="0"/>
               </a:rPr>
-              <a:t> 11 </a:t>
-            </a:r>
-            <a:r>
-              <a:rPr lang="en-US" b="1" dirty="0" smtClean="0">
-                <a:latin typeface="Courier New" panose="02070309020205020404" pitchFamily="49" charset="0"/>
-                <a:cs typeface="Courier New" panose="02070309020205020404" pitchFamily="49" charset="0"/>
-              </a:rPr>
-              <a:t>17 </a:t>
+              <a:t> 11 17 </a:t>
             </a:r>
             <a:r>
               <a:rPr lang="en-US" b="1" dirty="0">
@@ -3916,14 +3888,7 @@
                 <a:latin typeface="Courier New" panose="02070309020205020404" pitchFamily="49" charset="0"/>
                 <a:cs typeface="Courier New" panose="02070309020205020404" pitchFamily="49" charset="0"/>
               </a:rPr>
-              <a:t> 12 </a:t>
-            </a:r>
-            <a:r>
-              <a:rPr lang="en-US" b="1" dirty="0" smtClean="0">
-                <a:latin typeface="Courier New" panose="02070309020205020404" pitchFamily="49" charset="0"/>
-                <a:cs typeface="Courier New" panose="02070309020205020404" pitchFamily="49" charset="0"/>
-              </a:rPr>
-              <a:t>18 </a:t>
+              <a:t> 12 18 </a:t>
             </a:r>
             <a:r>
               <a:rPr lang="en-US" b="1" dirty="0">
@@ -3939,14 +3904,7 @@
                 <a:latin typeface="Courier New" panose="02070309020205020404" pitchFamily="49" charset="0"/>
                 <a:cs typeface="Courier New" panose="02070309020205020404" pitchFamily="49" charset="0"/>
               </a:rPr>
-              <a:t> 35 </a:t>
-            </a:r>
-            <a:r>
-              <a:rPr lang="en-US" b="1" dirty="0" smtClean="0">
-                <a:latin typeface="Courier New" panose="02070309020205020404" pitchFamily="49" charset="0"/>
-                <a:cs typeface="Courier New" panose="02070309020205020404" pitchFamily="49" charset="0"/>
-              </a:rPr>
-              <a:t>19 </a:t>
+              <a:t> 35 19 </a:t>
             </a:r>
             <a:r>
               <a:rPr lang="en-US" b="1" dirty="0">
@@ -3962,14 +3920,7 @@
                 <a:latin typeface="Courier New" panose="02070309020205020404" pitchFamily="49" charset="0"/>
                 <a:cs typeface="Courier New" panose="02070309020205020404" pitchFamily="49" charset="0"/>
               </a:rPr>
-              <a:t> 38 </a:t>
-            </a:r>
-            <a:r>
-              <a:rPr lang="en-US" b="1" dirty="0" smtClean="0">
-                <a:latin typeface="Courier New" panose="02070309020205020404" pitchFamily="49" charset="0"/>
-                <a:cs typeface="Courier New" panose="02070309020205020404" pitchFamily="49" charset="0"/>
-              </a:rPr>
-              <a:t>20 </a:t>
+              <a:t> 38 20 </a:t>
             </a:r>
             <a:r>
               <a:rPr lang="en-US" b="1" dirty="0">
@@ -3985,14 +3936,7 @@
                 <a:latin typeface="Courier New" panose="02070309020205020404" pitchFamily="49" charset="0"/>
                 <a:cs typeface="Courier New" panose="02070309020205020404" pitchFamily="49" charset="0"/>
               </a:rPr>
-              <a:t> 40 </a:t>
-            </a:r>
-            <a:r>
-              <a:rPr lang="en-US" b="1" dirty="0" smtClean="0">
-                <a:latin typeface="Courier New" panose="02070309020205020404" pitchFamily="49" charset="0"/>
-                <a:cs typeface="Courier New" panose="02070309020205020404" pitchFamily="49" charset="0"/>
-              </a:rPr>
-              <a:t>21 </a:t>
+              <a:t> 40 21 </a:t>
             </a:r>
             <a:r>
               <a:rPr lang="en-US" b="1" dirty="0">
@@ -4008,14 +3952,7 @@
                 <a:latin typeface="Courier New" panose="02070309020205020404" pitchFamily="49" charset="0"/>
                 <a:cs typeface="Courier New" panose="02070309020205020404" pitchFamily="49" charset="0"/>
               </a:rPr>
-              <a:t> 15 </a:t>
-            </a:r>
-            <a:r>
-              <a:rPr lang="en-US" b="1" dirty="0" smtClean="0">
-                <a:latin typeface="Courier New" panose="02070309020205020404" pitchFamily="49" charset="0"/>
-                <a:cs typeface="Courier New" panose="02070309020205020404" pitchFamily="49" charset="0"/>
-              </a:rPr>
-              <a:t>22 </a:t>
+              <a:t> 15 22 </a:t>
             </a:r>
             <a:r>
               <a:rPr lang="en-US" b="1" dirty="0">
@@ -4031,14 +3968,7 @@
                 <a:latin typeface="Courier New" panose="02070309020205020404" pitchFamily="49" charset="0"/>
                 <a:cs typeface="Courier New" panose="02070309020205020404" pitchFamily="49" charset="0"/>
               </a:rPr>
-              <a:t> 16 </a:t>
-            </a:r>
-            <a:r>
-              <a:rPr lang="en-US" b="1" dirty="0" smtClean="0">
-                <a:latin typeface="Courier New" panose="02070309020205020404" pitchFamily="49" charset="0"/>
-                <a:cs typeface="Courier New" panose="02070309020205020404" pitchFamily="49" charset="0"/>
-              </a:rPr>
-              <a:t>23 </a:t>
+              <a:t> 16 23 </a:t>
             </a:r>
             <a:r>
               <a:rPr lang="en-US" b="1" dirty="0">
@@ -4054,14 +3984,7 @@
                 <a:latin typeface="Courier New" panose="02070309020205020404" pitchFamily="49" charset="0"/>
                 <a:cs typeface="Courier New" panose="02070309020205020404" pitchFamily="49" charset="0"/>
               </a:rPr>
-              <a:t> 18 </a:t>
-            </a:r>
-            <a:r>
-              <a:rPr lang="en-US" b="1" dirty="0" smtClean="0">
-                <a:latin typeface="Courier New" panose="02070309020205020404" pitchFamily="49" charset="0"/>
-                <a:cs typeface="Courier New" panose="02070309020205020404" pitchFamily="49" charset="0"/>
-              </a:rPr>
-              <a:t>24 </a:t>
+              <a:t> 18 24 </a:t>
             </a:r>
             <a:r>
               <a:rPr lang="en-US" b="1" dirty="0">
@@ -4077,14 +4000,7 @@
                 <a:latin typeface="Courier New" panose="02070309020205020404" pitchFamily="49" charset="0"/>
                 <a:cs typeface="Courier New" panose="02070309020205020404" pitchFamily="49" charset="0"/>
               </a:rPr>
-              <a:t> 22 </a:t>
-            </a:r>
-            <a:r>
-              <a:rPr lang="en-US" b="1" dirty="0" smtClean="0">
-                <a:latin typeface="Courier New" panose="02070309020205020404" pitchFamily="49" charset="0"/>
-                <a:cs typeface="Courier New" panose="02070309020205020404" pitchFamily="49" charset="0"/>
-              </a:rPr>
-              <a:t>25 </a:t>
+              <a:t> 22 25 </a:t>
             </a:r>
             <a:r>
               <a:rPr lang="en-US" b="1" dirty="0">
@@ -4100,14 +4016,7 @@
                 <a:latin typeface="Courier New" panose="02070309020205020404" pitchFamily="49" charset="0"/>
                 <a:cs typeface="Courier New" panose="02070309020205020404" pitchFamily="49" charset="0"/>
               </a:rPr>
-              <a:t> 37 </a:t>
-            </a:r>
-            <a:r>
-              <a:rPr lang="en-US" b="1" dirty="0" smtClean="0">
-                <a:latin typeface="Courier New" panose="02070309020205020404" pitchFamily="49" charset="0"/>
-                <a:cs typeface="Courier New" panose="02070309020205020404" pitchFamily="49" charset="0"/>
-              </a:rPr>
-              <a:t>26 </a:t>
+              <a:t> 37 26 </a:t>
             </a:r>
             <a:r>
               <a:rPr lang="en-US" b="1" dirty="0">
@@ -4123,14 +4032,7 @@
                 <a:latin typeface="Courier New" panose="02070309020205020404" pitchFamily="49" charset="0"/>
                 <a:cs typeface="Courier New" panose="02070309020205020404" pitchFamily="49" charset="0"/>
               </a:rPr>
-              <a:t> 13 </a:t>
-            </a:r>
-            <a:r>
-              <a:rPr lang="en-US" b="1" dirty="0" smtClean="0">
-                <a:latin typeface="Courier New" panose="02070309020205020404" pitchFamily="49" charset="0"/>
-                <a:cs typeface="Courier New" panose="02070309020205020404" pitchFamily="49" charset="0"/>
-              </a:rPr>
-              <a:t>27 </a:t>
+              <a:t> 13 27 </a:t>
             </a:r>
             <a:r>
               <a:rPr lang="en-US" b="1" dirty="0">
@@ -4449,7 +4351,7 @@
         <p:spPr>
           <a:xfrm>
             <a:off x="8569236" y="1332653"/>
-            <a:ext cx="2395126" cy="1200329"/>
+            <a:ext cx="2395126" cy="1477328"/>
           </a:xfrm>
           <a:prstGeom prst="rect">
             <a:avLst/>
@@ -4494,15 +4396,42 @@
                 <a:latin typeface="Courier New" panose="02070309020205020404" pitchFamily="49" charset="0"/>
                 <a:cs typeface="Courier New" panose="02070309020205020404" pitchFamily="49" charset="0"/>
               </a:rPr>
-              <a:t> 6 - </a:t>
-            </a:r>
-            <a:r>
-              <a:rPr lang="en-US" b="1" dirty="0">
-                <a:latin typeface="Courier New" panose="02070309020205020404" pitchFamily="49" charset="0"/>
-                <a:cs typeface="Courier New" panose="02070309020205020404" pitchFamily="49" charset="0"/>
-              </a:rPr>
-              <a:t>GND</a:t>
-            </a:r>
+              <a:t> 6 </a:t>
+            </a:r>
+            <a:r>
+              <a:rPr lang="mr-IN" b="1" dirty="0" smtClean="0">
+                <a:latin typeface="Courier New" panose="02070309020205020404" pitchFamily="49" charset="0"/>
+                <a:cs typeface="Courier New" panose="02070309020205020404" pitchFamily="49" charset="0"/>
+              </a:rPr>
+              <a:t>–</a:t>
+            </a:r>
+            <a:r>
+              <a:rPr lang="en-US" b="1" dirty="0" smtClean="0">
+                <a:latin typeface="Courier New" panose="02070309020205020404" pitchFamily="49" charset="0"/>
+                <a:cs typeface="Courier New" panose="02070309020205020404" pitchFamily="49" charset="0"/>
+              </a:rPr>
+              <a:t> GND</a:t>
+            </a:r>
+          </a:p>
+          <a:p>
+            <a:r>
+              <a:rPr lang="en-US" b="1" dirty="0">
+                <a:latin typeface="Courier New" panose="02070309020205020404" pitchFamily="49" charset="0"/>
+                <a:cs typeface="Courier New" panose="02070309020205020404" pitchFamily="49" charset="0"/>
+              </a:rPr>
+              <a:t> </a:t>
+            </a:r>
+            <a:r>
+              <a:rPr lang="en-US" b="1" dirty="0" smtClean="0">
+                <a:latin typeface="Courier New" panose="02070309020205020404" pitchFamily="49" charset="0"/>
+                <a:cs typeface="Courier New" panose="02070309020205020404" pitchFamily="49" charset="0"/>
+              </a:rPr>
+              <a:t>* - 3.3V Logic</a:t>
+            </a:r>
+            <a:endParaRPr lang="en-US" b="1" dirty="0">
+              <a:latin typeface="Courier New" panose="02070309020205020404" pitchFamily="49" charset="0"/>
+              <a:cs typeface="Courier New" panose="02070309020205020404" pitchFamily="49" charset="0"/>
+            </a:endParaRPr>
           </a:p>
         </p:txBody>
       </p:sp>
@@ -4545,7 +4474,7 @@
         <p:spPr>
           <a:xfrm>
             <a:off x="4023360" y="1371600"/>
-            <a:ext cx="4003019" cy="3970318"/>
+            <a:ext cx="3961341" cy="4247317"/>
           </a:xfrm>
           <a:prstGeom prst="rect">
             <a:avLst/>
@@ -4563,17 +4492,10 @@
                 <a:latin typeface="Courier New" panose="02070309020205020404" pitchFamily="49" charset="0"/>
                 <a:cs typeface="Courier New" panose="02070309020205020404" pitchFamily="49" charset="0"/>
               </a:rPr>
-              <a:t>C1-5:	</a:t>
-            </a:r>
-            <a:r>
-              <a:rPr lang="en-US" b="1">
-                <a:latin typeface="Courier New" panose="02070309020205020404" pitchFamily="49" charset="0"/>
-                <a:cs typeface="Courier New" panose="02070309020205020404" pitchFamily="49" charset="0"/>
-              </a:rPr>
-              <a:t>	</a:t>
-            </a:r>
-            <a:r>
-              <a:rPr lang="en-US" b="1" smtClean="0">
+              <a:t>C1-5:		</a:t>
+            </a:r>
+            <a:r>
+              <a:rPr lang="en-US" b="1" dirty="0" smtClean="0">
                 <a:latin typeface="Courier New" panose="02070309020205020404" pitchFamily="49" charset="0"/>
                 <a:cs typeface="Courier New" panose="02070309020205020404" pitchFamily="49" charset="0"/>
               </a:rPr>
@@ -4606,11 +4528,18 @@
           </a:p>
           <a:p>
             <a:r>
-              <a:rPr lang="en-US" b="1" dirty="0">
-                <a:latin typeface="Courier New" panose="02070309020205020404" pitchFamily="49" charset="0"/>
-                <a:cs typeface="Courier New" panose="02070309020205020404" pitchFamily="49" charset="0"/>
-              </a:rPr>
-              <a:t>C7-14:		</a:t>
+              <a:rPr lang="en-US" b="1" dirty="0" smtClean="0">
+                <a:latin typeface="Courier New" panose="02070309020205020404" pitchFamily="49" charset="0"/>
+                <a:cs typeface="Courier New" panose="02070309020205020404" pitchFamily="49" charset="0"/>
+              </a:rPr>
+              <a:t>C7-17:</a:t>
+            </a:r>
+            <a:r>
+              <a:rPr lang="en-US" b="1" dirty="0">
+                <a:latin typeface="Courier New" panose="02070309020205020404" pitchFamily="49" charset="0"/>
+                <a:cs typeface="Courier New" panose="02070309020205020404" pitchFamily="49" charset="0"/>
+              </a:rPr>
+              <a:t>		</a:t>
             </a:r>
             <a:r>
               <a:rPr lang="en-US" b="1" dirty="0" smtClean="0">
@@ -4660,11 +4589,18 @@
           </a:p>
           <a:p>
             <a:r>
-              <a:rPr lang="en-US" b="1" dirty="0">
-                <a:latin typeface="Courier New" panose="02070309020205020404" pitchFamily="49" charset="0"/>
-                <a:cs typeface="Courier New" panose="02070309020205020404" pitchFamily="49" charset="0"/>
-              </a:rPr>
-              <a:t>Q1-7:		</a:t>
+              <a:rPr lang="en-US" b="1" dirty="0" smtClean="0">
+                <a:latin typeface="Courier New" panose="02070309020205020404" pitchFamily="49" charset="0"/>
+                <a:cs typeface="Courier New" panose="02070309020205020404" pitchFamily="49" charset="0"/>
+              </a:rPr>
+              <a:t>Q1-7:</a:t>
+            </a:r>
+            <a:r>
+              <a:rPr lang="en-US" b="1" dirty="0">
+                <a:latin typeface="Courier New" panose="02070309020205020404" pitchFamily="49" charset="0"/>
+                <a:cs typeface="Courier New" panose="02070309020205020404" pitchFamily="49" charset="0"/>
+              </a:rPr>
+              <a:t>		</a:t>
             </a:r>
             <a:r>
               <a:rPr lang="en-US" b="1" dirty="0" smtClean="0">
@@ -4694,27 +4630,11 @@
               <a:t>Phototrans</a:t>
             </a:r>
             <a:r>
-              <a:rPr lang="en-US" b="1" dirty="0">
-                <a:latin typeface="Courier New" panose="02070309020205020404" pitchFamily="49" charset="0"/>
-                <a:cs typeface="Courier New" panose="02070309020205020404" pitchFamily="49" charset="0"/>
-              </a:rPr>
-              <a:t>., adj. R27</a:t>
-            </a:r>
-          </a:p>
-          <a:p>
-            <a:r>
-              <a:rPr lang="en-US" b="1" dirty="0">
-                <a:latin typeface="Courier New" panose="02070309020205020404" pitchFamily="49" charset="0"/>
-                <a:cs typeface="Courier New" panose="02070309020205020404" pitchFamily="49" charset="0"/>
-              </a:rPr>
-              <a:t>POT1:		</a:t>
-            </a:r>
-            <a:r>
-              <a:rPr lang="en-US" b="1" dirty="0" smtClean="0">
-                <a:latin typeface="Courier New" panose="02070309020205020404" pitchFamily="49" charset="0"/>
-                <a:cs typeface="Courier New" panose="02070309020205020404" pitchFamily="49" charset="0"/>
-              </a:rPr>
-              <a:t>   10kΩ</a:t>
+              <a:rPr lang="en-US" b="1" dirty="0" smtClean="0">
+                <a:latin typeface="Courier New" panose="02070309020205020404" pitchFamily="49" charset="0"/>
+                <a:cs typeface="Courier New" panose="02070309020205020404" pitchFamily="49" charset="0"/>
+              </a:rPr>
+              <a:t>. R27 Adj.</a:t>
             </a:r>
             <a:endParaRPr lang="en-US" b="1" dirty="0">
               <a:latin typeface="Courier New" panose="02070309020205020404" pitchFamily="49" charset="0"/>
@@ -4727,14 +4647,14 @@
                 <a:latin typeface="Courier New" panose="02070309020205020404" pitchFamily="49" charset="0"/>
                 <a:cs typeface="Courier New" panose="02070309020205020404" pitchFamily="49" charset="0"/>
               </a:rPr>
-              <a:t>R1-10, 15-19:	</a:t>
-            </a:r>
-            <a:r>
-              <a:rPr lang="en-US" b="1" dirty="0" smtClean="0">
-                <a:latin typeface="Courier New" panose="02070309020205020404" pitchFamily="49" charset="0"/>
-                <a:cs typeface="Courier New" panose="02070309020205020404" pitchFamily="49" charset="0"/>
-              </a:rPr>
-              <a:t>   47kΩ</a:t>
+              <a:t>POT1:		</a:t>
+            </a:r>
+            <a:r>
+              <a:rPr lang="en-US" b="1" dirty="0" smtClean="0">
+                <a:latin typeface="Courier New" panose="02070309020205020404" pitchFamily="49" charset="0"/>
+                <a:cs typeface="Courier New" panose="02070309020205020404" pitchFamily="49" charset="0"/>
+              </a:rPr>
+              <a:t>   10kΩ</a:t>
             </a:r>
             <a:endParaRPr lang="en-US" b="1" dirty="0">
               <a:latin typeface="Courier New" panose="02070309020205020404" pitchFamily="49" charset="0"/>
@@ -4747,7 +4667,7 @@
                 <a:latin typeface="Courier New" panose="02070309020205020404" pitchFamily="49" charset="0"/>
                 <a:cs typeface="Courier New" panose="02070309020205020404" pitchFamily="49" charset="0"/>
               </a:rPr>
-              <a:t>R25, 26:	</a:t>
+              <a:t>R1-10, 15-19:	</a:t>
             </a:r>
             <a:r>
               <a:rPr lang="en-US" b="1" dirty="0" smtClean="0">
@@ -4767,7 +4687,14 @@
                 <a:latin typeface="Courier New" panose="02070309020205020404" pitchFamily="49" charset="0"/>
                 <a:cs typeface="Courier New" panose="02070309020205020404" pitchFamily="49" charset="0"/>
               </a:rPr>
-              <a:t>R11-14:</a:t>
+              <a:t>R11-14</a:t>
+            </a:r>
+            <a:r>
+              <a:rPr lang="en-US" b="1" dirty="0" smtClean="0">
+                <a:latin typeface="Courier New" panose="02070309020205020404" pitchFamily="49" charset="0"/>
+                <a:cs typeface="Courier New" panose="02070309020205020404" pitchFamily="49" charset="0"/>
+              </a:rPr>
+              <a:t>:</a:t>
             </a:r>
             <a:r>
               <a:rPr lang="en-US" b="1" dirty="0">
@@ -4823,6 +4750,69 @@
               </a:rPr>
               <a:t>   22kΩ</a:t>
             </a:r>
+          </a:p>
+          <a:p>
+            <a:r>
+              <a:rPr lang="en-US" b="1" dirty="0" smtClean="0">
+                <a:latin typeface="Courier New" panose="02070309020205020404" pitchFamily="49" charset="0"/>
+                <a:cs typeface="Courier New" panose="02070309020205020404" pitchFamily="49" charset="0"/>
+              </a:rPr>
+              <a:t>R24:		   200</a:t>
+            </a:r>
+            <a:r>
+              <a:rPr lang="en-US" b="1" dirty="0">
+                <a:latin typeface="Courier New" panose="02070309020205020404" pitchFamily="49" charset="0"/>
+                <a:cs typeface="Courier New" panose="02070309020205020404" pitchFamily="49" charset="0"/>
+              </a:rPr>
+              <a:t>Ω</a:t>
+            </a:r>
+            <a:endParaRPr lang="en-US" b="1" dirty="0" smtClean="0">
+              <a:latin typeface="Courier New" panose="02070309020205020404" pitchFamily="49" charset="0"/>
+              <a:cs typeface="Courier New" panose="02070309020205020404" pitchFamily="49" charset="0"/>
+            </a:endParaRPr>
+          </a:p>
+          <a:p>
+            <a:r>
+              <a:rPr lang="en-US" b="1" dirty="0">
+                <a:latin typeface="Courier New" panose="02070309020205020404" pitchFamily="49" charset="0"/>
+                <a:cs typeface="Courier New" panose="02070309020205020404" pitchFamily="49" charset="0"/>
+              </a:rPr>
+              <a:t>R25, 26:	   </a:t>
+            </a:r>
+            <a:r>
+              <a:rPr lang="en-US" b="1" dirty="0" smtClean="0">
+                <a:latin typeface="Courier New" panose="02070309020205020404" pitchFamily="49" charset="0"/>
+                <a:cs typeface="Courier New" panose="02070309020205020404" pitchFamily="49" charset="0"/>
+              </a:rPr>
+              <a:t>47kΩ</a:t>
+            </a:r>
+            <a:endParaRPr lang="en-US" b="1" dirty="0" smtClean="0">
+              <a:latin typeface="Courier New" panose="02070309020205020404" pitchFamily="49" charset="0"/>
+              <a:cs typeface="Courier New" panose="02070309020205020404" pitchFamily="49" charset="0"/>
+            </a:endParaRPr>
+          </a:p>
+          <a:p>
+            <a:r>
+              <a:rPr lang="en-US" b="1" dirty="0" smtClean="0">
+                <a:latin typeface="Courier New" panose="02070309020205020404" pitchFamily="49" charset="0"/>
+                <a:cs typeface="Courier New" panose="02070309020205020404" pitchFamily="49" charset="0"/>
+              </a:rPr>
+              <a:t>R27</a:t>
+            </a:r>
+            <a:r>
+              <a:rPr lang="en-US" b="1" dirty="0">
+                <a:latin typeface="Courier New" panose="02070309020205020404" pitchFamily="49" charset="0"/>
+                <a:cs typeface="Courier New" panose="02070309020205020404" pitchFamily="49" charset="0"/>
+              </a:rPr>
+              <a:t>:		   </a:t>
+            </a:r>
+            <a:r>
+              <a:rPr lang="en-US" b="1" dirty="0" smtClean="0">
+                <a:latin typeface="Courier New" panose="02070309020205020404" pitchFamily="49" charset="0"/>
+                <a:cs typeface="Courier New" panose="02070309020205020404" pitchFamily="49" charset="0"/>
+              </a:rPr>
+              <a:t>100kΩ</a:t>
+            </a:r>
             <a:endParaRPr lang="en-US" b="1" dirty="0">
               <a:latin typeface="Courier New" panose="02070309020205020404" pitchFamily="49" charset="0"/>
               <a:cs typeface="Courier New" panose="02070309020205020404" pitchFamily="49" charset="0"/>
@@ -4830,29 +4820,34 @@
           </a:p>
           <a:p>
             <a:r>
-              <a:rPr lang="en-US" b="1" dirty="0">
-                <a:latin typeface="Courier New" panose="02070309020205020404" pitchFamily="49" charset="0"/>
-                <a:cs typeface="Courier New" panose="02070309020205020404" pitchFamily="49" charset="0"/>
-              </a:rPr>
-              <a:t>R24, 28:	</a:t>
-            </a:r>
-            <a:r>
-              <a:rPr lang="en-US" b="1" dirty="0" smtClean="0">
-                <a:latin typeface="Courier New" panose="02070309020205020404" pitchFamily="49" charset="0"/>
-                <a:cs typeface="Courier New" panose="02070309020205020404" pitchFamily="49" charset="0"/>
-              </a:rPr>
-              <a:t>   330Ω</a:t>
-            </a:r>
-          </a:p>
-          <a:p>
-            <a:r>
-              <a:rPr lang="en-US" b="1" dirty="0" smtClean="0">
-                <a:latin typeface="Courier New" panose="02070309020205020404" pitchFamily="49" charset="0"/>
-                <a:cs typeface="Courier New" panose="02070309020205020404" pitchFamily="49" charset="0"/>
-              </a:rPr>
-              <a:t>R27:		   100kΩ</a:t>
-            </a:r>
-            <a:endParaRPr lang="en-US" b="1" dirty="0">
+              <a:rPr lang="en-US" b="1" dirty="0" smtClean="0">
+                <a:latin typeface="Courier New" panose="02070309020205020404" pitchFamily="49" charset="0"/>
+                <a:cs typeface="Courier New" panose="02070309020205020404" pitchFamily="49" charset="0"/>
+              </a:rPr>
+              <a:t>R28:	</a:t>
+            </a:r>
+            <a:r>
+              <a:rPr lang="en-US" b="1" dirty="0">
+                <a:latin typeface="Courier New" panose="02070309020205020404" pitchFamily="49" charset="0"/>
+                <a:cs typeface="Courier New" panose="02070309020205020404" pitchFamily="49" charset="0"/>
+              </a:rPr>
+              <a:t>	</a:t>
+            </a:r>
+            <a:r>
+              <a:rPr lang="en-US" b="1" dirty="0" smtClean="0">
+                <a:latin typeface="Courier New" panose="02070309020205020404" pitchFamily="49" charset="0"/>
+                <a:cs typeface="Courier New" panose="02070309020205020404" pitchFamily="49" charset="0"/>
+              </a:rPr>
+              <a:t>   </a:t>
+            </a:r>
+            <a:r>
+              <a:rPr lang="en-US" b="1" dirty="0" smtClean="0">
+                <a:latin typeface="Courier New" panose="02070309020205020404" pitchFamily="49" charset="0"/>
+                <a:cs typeface="Courier New" panose="02070309020205020404" pitchFamily="49" charset="0"/>
+              </a:rPr>
+              <a:t>300Ω</a:t>
+            </a:r>
+            <a:endParaRPr lang="en-US" b="1" dirty="0" smtClean="0">
               <a:latin typeface="Courier New" panose="02070309020205020404" pitchFamily="49" charset="0"/>
               <a:cs typeface="Courier New" panose="02070309020205020404" pitchFamily="49" charset="0"/>
             </a:endParaRPr>

</xml_diff>

<commit_message>
New enable circuitry and labels
</commit_message>
<xml_diff>
--- a/images.pptx
+++ b/images.pptx
@@ -199,7 +199,7 @@
           <a:p>
             <a:fld id="{989E12F8-4E6E-9F47-809F-90362755178F}" type="datetimeFigureOut">
               <a:rPr lang="en-US" smtClean="0"/>
-              <a:t>5/6/17</a:t>
+              <a:t>5/13/17</a:t>
             </a:fld>
             <a:endParaRPr lang="en-US"/>
           </a:p>
@@ -596,7 +596,7 @@
           <a:p>
             <a:fld id="{56032651-1328-4865-BAD1-4C12A4D92860}" type="datetimeFigureOut">
               <a:rPr lang="en-US" smtClean="0"/>
-              <a:t>5/6/17</a:t>
+              <a:t>5/13/17</a:t>
             </a:fld>
             <a:endParaRPr lang="en-US"/>
           </a:p>
@@ -764,7 +764,7 @@
           <a:p>
             <a:fld id="{56032651-1328-4865-BAD1-4C12A4D92860}" type="datetimeFigureOut">
               <a:rPr lang="en-US" smtClean="0"/>
-              <a:t>5/6/17</a:t>
+              <a:t>5/13/17</a:t>
             </a:fld>
             <a:endParaRPr lang="en-US"/>
           </a:p>
@@ -942,7 +942,7 @@
           <a:p>
             <a:fld id="{56032651-1328-4865-BAD1-4C12A4D92860}" type="datetimeFigureOut">
               <a:rPr lang="en-US" smtClean="0"/>
-              <a:t>5/6/17</a:t>
+              <a:t>5/13/17</a:t>
             </a:fld>
             <a:endParaRPr lang="en-US"/>
           </a:p>
@@ -1110,7 +1110,7 @@
           <a:p>
             <a:fld id="{56032651-1328-4865-BAD1-4C12A4D92860}" type="datetimeFigureOut">
               <a:rPr lang="en-US" smtClean="0"/>
-              <a:t>5/6/17</a:t>
+              <a:t>5/13/17</a:t>
             </a:fld>
             <a:endParaRPr lang="en-US"/>
           </a:p>
@@ -1355,7 +1355,7 @@
           <a:p>
             <a:fld id="{56032651-1328-4865-BAD1-4C12A4D92860}" type="datetimeFigureOut">
               <a:rPr lang="en-US" smtClean="0"/>
-              <a:t>5/6/17</a:t>
+              <a:t>5/13/17</a:t>
             </a:fld>
             <a:endParaRPr lang="en-US"/>
           </a:p>
@@ -1584,7 +1584,7 @@
           <a:p>
             <a:fld id="{56032651-1328-4865-BAD1-4C12A4D92860}" type="datetimeFigureOut">
               <a:rPr lang="en-US" smtClean="0"/>
-              <a:t>5/6/17</a:t>
+              <a:t>5/13/17</a:t>
             </a:fld>
             <a:endParaRPr lang="en-US"/>
           </a:p>
@@ -1948,7 +1948,7 @@
           <a:p>
             <a:fld id="{56032651-1328-4865-BAD1-4C12A4D92860}" type="datetimeFigureOut">
               <a:rPr lang="en-US" smtClean="0"/>
-              <a:t>5/6/17</a:t>
+              <a:t>5/13/17</a:t>
             </a:fld>
             <a:endParaRPr lang="en-US"/>
           </a:p>
@@ -2065,7 +2065,7 @@
           <a:p>
             <a:fld id="{56032651-1328-4865-BAD1-4C12A4D92860}" type="datetimeFigureOut">
               <a:rPr lang="en-US" smtClean="0"/>
-              <a:t>5/6/17</a:t>
+              <a:t>5/13/17</a:t>
             </a:fld>
             <a:endParaRPr lang="en-US"/>
           </a:p>
@@ -2160,7 +2160,7 @@
           <a:p>
             <a:fld id="{56032651-1328-4865-BAD1-4C12A4D92860}" type="datetimeFigureOut">
               <a:rPr lang="en-US" smtClean="0"/>
-              <a:t>5/6/17</a:t>
+              <a:t>5/13/17</a:t>
             </a:fld>
             <a:endParaRPr lang="en-US"/>
           </a:p>
@@ -2435,7 +2435,7 @@
           <a:p>
             <a:fld id="{56032651-1328-4865-BAD1-4C12A4D92860}" type="datetimeFigureOut">
               <a:rPr lang="en-US" smtClean="0"/>
-              <a:t>5/6/17</a:t>
+              <a:t>5/13/17</a:t>
             </a:fld>
             <a:endParaRPr lang="en-US"/>
           </a:p>
@@ -2687,7 +2687,7 @@
           <a:p>
             <a:fld id="{56032651-1328-4865-BAD1-4C12A4D92860}" type="datetimeFigureOut">
               <a:rPr lang="en-US" smtClean="0"/>
-              <a:t>5/6/17</a:t>
+              <a:t>5/13/17</a:t>
             </a:fld>
             <a:endParaRPr lang="en-US"/>
           </a:p>
@@ -2898,7 +2898,7 @@
           <a:p>
             <a:fld id="{56032651-1328-4865-BAD1-4C12A4D92860}" type="datetimeFigureOut">
               <a:rPr lang="en-US" smtClean="0"/>
-              <a:t>5/6/17</a:t>
+              <a:t>5/13/17</a:t>
             </a:fld>
             <a:endParaRPr lang="en-US"/>
           </a:p>
@@ -3797,7 +3797,7 @@
         <p:spPr>
           <a:xfrm>
             <a:off x="5416846" y="596348"/>
-            <a:ext cx="2812751" cy="4247317"/>
+            <a:ext cx="2869198" cy="4247317"/>
           </a:xfrm>
           <a:prstGeom prst="rect">
             <a:avLst/>
@@ -3815,238 +3815,318 @@
                 <a:latin typeface="Courier New" panose="02070309020205020404" pitchFamily="49" charset="0"/>
                 <a:cs typeface="Courier New" panose="02070309020205020404" pitchFamily="49" charset="0"/>
               </a:rPr>
-              <a:t>PIN BCM</a:t>
-            </a:r>
-          </a:p>
-          <a:p>
-            <a:r>
-              <a:rPr lang="en-US" b="1" dirty="0" smtClean="0">
-                <a:latin typeface="Courier New" panose="02070309020205020404" pitchFamily="49" charset="0"/>
-                <a:cs typeface="Courier New" panose="02070309020205020404" pitchFamily="49" charset="0"/>
-              </a:rPr>
-              <a:t>  8 14 </a:t>
-            </a:r>
-            <a:r>
-              <a:rPr lang="en-US" b="1" dirty="0">
-                <a:latin typeface="Courier New" panose="02070309020205020404" pitchFamily="49" charset="0"/>
-                <a:cs typeface="Courier New" panose="02070309020205020404" pitchFamily="49" charset="0"/>
-              </a:rPr>
-              <a:t>- UART (TX)</a:t>
-            </a:r>
-          </a:p>
-          <a:p>
-            <a:r>
-              <a:rPr lang="en-US" b="1" dirty="0" smtClean="0">
-                <a:latin typeface="Courier New" panose="02070309020205020404" pitchFamily="49" charset="0"/>
-                <a:cs typeface="Courier New" panose="02070309020205020404" pitchFamily="49" charset="0"/>
-              </a:rPr>
-              <a:t> 10 15 </a:t>
-            </a:r>
-            <a:r>
-              <a:rPr lang="en-US" b="1" dirty="0">
-                <a:latin typeface="Courier New" panose="02070309020205020404" pitchFamily="49" charset="0"/>
-                <a:cs typeface="Courier New" panose="02070309020205020404" pitchFamily="49" charset="0"/>
-              </a:rPr>
-              <a:t>- UART (RX)</a:t>
-            </a:r>
-          </a:p>
-          <a:p>
-            <a:r>
-              <a:rPr lang="en-US" b="1" dirty="0" smtClean="0">
-                <a:latin typeface="Courier New" panose="02070309020205020404" pitchFamily="49" charset="0"/>
-                <a:cs typeface="Courier New" panose="02070309020205020404" pitchFamily="49" charset="0"/>
-              </a:rPr>
-              <a:t> 36 16 </a:t>
-            </a:r>
-            <a:r>
-              <a:rPr lang="en-US" b="1" dirty="0">
-                <a:latin typeface="Courier New" panose="02070309020205020404" pitchFamily="49" charset="0"/>
-                <a:cs typeface="Courier New" panose="02070309020205020404" pitchFamily="49" charset="0"/>
-              </a:rPr>
-              <a:t>- BUTTON 1</a:t>
-            </a:r>
-          </a:p>
-          <a:p>
-            <a:r>
-              <a:rPr lang="en-US" b="1" dirty="0" smtClean="0">
-                <a:latin typeface="Courier New" panose="02070309020205020404" pitchFamily="49" charset="0"/>
-                <a:cs typeface="Courier New" panose="02070309020205020404" pitchFamily="49" charset="0"/>
-              </a:rPr>
-              <a:t> 11 17 </a:t>
-            </a:r>
-            <a:r>
-              <a:rPr lang="en-US" b="1" dirty="0">
-                <a:latin typeface="Courier New" panose="02070309020205020404" pitchFamily="49" charset="0"/>
-                <a:cs typeface="Courier New" panose="02070309020205020404" pitchFamily="49" charset="0"/>
-              </a:rPr>
-              <a:t>- BUTTON 2</a:t>
-            </a:r>
-          </a:p>
-          <a:p>
-            <a:r>
-              <a:rPr lang="en-US" b="1" dirty="0" smtClean="0">
-                <a:latin typeface="Courier New" panose="02070309020205020404" pitchFamily="49" charset="0"/>
-                <a:cs typeface="Courier New" panose="02070309020205020404" pitchFamily="49" charset="0"/>
-              </a:rPr>
-              <a:t> 12 18 </a:t>
-            </a:r>
-            <a:r>
-              <a:rPr lang="en-US" b="1" dirty="0">
-                <a:latin typeface="Courier New" panose="02070309020205020404" pitchFamily="49" charset="0"/>
-                <a:cs typeface="Courier New" panose="02070309020205020404" pitchFamily="49" charset="0"/>
-              </a:rPr>
-              <a:t>- BUTTON 3</a:t>
-            </a:r>
-          </a:p>
-          <a:p>
-            <a:r>
-              <a:rPr lang="en-US" b="1" dirty="0" smtClean="0">
-                <a:latin typeface="Courier New" panose="02070309020205020404" pitchFamily="49" charset="0"/>
-                <a:cs typeface="Courier New" panose="02070309020205020404" pitchFamily="49" charset="0"/>
-              </a:rPr>
-              <a:t> 35 19 </a:t>
-            </a:r>
-            <a:r>
-              <a:rPr lang="en-US" b="1" dirty="0">
-                <a:latin typeface="Courier New" panose="02070309020205020404" pitchFamily="49" charset="0"/>
-                <a:cs typeface="Courier New" panose="02070309020205020404" pitchFamily="49" charset="0"/>
-              </a:rPr>
-              <a:t>- BUTTON 4</a:t>
-            </a:r>
-          </a:p>
-          <a:p>
-            <a:r>
-              <a:rPr lang="en-US" b="1" dirty="0" smtClean="0">
-                <a:latin typeface="Courier New" panose="02070309020205020404" pitchFamily="49" charset="0"/>
-                <a:cs typeface="Courier New" panose="02070309020205020404" pitchFamily="49" charset="0"/>
-              </a:rPr>
-              <a:t> 38 20 </a:t>
-            </a:r>
-            <a:r>
-              <a:rPr lang="en-US" b="1" dirty="0">
-                <a:latin typeface="Courier New" panose="02070309020205020404" pitchFamily="49" charset="0"/>
-                <a:cs typeface="Courier New" panose="02070309020205020404" pitchFamily="49" charset="0"/>
-              </a:rPr>
-              <a:t>- BUTTON 5</a:t>
-            </a:r>
-          </a:p>
-          <a:p>
-            <a:r>
-              <a:rPr lang="en-US" b="1" dirty="0" smtClean="0">
-                <a:latin typeface="Courier New" panose="02070309020205020404" pitchFamily="49" charset="0"/>
-                <a:cs typeface="Courier New" panose="02070309020205020404" pitchFamily="49" charset="0"/>
-              </a:rPr>
-              <a:t> 40 21 </a:t>
-            </a:r>
-            <a:r>
-              <a:rPr lang="en-US" b="1" dirty="0">
-                <a:latin typeface="Courier New" panose="02070309020205020404" pitchFamily="49" charset="0"/>
-                <a:cs typeface="Courier New" panose="02070309020205020404" pitchFamily="49" charset="0"/>
-              </a:rPr>
-              <a:t>- ENABLE</a:t>
-            </a:r>
-          </a:p>
-          <a:p>
-            <a:r>
-              <a:rPr lang="en-US" b="1" dirty="0" smtClean="0">
-                <a:latin typeface="Courier New" panose="02070309020205020404" pitchFamily="49" charset="0"/>
-                <a:cs typeface="Courier New" panose="02070309020205020404" pitchFamily="49" charset="0"/>
-              </a:rPr>
-              <a:t> 15 22 </a:t>
-            </a:r>
-            <a:r>
-              <a:rPr lang="en-US" b="1" dirty="0">
-                <a:latin typeface="Courier New" panose="02070309020205020404" pitchFamily="49" charset="0"/>
-                <a:cs typeface="Courier New" panose="02070309020205020404" pitchFamily="49" charset="0"/>
-              </a:rPr>
-              <a:t>- NC</a:t>
-            </a:r>
-          </a:p>
-          <a:p>
-            <a:r>
-              <a:rPr lang="en-US" b="1" dirty="0" smtClean="0">
-                <a:latin typeface="Courier New" panose="02070309020205020404" pitchFamily="49" charset="0"/>
-                <a:cs typeface="Courier New" panose="02070309020205020404" pitchFamily="49" charset="0"/>
-              </a:rPr>
-              <a:t> 16 23 </a:t>
-            </a:r>
-            <a:r>
-              <a:rPr lang="en-US" b="1" dirty="0">
-                <a:latin typeface="Courier New" panose="02070309020205020404" pitchFamily="49" charset="0"/>
-                <a:cs typeface="Courier New" panose="02070309020205020404" pitchFamily="49" charset="0"/>
-              </a:rPr>
-              <a:t>- DP</a:t>
-            </a:r>
-          </a:p>
-          <a:p>
-            <a:r>
-              <a:rPr lang="en-US" b="1" dirty="0" smtClean="0">
-                <a:latin typeface="Courier New" panose="02070309020205020404" pitchFamily="49" charset="0"/>
-                <a:cs typeface="Courier New" panose="02070309020205020404" pitchFamily="49" charset="0"/>
-              </a:rPr>
-              <a:t> 18 24 </a:t>
-            </a:r>
-            <a:r>
-              <a:rPr lang="en-US" b="1" dirty="0">
-                <a:latin typeface="Courier New" panose="02070309020205020404" pitchFamily="49" charset="0"/>
-                <a:cs typeface="Courier New" panose="02070309020205020404" pitchFamily="49" charset="0"/>
-              </a:rPr>
-              <a:t>– A (LSB)</a:t>
-            </a:r>
-          </a:p>
-          <a:p>
-            <a:r>
-              <a:rPr lang="en-US" b="1" dirty="0" smtClean="0">
-                <a:latin typeface="Courier New" panose="02070309020205020404" pitchFamily="49" charset="0"/>
-                <a:cs typeface="Courier New" panose="02070309020205020404" pitchFamily="49" charset="0"/>
-              </a:rPr>
-              <a:t> 22 25 </a:t>
-            </a:r>
-            <a:r>
-              <a:rPr lang="en-US" b="1" dirty="0">
-                <a:latin typeface="Courier New" panose="02070309020205020404" pitchFamily="49" charset="0"/>
-                <a:cs typeface="Courier New" panose="02070309020205020404" pitchFamily="49" charset="0"/>
-              </a:rPr>
-              <a:t>- B</a:t>
-            </a:r>
-          </a:p>
-          <a:p>
-            <a:r>
-              <a:rPr lang="en-US" b="1" dirty="0" smtClean="0">
-                <a:latin typeface="Courier New" panose="02070309020205020404" pitchFamily="49" charset="0"/>
-                <a:cs typeface="Courier New" panose="02070309020205020404" pitchFamily="49" charset="0"/>
-              </a:rPr>
-              <a:t> 37 26 </a:t>
-            </a:r>
-            <a:r>
-              <a:rPr lang="en-US" b="1" dirty="0">
-                <a:latin typeface="Courier New" panose="02070309020205020404" pitchFamily="49" charset="0"/>
-                <a:cs typeface="Courier New" panose="02070309020205020404" pitchFamily="49" charset="0"/>
-              </a:rPr>
-              <a:t>- C</a:t>
-            </a:r>
-          </a:p>
-          <a:p>
-            <a:r>
-              <a:rPr lang="en-US" b="1" dirty="0" smtClean="0">
-                <a:latin typeface="Courier New" panose="02070309020205020404" pitchFamily="49" charset="0"/>
-                <a:cs typeface="Courier New" panose="02070309020205020404" pitchFamily="49" charset="0"/>
-              </a:rPr>
-              <a:t> 13 27 </a:t>
-            </a:r>
-            <a:r>
-              <a:rPr lang="en-US" b="1" dirty="0">
-                <a:latin typeface="Courier New" panose="02070309020205020404" pitchFamily="49" charset="0"/>
-                <a:cs typeface="Courier New" panose="02070309020205020404" pitchFamily="49" charset="0"/>
-              </a:rPr>
-              <a:t>– </a:t>
-            </a:r>
-            <a:r>
-              <a:rPr lang="en-US" b="1" dirty="0" smtClean="0">
-                <a:latin typeface="Courier New" panose="02070309020205020404" pitchFamily="49" charset="0"/>
-                <a:cs typeface="Courier New" panose="02070309020205020404" pitchFamily="49" charset="0"/>
-              </a:rPr>
-              <a:t>D </a:t>
+              <a:t>PIN </a:t>
+            </a:r>
+            <a:r>
+              <a:rPr lang="en-US" b="1" dirty="0" smtClean="0">
+                <a:latin typeface="Courier New" panose="02070309020205020404" pitchFamily="49" charset="0"/>
+                <a:cs typeface="Courier New" panose="02070309020205020404" pitchFamily="49" charset="0"/>
+              </a:rPr>
+              <a:t>BCM</a:t>
+            </a:r>
+            <a:endParaRPr lang="en-US" b="1" dirty="0" smtClean="0">
+              <a:latin typeface="Courier New" panose="02070309020205020404" pitchFamily="49" charset="0"/>
+              <a:cs typeface="Courier New" panose="02070309020205020404" pitchFamily="49" charset="0"/>
+            </a:endParaRPr>
+          </a:p>
+          <a:p>
+            <a:r>
+              <a:rPr lang="en-US" b="1" dirty="0" smtClean="0">
+                <a:latin typeface="Courier New" panose="02070309020205020404" pitchFamily="49" charset="0"/>
+                <a:cs typeface="Courier New" panose="02070309020205020404" pitchFamily="49" charset="0"/>
+              </a:rPr>
+              <a:t>  8 </a:t>
+            </a:r>
+            <a:r>
+              <a:rPr lang="en-US" b="1" dirty="0" smtClean="0">
+                <a:latin typeface="Courier New" panose="02070309020205020404" pitchFamily="49" charset="0"/>
+                <a:cs typeface="Courier New" panose="02070309020205020404" pitchFamily="49" charset="0"/>
+              </a:rPr>
+              <a:t> 14 - UART </a:t>
+            </a:r>
+            <a:r>
+              <a:rPr lang="en-US" b="1" dirty="0">
+                <a:latin typeface="Courier New" panose="02070309020205020404" pitchFamily="49" charset="0"/>
+                <a:cs typeface="Courier New" panose="02070309020205020404" pitchFamily="49" charset="0"/>
+              </a:rPr>
+              <a:t>(TX)</a:t>
+            </a:r>
+          </a:p>
+          <a:p>
+            <a:r>
+              <a:rPr lang="en-US" b="1" dirty="0" smtClean="0">
+                <a:latin typeface="Courier New" panose="02070309020205020404" pitchFamily="49" charset="0"/>
+                <a:cs typeface="Courier New" panose="02070309020205020404" pitchFamily="49" charset="0"/>
+              </a:rPr>
+              <a:t> 10 </a:t>
+            </a:r>
+            <a:r>
+              <a:rPr lang="en-US" b="1" dirty="0" smtClean="0">
+                <a:latin typeface="Courier New" panose="02070309020205020404" pitchFamily="49" charset="0"/>
+                <a:cs typeface="Courier New" panose="02070309020205020404" pitchFamily="49" charset="0"/>
+              </a:rPr>
+              <a:t> 15 - UART </a:t>
+            </a:r>
+            <a:r>
+              <a:rPr lang="en-US" b="1" dirty="0">
+                <a:latin typeface="Courier New" panose="02070309020205020404" pitchFamily="49" charset="0"/>
+                <a:cs typeface="Courier New" panose="02070309020205020404" pitchFamily="49" charset="0"/>
+              </a:rPr>
+              <a:t>(RX)</a:t>
+            </a:r>
+          </a:p>
+          <a:p>
+            <a:r>
+              <a:rPr lang="en-US" b="1" dirty="0" smtClean="0">
+                <a:latin typeface="Courier New" panose="02070309020205020404" pitchFamily="49" charset="0"/>
+                <a:cs typeface="Courier New" panose="02070309020205020404" pitchFamily="49" charset="0"/>
+              </a:rPr>
+              <a:t> 36 </a:t>
+            </a:r>
+            <a:r>
+              <a:rPr lang="en-US" b="1" dirty="0" smtClean="0">
+                <a:latin typeface="Courier New" panose="02070309020205020404" pitchFamily="49" charset="0"/>
+                <a:cs typeface="Courier New" panose="02070309020205020404" pitchFamily="49" charset="0"/>
+              </a:rPr>
+              <a:t> 16 - BTN </a:t>
+            </a:r>
+            <a:r>
+              <a:rPr lang="en-US" b="1" dirty="0">
+                <a:latin typeface="Courier New" panose="02070309020205020404" pitchFamily="49" charset="0"/>
+                <a:cs typeface="Courier New" panose="02070309020205020404" pitchFamily="49" charset="0"/>
+              </a:rPr>
+              <a:t>1</a:t>
+            </a:r>
+          </a:p>
+          <a:p>
+            <a:r>
+              <a:rPr lang="en-US" b="1" dirty="0" smtClean="0">
+                <a:latin typeface="Courier New" panose="02070309020205020404" pitchFamily="49" charset="0"/>
+                <a:cs typeface="Courier New" panose="02070309020205020404" pitchFamily="49" charset="0"/>
+              </a:rPr>
+              <a:t> 11 </a:t>
+            </a:r>
+            <a:r>
+              <a:rPr lang="en-US" b="1" dirty="0" smtClean="0">
+                <a:latin typeface="Courier New" panose="02070309020205020404" pitchFamily="49" charset="0"/>
+                <a:cs typeface="Courier New" panose="02070309020205020404" pitchFamily="49" charset="0"/>
+              </a:rPr>
+              <a:t> 17 - BTN </a:t>
+            </a:r>
+            <a:r>
+              <a:rPr lang="en-US" b="1" dirty="0">
+                <a:latin typeface="Courier New" panose="02070309020205020404" pitchFamily="49" charset="0"/>
+                <a:cs typeface="Courier New" panose="02070309020205020404" pitchFamily="49" charset="0"/>
+              </a:rPr>
+              <a:t>2</a:t>
+            </a:r>
+          </a:p>
+          <a:p>
+            <a:r>
+              <a:rPr lang="en-US" b="1" dirty="0" smtClean="0">
+                <a:latin typeface="Courier New" panose="02070309020205020404" pitchFamily="49" charset="0"/>
+                <a:cs typeface="Courier New" panose="02070309020205020404" pitchFamily="49" charset="0"/>
+              </a:rPr>
+              <a:t> 12 </a:t>
+            </a:r>
+            <a:r>
+              <a:rPr lang="en-US" b="1" dirty="0" smtClean="0">
+                <a:latin typeface="Courier New" panose="02070309020205020404" pitchFamily="49" charset="0"/>
+                <a:cs typeface="Courier New" panose="02070309020205020404" pitchFamily="49" charset="0"/>
+              </a:rPr>
+              <a:t> 18 - BTN </a:t>
+            </a:r>
+            <a:r>
+              <a:rPr lang="en-US" b="1" dirty="0">
+                <a:latin typeface="Courier New" panose="02070309020205020404" pitchFamily="49" charset="0"/>
+                <a:cs typeface="Courier New" panose="02070309020205020404" pitchFamily="49" charset="0"/>
+              </a:rPr>
+              <a:t>3</a:t>
+            </a:r>
+          </a:p>
+          <a:p>
+            <a:r>
+              <a:rPr lang="en-US" b="1" dirty="0" smtClean="0">
+                <a:latin typeface="Courier New" panose="02070309020205020404" pitchFamily="49" charset="0"/>
+                <a:cs typeface="Courier New" panose="02070309020205020404" pitchFamily="49" charset="0"/>
+              </a:rPr>
+              <a:t> 35 </a:t>
+            </a:r>
+            <a:r>
+              <a:rPr lang="en-US" b="1" dirty="0" smtClean="0">
+                <a:latin typeface="Courier New" panose="02070309020205020404" pitchFamily="49" charset="0"/>
+                <a:cs typeface="Courier New" panose="02070309020205020404" pitchFamily="49" charset="0"/>
+              </a:rPr>
+              <a:t> 19 - BTN </a:t>
+            </a:r>
+            <a:r>
+              <a:rPr lang="en-US" b="1" dirty="0">
+                <a:latin typeface="Courier New" panose="02070309020205020404" pitchFamily="49" charset="0"/>
+                <a:cs typeface="Courier New" panose="02070309020205020404" pitchFamily="49" charset="0"/>
+              </a:rPr>
+              <a:t>4</a:t>
+            </a:r>
+          </a:p>
+          <a:p>
+            <a:r>
+              <a:rPr lang="en-US" b="1" dirty="0" smtClean="0">
+                <a:latin typeface="Courier New" panose="02070309020205020404" pitchFamily="49" charset="0"/>
+                <a:cs typeface="Courier New" panose="02070309020205020404" pitchFamily="49" charset="0"/>
+              </a:rPr>
+              <a:t> 38 </a:t>
+            </a:r>
+            <a:r>
+              <a:rPr lang="en-US" b="1" dirty="0" smtClean="0">
+                <a:latin typeface="Courier New" panose="02070309020205020404" pitchFamily="49" charset="0"/>
+                <a:cs typeface="Courier New" panose="02070309020205020404" pitchFamily="49" charset="0"/>
+              </a:rPr>
+              <a:t> 20 - BTN </a:t>
+            </a:r>
+            <a:r>
+              <a:rPr lang="en-US" b="1" dirty="0">
+                <a:latin typeface="Courier New" panose="02070309020205020404" pitchFamily="49" charset="0"/>
+                <a:cs typeface="Courier New" panose="02070309020205020404" pitchFamily="49" charset="0"/>
+              </a:rPr>
+              <a:t>5</a:t>
+            </a:r>
+          </a:p>
+          <a:p>
+            <a:r>
+              <a:rPr lang="en-US" b="1" dirty="0" smtClean="0">
+                <a:latin typeface="Courier New" panose="02070309020205020404" pitchFamily="49" charset="0"/>
+                <a:cs typeface="Courier New" panose="02070309020205020404" pitchFamily="49" charset="0"/>
+              </a:rPr>
+              <a:t> 40 </a:t>
+            </a:r>
+            <a:r>
+              <a:rPr lang="en-US" b="1" dirty="0" smtClean="0">
+                <a:latin typeface="Courier New" panose="02070309020205020404" pitchFamily="49" charset="0"/>
+                <a:cs typeface="Courier New" panose="02070309020205020404" pitchFamily="49" charset="0"/>
+              </a:rPr>
+              <a:t> 21 - ENABLE</a:t>
+            </a:r>
+            <a:endParaRPr lang="en-US" b="1" dirty="0">
+              <a:latin typeface="Courier New" panose="02070309020205020404" pitchFamily="49" charset="0"/>
+              <a:cs typeface="Courier New" panose="02070309020205020404" pitchFamily="49" charset="0"/>
+            </a:endParaRPr>
+          </a:p>
+          <a:p>
+            <a:r>
+              <a:rPr lang="en-US" b="1" dirty="0" smtClean="0">
+                <a:latin typeface="Courier New" panose="02070309020205020404" pitchFamily="49" charset="0"/>
+                <a:cs typeface="Courier New" panose="02070309020205020404" pitchFamily="49" charset="0"/>
+              </a:rPr>
+              <a:t> 15 </a:t>
+            </a:r>
+            <a:r>
+              <a:rPr lang="en-US" b="1" dirty="0" smtClean="0">
+                <a:latin typeface="Courier New" panose="02070309020205020404" pitchFamily="49" charset="0"/>
+                <a:cs typeface="Courier New" panose="02070309020205020404" pitchFamily="49" charset="0"/>
+              </a:rPr>
+              <a:t> 22 - NC</a:t>
+            </a:r>
+            <a:endParaRPr lang="en-US" b="1" dirty="0">
+              <a:latin typeface="Courier New" panose="02070309020205020404" pitchFamily="49" charset="0"/>
+              <a:cs typeface="Courier New" panose="02070309020205020404" pitchFamily="49" charset="0"/>
+            </a:endParaRPr>
+          </a:p>
+          <a:p>
+            <a:r>
+              <a:rPr lang="en-US" b="1" dirty="0" smtClean="0">
+                <a:latin typeface="Courier New" panose="02070309020205020404" pitchFamily="49" charset="0"/>
+                <a:cs typeface="Courier New" panose="02070309020205020404" pitchFamily="49" charset="0"/>
+              </a:rPr>
+              <a:t> 16 </a:t>
+            </a:r>
+            <a:r>
+              <a:rPr lang="en-US" b="1" dirty="0" smtClean="0">
+                <a:latin typeface="Courier New" panose="02070309020205020404" pitchFamily="49" charset="0"/>
+                <a:cs typeface="Courier New" panose="02070309020205020404" pitchFamily="49" charset="0"/>
+              </a:rPr>
+              <a:t> 23 - DP</a:t>
+            </a:r>
+            <a:endParaRPr lang="en-US" b="1" dirty="0">
+              <a:latin typeface="Courier New" panose="02070309020205020404" pitchFamily="49" charset="0"/>
+              <a:cs typeface="Courier New" panose="02070309020205020404" pitchFamily="49" charset="0"/>
+            </a:endParaRPr>
+          </a:p>
+          <a:p>
+            <a:r>
+              <a:rPr lang="en-US" b="1" dirty="0" smtClean="0">
+                <a:latin typeface="Courier New" panose="02070309020205020404" pitchFamily="49" charset="0"/>
+                <a:cs typeface="Courier New" panose="02070309020205020404" pitchFamily="49" charset="0"/>
+              </a:rPr>
+              <a:t> 18 </a:t>
+            </a:r>
+            <a:r>
+              <a:rPr lang="en-US" b="1" dirty="0" smtClean="0">
+                <a:latin typeface="Courier New" panose="02070309020205020404" pitchFamily="49" charset="0"/>
+                <a:cs typeface="Courier New" panose="02070309020205020404" pitchFamily="49" charset="0"/>
+              </a:rPr>
+              <a:t> 24 - A </a:t>
+            </a:r>
+            <a:r>
+              <a:rPr lang="en-US" b="1" dirty="0">
+                <a:latin typeface="Courier New" panose="02070309020205020404" pitchFamily="49" charset="0"/>
+                <a:cs typeface="Courier New" panose="02070309020205020404" pitchFamily="49" charset="0"/>
+              </a:rPr>
+              <a:t>(LSB)</a:t>
+            </a:r>
+          </a:p>
+          <a:p>
+            <a:r>
+              <a:rPr lang="en-US" b="1" dirty="0" smtClean="0">
+                <a:latin typeface="Courier New" panose="02070309020205020404" pitchFamily="49" charset="0"/>
+                <a:cs typeface="Courier New" panose="02070309020205020404" pitchFamily="49" charset="0"/>
+              </a:rPr>
+              <a:t> 22 </a:t>
+            </a:r>
+            <a:r>
+              <a:rPr lang="en-US" b="1" dirty="0" smtClean="0">
+                <a:latin typeface="Courier New" panose="02070309020205020404" pitchFamily="49" charset="0"/>
+                <a:cs typeface="Courier New" panose="02070309020205020404" pitchFamily="49" charset="0"/>
+              </a:rPr>
+              <a:t> 25 - B</a:t>
+            </a:r>
+            <a:endParaRPr lang="en-US" b="1" dirty="0">
+              <a:latin typeface="Courier New" panose="02070309020205020404" pitchFamily="49" charset="0"/>
+              <a:cs typeface="Courier New" panose="02070309020205020404" pitchFamily="49" charset="0"/>
+            </a:endParaRPr>
+          </a:p>
+          <a:p>
+            <a:r>
+              <a:rPr lang="en-US" b="1" dirty="0" smtClean="0">
+                <a:latin typeface="Courier New" panose="02070309020205020404" pitchFamily="49" charset="0"/>
+                <a:cs typeface="Courier New" panose="02070309020205020404" pitchFamily="49" charset="0"/>
+              </a:rPr>
+              <a:t> 37 </a:t>
+            </a:r>
+            <a:r>
+              <a:rPr lang="en-US" b="1" dirty="0" smtClean="0">
+                <a:latin typeface="Courier New" panose="02070309020205020404" pitchFamily="49" charset="0"/>
+                <a:cs typeface="Courier New" panose="02070309020205020404" pitchFamily="49" charset="0"/>
+              </a:rPr>
+              <a:t> 26 - C</a:t>
+            </a:r>
+            <a:endParaRPr lang="en-US" b="1" dirty="0">
+              <a:latin typeface="Courier New" panose="02070309020205020404" pitchFamily="49" charset="0"/>
+              <a:cs typeface="Courier New" panose="02070309020205020404" pitchFamily="49" charset="0"/>
+            </a:endParaRPr>
+          </a:p>
+          <a:p>
+            <a:r>
+              <a:rPr lang="en-US" b="1" dirty="0" smtClean="0">
+                <a:latin typeface="Courier New" panose="02070309020205020404" pitchFamily="49" charset="0"/>
+                <a:cs typeface="Courier New" panose="02070309020205020404" pitchFamily="49" charset="0"/>
+              </a:rPr>
+              <a:t> 13 </a:t>
+            </a:r>
+            <a:r>
+              <a:rPr lang="en-US" b="1" dirty="0" smtClean="0">
+                <a:latin typeface="Courier New" panose="02070309020205020404" pitchFamily="49" charset="0"/>
+                <a:cs typeface="Courier New" panose="02070309020205020404" pitchFamily="49" charset="0"/>
+              </a:rPr>
+              <a:t> 27 - D </a:t>
             </a:r>
             <a:r>
               <a:rPr lang="en-US" b="1" dirty="0">
@@ -4073,7 +4153,7 @@
         </p:nvSpPr>
         <p:spPr>
           <a:xfrm>
-            <a:off x="2682081" y="596348"/>
+            <a:off x="3167508" y="596348"/>
             <a:ext cx="2889780" cy="4247317"/>
           </a:xfrm>
           <a:prstGeom prst="rect">
@@ -4092,64 +4172,149 @@
                 <a:latin typeface="Courier New" panose="02070309020205020404" pitchFamily="49" charset="0"/>
                 <a:cs typeface="Courier New" panose="02070309020205020404" pitchFamily="49" charset="0"/>
               </a:rPr>
-              <a:t>PIN BCM</a:t>
-            </a:r>
-          </a:p>
-          <a:p>
-            <a:r>
-              <a:rPr lang="en-US" b="1" dirty="0" smtClean="0">
-                <a:latin typeface="Courier New" panose="02070309020205020404" pitchFamily="49" charset="0"/>
-                <a:cs typeface="Courier New" panose="02070309020205020404" pitchFamily="49" charset="0"/>
-              </a:rPr>
-              <a:t> 27  </a:t>
-            </a:r>
-            <a:r>
-              <a:rPr lang="en-US" b="1" dirty="0">
-                <a:latin typeface="Courier New" panose="02070309020205020404" pitchFamily="49" charset="0"/>
-                <a:cs typeface="Courier New" panose="02070309020205020404" pitchFamily="49" charset="0"/>
-              </a:rPr>
-              <a:t>0 - NC</a:t>
-            </a:r>
-          </a:p>
-          <a:p>
-            <a:r>
-              <a:rPr lang="en-US" b="1" dirty="0" smtClean="0">
-                <a:latin typeface="Courier New" panose="02070309020205020404" pitchFamily="49" charset="0"/>
-                <a:cs typeface="Courier New" panose="02070309020205020404" pitchFamily="49" charset="0"/>
-              </a:rPr>
-              <a:t> 28  </a:t>
-            </a:r>
-            <a:r>
-              <a:rPr lang="en-US" b="1" dirty="0">
-                <a:latin typeface="Courier New" panose="02070309020205020404" pitchFamily="49" charset="0"/>
-                <a:cs typeface="Courier New" panose="02070309020205020404" pitchFamily="49" charset="0"/>
-              </a:rPr>
-              <a:t>1 - NC</a:t>
-            </a:r>
-          </a:p>
-          <a:p>
-            <a:r>
-              <a:rPr lang="en-US" b="1" dirty="0" smtClean="0">
-                <a:latin typeface="Courier New" panose="02070309020205020404" pitchFamily="49" charset="0"/>
-                <a:cs typeface="Courier New" panose="02070309020205020404" pitchFamily="49" charset="0"/>
-              </a:rPr>
-              <a:t>  3  </a:t>
-            </a:r>
-            <a:r>
-              <a:rPr lang="en-US" b="1" dirty="0">
-                <a:latin typeface="Courier New" panose="02070309020205020404" pitchFamily="49" charset="0"/>
-                <a:cs typeface="Courier New" panose="02070309020205020404" pitchFamily="49" charset="0"/>
-              </a:rPr>
-              <a:t>2 - RED</a:t>
-            </a:r>
-          </a:p>
-          <a:p>
-            <a:r>
-              <a:rPr lang="en-US" b="1" dirty="0" smtClean="0">
-                <a:latin typeface="Courier New" panose="02070309020205020404" pitchFamily="49" charset="0"/>
-                <a:cs typeface="Courier New" panose="02070309020205020404" pitchFamily="49" charset="0"/>
-              </a:rPr>
-              <a:t>  5  3 - </a:t>
+              <a:t>PIN </a:t>
+            </a:r>
+            <a:r>
+              <a:rPr lang="en-US" b="1" dirty="0" smtClean="0">
+                <a:latin typeface="Courier New" panose="02070309020205020404" pitchFamily="49" charset="0"/>
+                <a:cs typeface="Courier New" panose="02070309020205020404" pitchFamily="49" charset="0"/>
+              </a:rPr>
+              <a:t>BCM</a:t>
+            </a:r>
+            <a:endParaRPr lang="en-US" b="1" dirty="0" smtClean="0">
+              <a:latin typeface="Courier New" panose="02070309020205020404" pitchFamily="49" charset="0"/>
+              <a:cs typeface="Courier New" panose="02070309020205020404" pitchFamily="49" charset="0"/>
+            </a:endParaRPr>
+          </a:p>
+          <a:p>
+            <a:r>
+              <a:rPr lang="en-US" b="1" dirty="0" smtClean="0">
+                <a:latin typeface="Courier New" panose="02070309020205020404" pitchFamily="49" charset="0"/>
+                <a:cs typeface="Courier New" panose="02070309020205020404" pitchFamily="49" charset="0"/>
+              </a:rPr>
+              <a:t> </a:t>
+            </a:r>
+            <a:r>
+              <a:rPr lang="en-US" b="1" dirty="0" smtClean="0">
+                <a:latin typeface="Courier New" panose="02070309020205020404" pitchFamily="49" charset="0"/>
+                <a:cs typeface="Courier New" panose="02070309020205020404" pitchFamily="49" charset="0"/>
+              </a:rPr>
+              <a:t>27  0 - NC</a:t>
+            </a:r>
+            <a:endParaRPr lang="en-US" b="1" dirty="0">
+              <a:latin typeface="Courier New" panose="02070309020205020404" pitchFamily="49" charset="0"/>
+              <a:cs typeface="Courier New" panose="02070309020205020404" pitchFamily="49" charset="0"/>
+            </a:endParaRPr>
+          </a:p>
+          <a:p>
+            <a:r>
+              <a:rPr lang="en-US" b="1" dirty="0" smtClean="0">
+                <a:latin typeface="Courier New" panose="02070309020205020404" pitchFamily="49" charset="0"/>
+                <a:cs typeface="Courier New" panose="02070309020205020404" pitchFamily="49" charset="0"/>
+              </a:rPr>
+              <a:t> </a:t>
+            </a:r>
+            <a:r>
+              <a:rPr lang="en-US" b="1" dirty="0" smtClean="0">
+                <a:latin typeface="Courier New" panose="02070309020205020404" pitchFamily="49" charset="0"/>
+                <a:cs typeface="Courier New" panose="02070309020205020404" pitchFamily="49" charset="0"/>
+              </a:rPr>
+              <a:t>28  </a:t>
+            </a:r>
+            <a:r>
+              <a:rPr lang="en-US" b="1" dirty="0">
+                <a:latin typeface="Courier New" panose="02070309020205020404" pitchFamily="49" charset="0"/>
+                <a:cs typeface="Courier New" panose="02070309020205020404" pitchFamily="49" charset="0"/>
+              </a:rPr>
+              <a:t>1 </a:t>
+            </a:r>
+            <a:r>
+              <a:rPr lang="en-US" b="1" dirty="0" smtClean="0">
+                <a:latin typeface="Courier New" panose="02070309020205020404" pitchFamily="49" charset="0"/>
+                <a:cs typeface="Courier New" panose="02070309020205020404" pitchFamily="49" charset="0"/>
+              </a:rPr>
+              <a:t>- </a:t>
+            </a:r>
+            <a:r>
+              <a:rPr lang="en-US" b="1" dirty="0">
+                <a:latin typeface="Courier New" panose="02070309020205020404" pitchFamily="49" charset="0"/>
+                <a:cs typeface="Courier New" panose="02070309020205020404" pitchFamily="49" charset="0"/>
+              </a:rPr>
+              <a:t>NC</a:t>
+            </a:r>
+          </a:p>
+          <a:p>
+            <a:r>
+              <a:rPr lang="en-US" b="1" dirty="0" smtClean="0">
+                <a:latin typeface="Courier New" panose="02070309020205020404" pitchFamily="49" charset="0"/>
+                <a:cs typeface="Courier New" panose="02070309020205020404" pitchFamily="49" charset="0"/>
+              </a:rPr>
+              <a:t>  </a:t>
+            </a:r>
+            <a:r>
+              <a:rPr lang="en-US" b="1" dirty="0" smtClean="0">
+                <a:latin typeface="Courier New" panose="02070309020205020404" pitchFamily="49" charset="0"/>
+                <a:cs typeface="Courier New" panose="02070309020205020404" pitchFamily="49" charset="0"/>
+              </a:rPr>
+              <a:t>3  </a:t>
+            </a:r>
+            <a:r>
+              <a:rPr lang="en-US" b="1" dirty="0">
+                <a:latin typeface="Courier New" panose="02070309020205020404" pitchFamily="49" charset="0"/>
+                <a:cs typeface="Courier New" panose="02070309020205020404" pitchFamily="49" charset="0"/>
+              </a:rPr>
+              <a:t>2 </a:t>
+            </a:r>
+            <a:r>
+              <a:rPr lang="en-US" b="1" dirty="0">
+                <a:latin typeface="Courier New" panose="02070309020205020404" pitchFamily="49" charset="0"/>
+                <a:cs typeface="Courier New" panose="02070309020205020404" pitchFamily="49" charset="0"/>
+              </a:rPr>
+              <a:t>-</a:t>
+            </a:r>
+            <a:r>
+              <a:rPr lang="en-US" b="1" dirty="0" smtClean="0">
+                <a:latin typeface="Courier New" panose="02070309020205020404" pitchFamily="49" charset="0"/>
+                <a:cs typeface="Courier New" panose="02070309020205020404" pitchFamily="49" charset="0"/>
+              </a:rPr>
+              <a:t> </a:t>
+            </a:r>
+            <a:r>
+              <a:rPr lang="en-US" b="1" dirty="0">
+                <a:latin typeface="Courier New" panose="02070309020205020404" pitchFamily="49" charset="0"/>
+                <a:cs typeface="Courier New" panose="02070309020205020404" pitchFamily="49" charset="0"/>
+              </a:rPr>
+              <a:t>RED</a:t>
+            </a:r>
+          </a:p>
+          <a:p>
+            <a:r>
+              <a:rPr lang="en-US" b="1" dirty="0" smtClean="0">
+                <a:latin typeface="Courier New" panose="02070309020205020404" pitchFamily="49" charset="0"/>
+                <a:cs typeface="Courier New" panose="02070309020205020404" pitchFamily="49" charset="0"/>
+              </a:rPr>
+              <a:t>  </a:t>
+            </a:r>
+            <a:r>
+              <a:rPr lang="en-US" b="1" dirty="0" smtClean="0">
+                <a:latin typeface="Courier New" panose="02070309020205020404" pitchFamily="49" charset="0"/>
+                <a:cs typeface="Courier New" panose="02070309020205020404" pitchFamily="49" charset="0"/>
+              </a:rPr>
+              <a:t>5  </a:t>
+            </a:r>
+            <a:r>
+              <a:rPr lang="en-US" b="1" dirty="0" smtClean="0">
+                <a:latin typeface="Courier New" panose="02070309020205020404" pitchFamily="49" charset="0"/>
+                <a:cs typeface="Courier New" panose="02070309020205020404" pitchFamily="49" charset="0"/>
+              </a:rPr>
+              <a:t>3 </a:t>
+            </a:r>
+            <a:r>
+              <a:rPr lang="en-US" b="1" dirty="0" smtClean="0">
+                <a:latin typeface="Courier New" panose="02070309020205020404" pitchFamily="49" charset="0"/>
+                <a:cs typeface="Courier New" panose="02070309020205020404" pitchFamily="49" charset="0"/>
+              </a:rPr>
+              <a:t>- </a:t>
             </a:r>
             <a:r>
               <a:rPr lang="en-US" b="1" dirty="0">
@@ -4165,172 +4330,336 @@
                 <a:latin typeface="Courier New" panose="02070309020205020404" pitchFamily="49" charset="0"/>
                 <a:cs typeface="Courier New" panose="02070309020205020404" pitchFamily="49" charset="0"/>
               </a:rPr>
-              <a:t>  7  </a:t>
-            </a:r>
-            <a:r>
-              <a:rPr lang="en-US" b="1" dirty="0">
-                <a:latin typeface="Courier New" panose="02070309020205020404" pitchFamily="49" charset="0"/>
-                <a:cs typeface="Courier New" panose="02070309020205020404" pitchFamily="49" charset="0"/>
-              </a:rPr>
-              <a:t>4 - GREEN</a:t>
-            </a:r>
-          </a:p>
-          <a:p>
-            <a:r>
-              <a:rPr lang="en-US" b="1" dirty="0" smtClean="0">
-                <a:latin typeface="Courier New" panose="02070309020205020404" pitchFamily="49" charset="0"/>
-                <a:cs typeface="Courier New" panose="02070309020205020404" pitchFamily="49" charset="0"/>
-              </a:rPr>
-              <a:t> 29  </a:t>
-            </a:r>
-            <a:r>
-              <a:rPr lang="en-US" b="1" dirty="0">
-                <a:latin typeface="Courier New" panose="02070309020205020404" pitchFamily="49" charset="0"/>
-                <a:cs typeface="Courier New" panose="02070309020205020404" pitchFamily="49" charset="0"/>
-              </a:rPr>
-              <a:t>5 - BLUE</a:t>
-            </a:r>
-          </a:p>
-          <a:p>
-            <a:r>
-              <a:rPr lang="en-US" b="1" dirty="0" smtClean="0">
-                <a:latin typeface="Courier New" panose="02070309020205020404" pitchFamily="49" charset="0"/>
-                <a:cs typeface="Courier New" panose="02070309020205020404" pitchFamily="49" charset="0"/>
-              </a:rPr>
-              <a:t> 31  </a:t>
-            </a:r>
-            <a:r>
-              <a:rPr lang="en-US" b="1" dirty="0">
-                <a:latin typeface="Courier New" panose="02070309020205020404" pitchFamily="49" charset="0"/>
-                <a:cs typeface="Courier New" panose="02070309020205020404" pitchFamily="49" charset="0"/>
-              </a:rPr>
-              <a:t>6 - SPEAKER</a:t>
-            </a:r>
-          </a:p>
-          <a:p>
-            <a:r>
-              <a:rPr lang="en-US" b="1" dirty="0" smtClean="0">
-                <a:latin typeface="Courier New" panose="02070309020205020404" pitchFamily="49" charset="0"/>
-                <a:cs typeface="Courier New" panose="02070309020205020404" pitchFamily="49" charset="0"/>
-              </a:rPr>
-              <a:t> 26  </a:t>
-            </a:r>
-            <a:r>
-              <a:rPr lang="en-US" b="1" dirty="0">
-                <a:latin typeface="Courier New" panose="02070309020205020404" pitchFamily="49" charset="0"/>
-                <a:cs typeface="Courier New" panose="02070309020205020404" pitchFamily="49" charset="0"/>
-              </a:rPr>
-              <a:t>7 - SPI (CE1)</a:t>
-            </a:r>
-          </a:p>
-          <a:p>
-            <a:r>
-              <a:rPr lang="en-US" b="1" dirty="0" smtClean="0">
-                <a:latin typeface="Courier New" panose="02070309020205020404" pitchFamily="49" charset="0"/>
-                <a:cs typeface="Courier New" panose="02070309020205020404" pitchFamily="49" charset="0"/>
-              </a:rPr>
-              <a:t> 24  </a:t>
-            </a:r>
-            <a:r>
-              <a:rPr lang="en-US" b="1" dirty="0">
-                <a:latin typeface="Courier New" panose="02070309020205020404" pitchFamily="49" charset="0"/>
-                <a:cs typeface="Courier New" panose="02070309020205020404" pitchFamily="49" charset="0"/>
-              </a:rPr>
-              <a:t>8 - SPI (CE0)</a:t>
-            </a:r>
-          </a:p>
-          <a:p>
-            <a:r>
-              <a:rPr lang="en-US" b="1" dirty="0" smtClean="0">
-                <a:latin typeface="Courier New" panose="02070309020205020404" pitchFamily="49" charset="0"/>
-                <a:cs typeface="Courier New" panose="02070309020205020404" pitchFamily="49" charset="0"/>
-              </a:rPr>
-              <a:t> 21  </a:t>
-            </a:r>
-            <a:r>
-              <a:rPr lang="en-US" b="1" dirty="0">
-                <a:latin typeface="Courier New" panose="02070309020205020404" pitchFamily="49" charset="0"/>
-                <a:cs typeface="Courier New" panose="02070309020205020404" pitchFamily="49" charset="0"/>
-              </a:rPr>
-              <a:t>9 - SPI (</a:t>
-            </a:r>
-            <a:r>
-              <a:rPr lang="en-US" b="1" dirty="0" smtClean="0">
-                <a:latin typeface="Courier New" panose="02070309020205020404" pitchFamily="49" charset="0"/>
-                <a:cs typeface="Courier New" panose="02070309020205020404" pitchFamily="49" charset="0"/>
-              </a:rPr>
-              <a:t>MISO</a:t>
-            </a:r>
-            <a:r>
-              <a:rPr lang="en-US" b="1" dirty="0">
-                <a:latin typeface="Courier New" panose="02070309020205020404" pitchFamily="49" charset="0"/>
-                <a:cs typeface="Courier New" panose="02070309020205020404" pitchFamily="49" charset="0"/>
-              </a:rPr>
-              <a:t>)</a:t>
-            </a:r>
-          </a:p>
-          <a:p>
-            <a:r>
-              <a:rPr lang="en-US" b="1" dirty="0" smtClean="0">
-                <a:latin typeface="Courier New" panose="02070309020205020404" pitchFamily="49" charset="0"/>
-                <a:cs typeface="Courier New" panose="02070309020205020404" pitchFamily="49" charset="0"/>
-              </a:rPr>
-              <a:t> 19 10 </a:t>
-            </a:r>
-            <a:r>
-              <a:rPr lang="en-US" b="1" dirty="0">
-                <a:latin typeface="Courier New" panose="02070309020205020404" pitchFamily="49" charset="0"/>
-                <a:cs typeface="Courier New" panose="02070309020205020404" pitchFamily="49" charset="0"/>
-              </a:rPr>
-              <a:t>- SPI (MOSI)</a:t>
-            </a:r>
-          </a:p>
-          <a:p>
-            <a:r>
-              <a:rPr lang="en-US" b="1" dirty="0" smtClean="0">
-                <a:latin typeface="Courier New" panose="02070309020205020404" pitchFamily="49" charset="0"/>
-                <a:cs typeface="Courier New" panose="02070309020205020404" pitchFamily="49" charset="0"/>
-              </a:rPr>
-              <a:t> 23 11 </a:t>
-            </a:r>
-            <a:r>
-              <a:rPr lang="en-US" b="1" dirty="0">
-                <a:latin typeface="Courier New" panose="02070309020205020404" pitchFamily="49" charset="0"/>
-                <a:cs typeface="Courier New" panose="02070309020205020404" pitchFamily="49" charset="0"/>
-              </a:rPr>
-              <a:t>- SPI (SCLK)</a:t>
-            </a:r>
-          </a:p>
-          <a:p>
-            <a:r>
-              <a:rPr lang="en-US" b="1" dirty="0" smtClean="0">
-                <a:latin typeface="Courier New" panose="02070309020205020404" pitchFamily="49" charset="0"/>
-                <a:cs typeface="Courier New" panose="02070309020205020404" pitchFamily="49" charset="0"/>
-              </a:rPr>
-              <a:t> 32 12 </a:t>
-            </a:r>
-            <a:r>
-              <a:rPr lang="en-US" b="1" dirty="0">
-                <a:latin typeface="Courier New" panose="02070309020205020404" pitchFamily="49" charset="0"/>
-                <a:cs typeface="Courier New" panose="02070309020205020404" pitchFamily="49" charset="0"/>
-              </a:rPr>
-              <a:t>- SWITCH 1</a:t>
-            </a:r>
-          </a:p>
-          <a:p>
-            <a:r>
-              <a:rPr lang="en-US" b="1" dirty="0" smtClean="0">
-                <a:latin typeface="Courier New" panose="02070309020205020404" pitchFamily="49" charset="0"/>
-                <a:cs typeface="Courier New" panose="02070309020205020404" pitchFamily="49" charset="0"/>
-              </a:rPr>
-              <a:t> 33 13 </a:t>
-            </a:r>
-            <a:r>
-              <a:rPr lang="en-US" b="1" dirty="0">
-                <a:latin typeface="Courier New" panose="02070309020205020404" pitchFamily="49" charset="0"/>
-                <a:cs typeface="Courier New" panose="02070309020205020404" pitchFamily="49" charset="0"/>
-              </a:rPr>
-              <a:t>- SWITCH </a:t>
+              <a:t>  </a:t>
+            </a:r>
+            <a:r>
+              <a:rPr lang="en-US" b="1" dirty="0" smtClean="0">
+                <a:latin typeface="Courier New" panose="02070309020205020404" pitchFamily="49" charset="0"/>
+                <a:cs typeface="Courier New" panose="02070309020205020404" pitchFamily="49" charset="0"/>
+              </a:rPr>
+              <a:t>7  </a:t>
+            </a:r>
+            <a:r>
+              <a:rPr lang="en-US" b="1" dirty="0">
+                <a:latin typeface="Courier New" panose="02070309020205020404" pitchFamily="49" charset="0"/>
+                <a:cs typeface="Courier New" panose="02070309020205020404" pitchFamily="49" charset="0"/>
+              </a:rPr>
+              <a:t>4 </a:t>
+            </a:r>
+            <a:r>
+              <a:rPr lang="en-US" b="1" dirty="0" smtClean="0">
+                <a:latin typeface="Courier New" panose="02070309020205020404" pitchFamily="49" charset="0"/>
+                <a:cs typeface="Courier New" panose="02070309020205020404" pitchFamily="49" charset="0"/>
+              </a:rPr>
+              <a:t>- </a:t>
+            </a:r>
+            <a:r>
+              <a:rPr lang="en-US" b="1" dirty="0">
+                <a:latin typeface="Courier New" panose="02070309020205020404" pitchFamily="49" charset="0"/>
+                <a:cs typeface="Courier New" panose="02070309020205020404" pitchFamily="49" charset="0"/>
+              </a:rPr>
+              <a:t>GREEN</a:t>
+            </a:r>
+          </a:p>
+          <a:p>
+            <a:r>
+              <a:rPr lang="en-US" b="1" dirty="0" smtClean="0">
+                <a:latin typeface="Courier New" panose="02070309020205020404" pitchFamily="49" charset="0"/>
+                <a:cs typeface="Courier New" panose="02070309020205020404" pitchFamily="49" charset="0"/>
+              </a:rPr>
+              <a:t> </a:t>
+            </a:r>
+            <a:r>
+              <a:rPr lang="en-US" b="1" dirty="0" smtClean="0">
+                <a:latin typeface="Courier New" panose="02070309020205020404" pitchFamily="49" charset="0"/>
+                <a:cs typeface="Courier New" panose="02070309020205020404" pitchFamily="49" charset="0"/>
+              </a:rPr>
+              <a:t>29  </a:t>
+            </a:r>
+            <a:r>
+              <a:rPr lang="en-US" b="1" dirty="0">
+                <a:latin typeface="Courier New" panose="02070309020205020404" pitchFamily="49" charset="0"/>
+                <a:cs typeface="Courier New" panose="02070309020205020404" pitchFamily="49" charset="0"/>
+              </a:rPr>
+              <a:t>5 </a:t>
+            </a:r>
+            <a:r>
+              <a:rPr lang="en-US" b="1" dirty="0" smtClean="0">
+                <a:latin typeface="Courier New" panose="02070309020205020404" pitchFamily="49" charset="0"/>
+                <a:cs typeface="Courier New" panose="02070309020205020404" pitchFamily="49" charset="0"/>
+              </a:rPr>
+              <a:t>- </a:t>
+            </a:r>
+            <a:r>
+              <a:rPr lang="en-US" b="1" dirty="0">
+                <a:latin typeface="Courier New" panose="02070309020205020404" pitchFamily="49" charset="0"/>
+                <a:cs typeface="Courier New" panose="02070309020205020404" pitchFamily="49" charset="0"/>
+              </a:rPr>
+              <a:t>BLUE</a:t>
+            </a:r>
+          </a:p>
+          <a:p>
+            <a:r>
+              <a:rPr lang="en-US" b="1" dirty="0" smtClean="0">
+                <a:latin typeface="Courier New" panose="02070309020205020404" pitchFamily="49" charset="0"/>
+                <a:cs typeface="Courier New" panose="02070309020205020404" pitchFamily="49" charset="0"/>
+              </a:rPr>
+              <a:t> </a:t>
+            </a:r>
+            <a:r>
+              <a:rPr lang="en-US" b="1" dirty="0" smtClean="0">
+                <a:latin typeface="Courier New" panose="02070309020205020404" pitchFamily="49" charset="0"/>
+                <a:cs typeface="Courier New" panose="02070309020205020404" pitchFamily="49" charset="0"/>
+              </a:rPr>
+              <a:t>31  6 - SPKR</a:t>
+            </a:r>
+            <a:endParaRPr lang="en-US" b="1" dirty="0">
+              <a:latin typeface="Courier New" panose="02070309020205020404" pitchFamily="49" charset="0"/>
+              <a:cs typeface="Courier New" panose="02070309020205020404" pitchFamily="49" charset="0"/>
+            </a:endParaRPr>
+          </a:p>
+          <a:p>
+            <a:r>
+              <a:rPr lang="en-US" b="1" dirty="0" smtClean="0">
+                <a:latin typeface="Courier New" panose="02070309020205020404" pitchFamily="49" charset="0"/>
+                <a:cs typeface="Courier New" panose="02070309020205020404" pitchFamily="49" charset="0"/>
+              </a:rPr>
+              <a:t> </a:t>
+            </a:r>
+            <a:r>
+              <a:rPr lang="en-US" b="1" dirty="0" smtClean="0">
+                <a:latin typeface="Courier New" panose="02070309020205020404" pitchFamily="49" charset="0"/>
+                <a:cs typeface="Courier New" panose="02070309020205020404" pitchFamily="49" charset="0"/>
+              </a:rPr>
+              <a:t>26  </a:t>
+            </a:r>
+            <a:r>
+              <a:rPr lang="en-US" b="1" dirty="0">
+                <a:latin typeface="Courier New" panose="02070309020205020404" pitchFamily="49" charset="0"/>
+                <a:cs typeface="Courier New" panose="02070309020205020404" pitchFamily="49" charset="0"/>
+              </a:rPr>
+              <a:t>7 </a:t>
+            </a:r>
+            <a:r>
+              <a:rPr lang="en-US" b="1" dirty="0" smtClean="0">
+                <a:latin typeface="Courier New" panose="02070309020205020404" pitchFamily="49" charset="0"/>
+                <a:cs typeface="Courier New" panose="02070309020205020404" pitchFamily="49" charset="0"/>
+              </a:rPr>
+              <a:t>- CE1</a:t>
+            </a:r>
+            <a:endParaRPr lang="en-US" b="1" dirty="0">
+              <a:latin typeface="Courier New" panose="02070309020205020404" pitchFamily="49" charset="0"/>
+              <a:cs typeface="Courier New" panose="02070309020205020404" pitchFamily="49" charset="0"/>
+            </a:endParaRPr>
+          </a:p>
+          <a:p>
+            <a:r>
+              <a:rPr lang="en-US" b="1" dirty="0" smtClean="0">
+                <a:latin typeface="Courier New" panose="02070309020205020404" pitchFamily="49" charset="0"/>
+                <a:cs typeface="Courier New" panose="02070309020205020404" pitchFamily="49" charset="0"/>
+              </a:rPr>
+              <a:t> </a:t>
+            </a:r>
+            <a:r>
+              <a:rPr lang="en-US" b="1" dirty="0" smtClean="0">
+                <a:latin typeface="Courier New" panose="02070309020205020404" pitchFamily="49" charset="0"/>
+                <a:cs typeface="Courier New" panose="02070309020205020404" pitchFamily="49" charset="0"/>
+              </a:rPr>
+              <a:t>24  </a:t>
+            </a:r>
+            <a:r>
+              <a:rPr lang="en-US" b="1" dirty="0">
+                <a:latin typeface="Courier New" panose="02070309020205020404" pitchFamily="49" charset="0"/>
+                <a:cs typeface="Courier New" panose="02070309020205020404" pitchFamily="49" charset="0"/>
+              </a:rPr>
+              <a:t>8 </a:t>
+            </a:r>
+            <a:r>
+              <a:rPr lang="en-US" b="1" dirty="0" smtClean="0">
+                <a:latin typeface="Courier New" panose="02070309020205020404" pitchFamily="49" charset="0"/>
+                <a:cs typeface="Courier New" panose="02070309020205020404" pitchFamily="49" charset="0"/>
+              </a:rPr>
+              <a:t>- CE0</a:t>
+            </a:r>
+            <a:endParaRPr lang="en-US" b="1" dirty="0">
+              <a:latin typeface="Courier New" panose="02070309020205020404" pitchFamily="49" charset="0"/>
+              <a:cs typeface="Courier New" panose="02070309020205020404" pitchFamily="49" charset="0"/>
+            </a:endParaRPr>
+          </a:p>
+          <a:p>
+            <a:r>
+              <a:rPr lang="en-US" b="1" dirty="0" smtClean="0">
+                <a:latin typeface="Courier New" panose="02070309020205020404" pitchFamily="49" charset="0"/>
+                <a:cs typeface="Courier New" panose="02070309020205020404" pitchFamily="49" charset="0"/>
+              </a:rPr>
+              <a:t> </a:t>
+            </a:r>
+            <a:r>
+              <a:rPr lang="en-US" b="1" dirty="0" smtClean="0">
+                <a:latin typeface="Courier New" panose="02070309020205020404" pitchFamily="49" charset="0"/>
+                <a:cs typeface="Courier New" panose="02070309020205020404" pitchFamily="49" charset="0"/>
+              </a:rPr>
+              <a:t>21  </a:t>
+            </a:r>
+            <a:r>
+              <a:rPr lang="en-US" b="1" dirty="0">
+                <a:latin typeface="Courier New" panose="02070309020205020404" pitchFamily="49" charset="0"/>
+                <a:cs typeface="Courier New" panose="02070309020205020404" pitchFamily="49" charset="0"/>
+              </a:rPr>
+              <a:t>9 </a:t>
+            </a:r>
+            <a:r>
+              <a:rPr lang="en-US" b="1" dirty="0" smtClean="0">
+                <a:latin typeface="Courier New" panose="02070309020205020404" pitchFamily="49" charset="0"/>
+                <a:cs typeface="Courier New" panose="02070309020205020404" pitchFamily="49" charset="0"/>
+              </a:rPr>
+              <a:t>- MISO</a:t>
+            </a:r>
+            <a:endParaRPr lang="en-US" b="1" dirty="0">
+              <a:latin typeface="Courier New" panose="02070309020205020404" pitchFamily="49" charset="0"/>
+              <a:cs typeface="Courier New" panose="02070309020205020404" pitchFamily="49" charset="0"/>
+            </a:endParaRPr>
+          </a:p>
+          <a:p>
+            <a:r>
+              <a:rPr lang="en-US" b="1" dirty="0" smtClean="0">
+                <a:latin typeface="Courier New" panose="02070309020205020404" pitchFamily="49" charset="0"/>
+                <a:cs typeface="Courier New" panose="02070309020205020404" pitchFamily="49" charset="0"/>
+              </a:rPr>
+              <a:t> </a:t>
+            </a:r>
+            <a:r>
+              <a:rPr lang="en-US" b="1" dirty="0" smtClean="0">
+                <a:latin typeface="Courier New" panose="02070309020205020404" pitchFamily="49" charset="0"/>
+                <a:cs typeface="Courier New" panose="02070309020205020404" pitchFamily="49" charset="0"/>
+              </a:rPr>
+              <a:t>19 </a:t>
+            </a:r>
+            <a:r>
+              <a:rPr lang="en-US" b="1" dirty="0" smtClean="0">
+                <a:latin typeface="Courier New" panose="02070309020205020404" pitchFamily="49" charset="0"/>
+                <a:cs typeface="Courier New" panose="02070309020205020404" pitchFamily="49" charset="0"/>
+              </a:rPr>
+              <a:t>10 </a:t>
+            </a:r>
+            <a:r>
+              <a:rPr lang="en-US" b="1" dirty="0" smtClean="0">
+                <a:latin typeface="Courier New" panose="02070309020205020404" pitchFamily="49" charset="0"/>
+                <a:cs typeface="Courier New" panose="02070309020205020404" pitchFamily="49" charset="0"/>
+              </a:rPr>
+              <a:t>- MOSI</a:t>
+            </a:r>
+            <a:endParaRPr lang="en-US" b="1" dirty="0">
+              <a:latin typeface="Courier New" panose="02070309020205020404" pitchFamily="49" charset="0"/>
+              <a:cs typeface="Courier New" panose="02070309020205020404" pitchFamily="49" charset="0"/>
+            </a:endParaRPr>
+          </a:p>
+          <a:p>
+            <a:r>
+              <a:rPr lang="en-US" b="1" dirty="0" smtClean="0">
+                <a:latin typeface="Courier New" panose="02070309020205020404" pitchFamily="49" charset="0"/>
+                <a:cs typeface="Courier New" panose="02070309020205020404" pitchFamily="49" charset="0"/>
+              </a:rPr>
+              <a:t> </a:t>
+            </a:r>
+            <a:r>
+              <a:rPr lang="en-US" b="1" dirty="0" smtClean="0">
+                <a:latin typeface="Courier New" panose="02070309020205020404" pitchFamily="49" charset="0"/>
+                <a:cs typeface="Courier New" panose="02070309020205020404" pitchFamily="49" charset="0"/>
+              </a:rPr>
+              <a:t>23 </a:t>
+            </a:r>
+            <a:r>
+              <a:rPr lang="en-US" b="1" dirty="0" smtClean="0">
+                <a:latin typeface="Courier New" panose="02070309020205020404" pitchFamily="49" charset="0"/>
+                <a:cs typeface="Courier New" panose="02070309020205020404" pitchFamily="49" charset="0"/>
+              </a:rPr>
+              <a:t>11 </a:t>
+            </a:r>
+            <a:r>
+              <a:rPr lang="en-US" b="1" dirty="0" smtClean="0">
+                <a:latin typeface="Courier New" panose="02070309020205020404" pitchFamily="49" charset="0"/>
+                <a:cs typeface="Courier New" panose="02070309020205020404" pitchFamily="49" charset="0"/>
+              </a:rPr>
+              <a:t>- SCLK</a:t>
+            </a:r>
+            <a:endParaRPr lang="en-US" b="1" dirty="0">
+              <a:latin typeface="Courier New" panose="02070309020205020404" pitchFamily="49" charset="0"/>
+              <a:cs typeface="Courier New" panose="02070309020205020404" pitchFamily="49" charset="0"/>
+            </a:endParaRPr>
+          </a:p>
+          <a:p>
+            <a:r>
+              <a:rPr lang="en-US" b="1" dirty="0" smtClean="0">
+                <a:latin typeface="Courier New" panose="02070309020205020404" pitchFamily="49" charset="0"/>
+                <a:cs typeface="Courier New" panose="02070309020205020404" pitchFamily="49" charset="0"/>
+              </a:rPr>
+              <a:t> </a:t>
+            </a:r>
+            <a:r>
+              <a:rPr lang="en-US" b="1" dirty="0" smtClean="0">
+                <a:latin typeface="Courier New" panose="02070309020205020404" pitchFamily="49" charset="0"/>
+                <a:cs typeface="Courier New" panose="02070309020205020404" pitchFamily="49" charset="0"/>
+              </a:rPr>
+              <a:t>32 </a:t>
+            </a:r>
+            <a:r>
+              <a:rPr lang="en-US" b="1" dirty="0" smtClean="0">
+                <a:latin typeface="Courier New" panose="02070309020205020404" pitchFamily="49" charset="0"/>
+                <a:cs typeface="Courier New" panose="02070309020205020404" pitchFamily="49" charset="0"/>
+              </a:rPr>
+              <a:t>12 </a:t>
+            </a:r>
+            <a:r>
+              <a:rPr lang="en-US" b="1" dirty="0" smtClean="0">
+                <a:latin typeface="Courier New" panose="02070309020205020404" pitchFamily="49" charset="0"/>
+                <a:cs typeface="Courier New" panose="02070309020205020404" pitchFamily="49" charset="0"/>
+              </a:rPr>
+              <a:t>- SW </a:t>
+            </a:r>
+            <a:r>
+              <a:rPr lang="en-US" b="1" dirty="0">
+                <a:latin typeface="Courier New" panose="02070309020205020404" pitchFamily="49" charset="0"/>
+                <a:cs typeface="Courier New" panose="02070309020205020404" pitchFamily="49" charset="0"/>
+              </a:rPr>
+              <a:t>1</a:t>
+            </a:r>
+          </a:p>
+          <a:p>
+            <a:r>
+              <a:rPr lang="en-US" b="1" dirty="0" smtClean="0">
+                <a:latin typeface="Courier New" panose="02070309020205020404" pitchFamily="49" charset="0"/>
+                <a:cs typeface="Courier New" panose="02070309020205020404" pitchFamily="49" charset="0"/>
+              </a:rPr>
+              <a:t> </a:t>
+            </a:r>
+            <a:r>
+              <a:rPr lang="en-US" b="1" dirty="0" smtClean="0">
+                <a:latin typeface="Courier New" panose="02070309020205020404" pitchFamily="49" charset="0"/>
+                <a:cs typeface="Courier New" panose="02070309020205020404" pitchFamily="49" charset="0"/>
+              </a:rPr>
+              <a:t>33 </a:t>
+            </a:r>
+            <a:r>
+              <a:rPr lang="en-US" b="1" dirty="0" smtClean="0">
+                <a:latin typeface="Courier New" panose="02070309020205020404" pitchFamily="49" charset="0"/>
+                <a:cs typeface="Courier New" panose="02070309020205020404" pitchFamily="49" charset="0"/>
+              </a:rPr>
+              <a:t>13 </a:t>
+            </a:r>
+            <a:r>
+              <a:rPr lang="en-US" b="1" dirty="0">
+                <a:latin typeface="Courier New" panose="02070309020205020404" pitchFamily="49" charset="0"/>
+                <a:cs typeface="Courier New" panose="02070309020205020404" pitchFamily="49" charset="0"/>
+              </a:rPr>
+              <a:t>-</a:t>
+            </a:r>
+            <a:r>
+              <a:rPr lang="en-US" b="1" dirty="0" smtClean="0">
+                <a:latin typeface="Courier New" panose="02070309020205020404" pitchFamily="49" charset="0"/>
+                <a:cs typeface="Courier New" panose="02070309020205020404" pitchFamily="49" charset="0"/>
+              </a:rPr>
+              <a:t> SW </a:t>
             </a:r>
             <a:r>
               <a:rPr lang="en-US" b="1" dirty="0" smtClean="0">
@@ -4350,8 +4679,8 @@
         </p:nvSpPr>
         <p:spPr>
           <a:xfrm>
-            <a:off x="8569236" y="1332653"/>
-            <a:ext cx="2395126" cy="1477328"/>
+            <a:off x="9133680" y="858520"/>
+            <a:ext cx="2395126" cy="1754326"/>
           </a:xfrm>
           <a:prstGeom prst="rect">
             <a:avLst/>
@@ -4369,34 +4698,70 @@
                 <a:latin typeface="Courier New" panose="02070309020205020404" pitchFamily="49" charset="0"/>
                 <a:cs typeface="Courier New" panose="02070309020205020404" pitchFamily="49" charset="0"/>
               </a:rPr>
-              <a:t>PIN</a:t>
-            </a:r>
-          </a:p>
-          <a:p>
-            <a:r>
-              <a:rPr lang="en-US" b="1" dirty="0" smtClean="0">
-                <a:latin typeface="Courier New" panose="02070309020205020404" pitchFamily="49" charset="0"/>
-                <a:cs typeface="Courier New" panose="02070309020205020404" pitchFamily="49" charset="0"/>
-              </a:rPr>
-              <a:t> 2 - +5V</a:t>
-            </a:r>
-          </a:p>
-          <a:p>
-            <a:r>
-              <a:rPr lang="en-US" b="1" dirty="0" smtClean="0">
-                <a:latin typeface="Courier New" panose="02070309020205020404" pitchFamily="49" charset="0"/>
-                <a:cs typeface="Courier New" panose="02070309020205020404" pitchFamily="49" charset="0"/>
-              </a:rPr>
-              <a:t> 4 - +5V (SPKR)</a:t>
-            </a:r>
-          </a:p>
-          <a:p>
-            <a:r>
-              <a:rPr lang="en-US" b="1" dirty="0" smtClean="0">
-                <a:latin typeface="Courier New" panose="02070309020205020404" pitchFamily="49" charset="0"/>
-                <a:cs typeface="Courier New" panose="02070309020205020404" pitchFamily="49" charset="0"/>
-              </a:rPr>
-              <a:t> 6 </a:t>
+              <a:t> PIN</a:t>
+            </a:r>
+            <a:endParaRPr lang="en-US" b="1" dirty="0" smtClean="0">
+              <a:latin typeface="Courier New" panose="02070309020205020404" pitchFamily="49" charset="0"/>
+              <a:cs typeface="Courier New" panose="02070309020205020404" pitchFamily="49" charset="0"/>
+            </a:endParaRPr>
+          </a:p>
+          <a:p>
+            <a:r>
+              <a:rPr lang="en-US" b="1" dirty="0" smtClean="0">
+                <a:latin typeface="Courier New" panose="02070309020205020404" pitchFamily="49" charset="0"/>
+                <a:cs typeface="Courier New" panose="02070309020205020404" pitchFamily="49" charset="0"/>
+              </a:rPr>
+              <a:t>  </a:t>
+            </a:r>
+            <a:r>
+              <a:rPr lang="en-US" b="1" dirty="0" smtClean="0">
+                <a:latin typeface="Courier New" panose="02070309020205020404" pitchFamily="49" charset="0"/>
+                <a:cs typeface="Courier New" panose="02070309020205020404" pitchFamily="49" charset="0"/>
+              </a:rPr>
+              <a:t>2 - +5V</a:t>
+            </a:r>
+          </a:p>
+          <a:p>
+            <a:r>
+              <a:rPr lang="en-US" b="1" dirty="0" smtClean="0">
+                <a:latin typeface="Courier New" panose="02070309020205020404" pitchFamily="49" charset="0"/>
+                <a:cs typeface="Courier New" panose="02070309020205020404" pitchFamily="49" charset="0"/>
+              </a:rPr>
+              <a:t>  </a:t>
+            </a:r>
+            <a:r>
+              <a:rPr lang="en-US" b="1" dirty="0" smtClean="0">
+                <a:latin typeface="Courier New" panose="02070309020205020404" pitchFamily="49" charset="0"/>
+                <a:cs typeface="Courier New" panose="02070309020205020404" pitchFamily="49" charset="0"/>
+              </a:rPr>
+              <a:t>4 - +5V (SPKR</a:t>
+            </a:r>
+            <a:r>
+              <a:rPr lang="en-US" b="1" dirty="0" smtClean="0">
+                <a:latin typeface="Courier New" panose="02070309020205020404" pitchFamily="49" charset="0"/>
+                <a:cs typeface="Courier New" panose="02070309020205020404" pitchFamily="49" charset="0"/>
+              </a:rPr>
+              <a:t>)</a:t>
+            </a:r>
+            <a:endParaRPr lang="en-US" b="1" dirty="0" smtClean="0">
+              <a:latin typeface="Courier New" panose="02070309020205020404" pitchFamily="49" charset="0"/>
+              <a:cs typeface="Courier New" panose="02070309020205020404" pitchFamily="49" charset="0"/>
+            </a:endParaRPr>
+          </a:p>
+          <a:p>
+            <a:r>
+              <a:rPr lang="en-US" b="1" dirty="0" smtClean="0">
+                <a:latin typeface="Courier New" panose="02070309020205020404" pitchFamily="49" charset="0"/>
+                <a:cs typeface="Courier New" panose="02070309020205020404" pitchFamily="49" charset="0"/>
+              </a:rPr>
+              <a:t>  </a:t>
+            </a:r>
+            <a:r>
+              <a:rPr lang="en-US" b="1" dirty="0" smtClean="0">
+                <a:latin typeface="Courier New" panose="02070309020205020404" pitchFamily="49" charset="0"/>
+                <a:cs typeface="Courier New" panose="02070309020205020404" pitchFamily="49" charset="0"/>
+              </a:rPr>
+              <a:t>6 </a:t>
             </a:r>
             <a:r>
               <a:rPr lang="mr-IN" b="1" dirty="0" smtClean="0">
@@ -4415,23 +4780,211 @@
           </a:p>
           <a:p>
             <a:r>
-              <a:rPr lang="en-US" b="1" dirty="0">
-                <a:latin typeface="Courier New" panose="02070309020205020404" pitchFamily="49" charset="0"/>
-                <a:cs typeface="Courier New" panose="02070309020205020404" pitchFamily="49" charset="0"/>
-              </a:rPr>
-              <a:t> </a:t>
-            </a:r>
-            <a:r>
-              <a:rPr lang="en-US" b="1" dirty="0" smtClean="0">
-                <a:latin typeface="Courier New" panose="02070309020205020404" pitchFamily="49" charset="0"/>
-                <a:cs typeface="Courier New" panose="02070309020205020404" pitchFamily="49" charset="0"/>
-              </a:rPr>
-              <a:t>* - 3.3V Logic</a:t>
+              <a:rPr lang="en-US" b="1" dirty="0" smtClean="0">
+                <a:latin typeface="Courier New" panose="02070309020205020404" pitchFamily="49" charset="0"/>
+                <a:cs typeface="Courier New" panose="02070309020205020404" pitchFamily="49" charset="0"/>
+              </a:rPr>
+              <a:t>  </a:t>
+            </a:r>
+            <a:r>
+              <a:rPr lang="en-US" b="1" dirty="0" smtClean="0">
+                <a:latin typeface="Courier New" panose="02070309020205020404" pitchFamily="49" charset="0"/>
+                <a:cs typeface="Courier New" panose="02070309020205020404" pitchFamily="49" charset="0"/>
+              </a:rPr>
+              <a:t>* - 3.3V </a:t>
+            </a:r>
+            <a:r>
+              <a:rPr lang="en-US" b="1" dirty="0" smtClean="0">
+                <a:latin typeface="Courier New" panose="02070309020205020404" pitchFamily="49" charset="0"/>
+                <a:cs typeface="Courier New" panose="02070309020205020404" pitchFamily="49" charset="0"/>
+              </a:rPr>
+              <a:t>Logic</a:t>
+            </a:r>
+          </a:p>
+          <a:p>
+            <a:r>
+              <a:rPr lang="en-US" b="1" dirty="0" smtClean="0">
+                <a:latin typeface="Courier New" panose="02070309020205020404" pitchFamily="49" charset="0"/>
+                <a:cs typeface="Courier New" panose="02070309020205020404" pitchFamily="49" charset="0"/>
+              </a:rPr>
+              <a:t>BCM - </a:t>
+            </a:r>
+            <a:r>
+              <a:rPr lang="en-US" b="1" dirty="0" err="1" smtClean="0">
+                <a:latin typeface="Courier New" panose="02070309020205020404" pitchFamily="49" charset="0"/>
+                <a:cs typeface="Courier New" panose="02070309020205020404" pitchFamily="49" charset="0"/>
+              </a:rPr>
+              <a:t>RPi</a:t>
+            </a:r>
+            <a:r>
+              <a:rPr lang="en-US" b="1" dirty="0" smtClean="0">
+                <a:latin typeface="Courier New" panose="02070309020205020404" pitchFamily="49" charset="0"/>
+                <a:cs typeface="Courier New" panose="02070309020205020404" pitchFamily="49" charset="0"/>
+              </a:rPr>
+              <a:t> 3</a:t>
             </a:r>
             <a:endParaRPr lang="en-US" b="1" dirty="0">
               <a:latin typeface="Courier New" panose="02070309020205020404" pitchFamily="49" charset="0"/>
               <a:cs typeface="Courier New" panose="02070309020205020404" pitchFamily="49" charset="0"/>
             </a:endParaRPr>
+          </a:p>
+        </p:txBody>
+      </p:sp>
+      <p:grpSp>
+        <p:nvGrpSpPr>
+          <p:cNvPr id="8" name="Group 7"/>
+          <p:cNvGrpSpPr/>
+          <p:nvPr/>
+        </p:nvGrpSpPr>
+        <p:grpSpPr>
+          <a:xfrm>
+            <a:off x="3151801" y="2852211"/>
+            <a:ext cx="276999" cy="1337122"/>
+            <a:chOff x="5592793" y="2581275"/>
+            <a:chExt cx="276999" cy="1850766"/>
+          </a:xfrm>
+        </p:grpSpPr>
+        <p:cxnSp>
+          <p:nvCxnSpPr>
+            <p:cNvPr id="11" name="Straight Connector 10"/>
+            <p:cNvCxnSpPr>
+              <a:cxnSpLocks/>
+            </p:cNvCxnSpPr>
+            <p:nvPr/>
+          </p:nvCxnSpPr>
+          <p:spPr>
+            <a:xfrm>
+              <a:off x="5731293" y="2581275"/>
+              <a:ext cx="0" cy="1850766"/>
+            </a:xfrm>
+            <a:prstGeom prst="line">
+              <a:avLst/>
+            </a:prstGeom>
+            <a:ln w="76200">
+              <a:solidFill>
+                <a:schemeClr val="tx1"/>
+              </a:solidFill>
+            </a:ln>
+          </p:spPr>
+          <p:style>
+            <a:lnRef idx="1">
+              <a:schemeClr val="accent1"/>
+            </a:lnRef>
+            <a:fillRef idx="0">
+              <a:schemeClr val="accent1"/>
+            </a:fillRef>
+            <a:effectRef idx="0">
+              <a:schemeClr val="accent1"/>
+            </a:effectRef>
+            <a:fontRef idx="minor">
+              <a:schemeClr val="tx1"/>
+            </a:fontRef>
+          </p:style>
+        </p:cxnSp>
+        <p:sp>
+          <p:nvSpPr>
+            <p:cNvPr id="12" name="TextBox 11"/>
+            <p:cNvSpPr txBox="1"/>
+            <p:nvPr/>
+          </p:nvSpPr>
+          <p:spPr>
+            <a:xfrm rot="16200000">
+              <a:off x="5404201" y="3368158"/>
+              <a:ext cx="654184" cy="276999"/>
+            </a:xfrm>
+            <a:prstGeom prst="rect">
+              <a:avLst/>
+            </a:prstGeom>
+            <a:solidFill>
+              <a:schemeClr val="bg1"/>
+            </a:solidFill>
+          </p:spPr>
+          <p:txBody>
+            <a:bodyPr wrap="square" rtlCol="0">
+              <a:spAutoFit/>
+            </a:bodyPr>
+            <a:lstStyle/>
+            <a:p>
+              <a:r>
+                <a:rPr lang="en-US" sz="1200" b="1" dirty="0" smtClean="0">
+                  <a:latin typeface="Courier New" panose="02070309020205020404" pitchFamily="49" charset="0"/>
+                  <a:cs typeface="Courier New" panose="02070309020205020404" pitchFamily="49" charset="0"/>
+                </a:rPr>
+                <a:t>SPI</a:t>
+              </a:r>
+              <a:endParaRPr lang="en-US" sz="1200" b="1" dirty="0">
+                <a:latin typeface="Courier New" panose="02070309020205020404" pitchFamily="49" charset="0"/>
+                <a:cs typeface="Courier New" panose="02070309020205020404" pitchFamily="49" charset="0"/>
+              </a:endParaRPr>
+            </a:p>
+          </p:txBody>
+        </p:sp>
+      </p:grpSp>
+      <p:sp>
+        <p:nvSpPr>
+          <p:cNvPr id="16" name="TextBox 15"/>
+          <p:cNvSpPr txBox="1"/>
+          <p:nvPr/>
+        </p:nvSpPr>
+        <p:spPr>
+          <a:xfrm>
+            <a:off x="779332" y="1036921"/>
+            <a:ext cx="462446" cy="1200329"/>
+          </a:xfrm>
+          <a:prstGeom prst="rect">
+            <a:avLst/>
+          </a:prstGeom>
+          <a:noFill/>
+        </p:spPr>
+        <p:txBody>
+          <a:bodyPr wrap="square" rtlCol="0">
+            <a:spAutoFit/>
+          </a:bodyPr>
+          <a:lstStyle/>
+          <a:p>
+            <a:r>
+              <a:rPr lang="en-US" b="1" dirty="0">
+                <a:latin typeface="Courier New" charset="0"/>
+                <a:ea typeface="Courier New" charset="0"/>
+                <a:cs typeface="Courier New" charset="0"/>
+              </a:rPr>
+              <a:t>1</a:t>
+            </a:r>
+            <a:endParaRPr lang="en-US" b="1" dirty="0" smtClean="0">
+              <a:latin typeface="Courier New" charset="0"/>
+              <a:ea typeface="Courier New" charset="0"/>
+              <a:cs typeface="Courier New" charset="0"/>
+            </a:endParaRPr>
+          </a:p>
+          <a:p>
+            <a:r>
+              <a:rPr lang="en-US" b="1" dirty="0" smtClean="0">
+                <a:latin typeface="Courier New" charset="0"/>
+                <a:ea typeface="Courier New" charset="0"/>
+                <a:cs typeface="Courier New" charset="0"/>
+              </a:rPr>
+              <a:t>▲</a:t>
+            </a:r>
+          </a:p>
+          <a:p>
+            <a:r>
+              <a:rPr lang="en-US" b="1" dirty="0" smtClean="0">
+                <a:latin typeface="Courier New" charset="0"/>
+                <a:ea typeface="Courier New" charset="0"/>
+                <a:cs typeface="Courier New" charset="0"/>
+              </a:rPr>
+              <a:t>▼</a:t>
+            </a:r>
+          </a:p>
+          <a:p>
+            <a:r>
+              <a:rPr lang="en-US" b="1" dirty="0" smtClean="0">
+                <a:latin typeface="Courier New" charset="0"/>
+                <a:ea typeface="Courier New" charset="0"/>
+                <a:cs typeface="Courier New" charset="0"/>
+              </a:rPr>
+              <a:t>0</a:t>
+            </a:r>
           </a:p>
         </p:txBody>
       </p:sp>
@@ -4474,7 +5027,7 @@
         <p:spPr>
           <a:xfrm>
             <a:off x="4023360" y="1371600"/>
-            <a:ext cx="3961341" cy="4247317"/>
+            <a:ext cx="3961341" cy="4801314"/>
           </a:xfrm>
           <a:prstGeom prst="rect">
             <a:avLst/>
@@ -4546,7 +5099,44 @@
                 <a:latin typeface="Courier New" panose="02070309020205020404" pitchFamily="49" charset="0"/>
                 <a:cs typeface="Courier New" panose="02070309020205020404" pitchFamily="49" charset="0"/>
               </a:rPr>
-              <a:t>   0.1µF</a:t>
+              <a:t>   </a:t>
+            </a:r>
+            <a:r>
+              <a:rPr lang="en-US" b="1" dirty="0" smtClean="0">
+                <a:latin typeface="Courier New" panose="02070309020205020404" pitchFamily="49" charset="0"/>
+                <a:cs typeface="Courier New" panose="02070309020205020404" pitchFamily="49" charset="0"/>
+              </a:rPr>
+              <a:t>0.1µF</a:t>
+            </a:r>
+          </a:p>
+          <a:p>
+            <a:r>
+              <a:rPr lang="en-US" b="1" dirty="0" smtClean="0">
+                <a:latin typeface="Courier New" panose="02070309020205020404" pitchFamily="49" charset="0"/>
+                <a:cs typeface="Courier New" panose="02070309020205020404" pitchFamily="49" charset="0"/>
+              </a:rPr>
+              <a:t>Q1-7</a:t>
+            </a:r>
+            <a:r>
+              <a:rPr lang="en-US" b="1" dirty="0" smtClean="0">
+                <a:latin typeface="Courier New" panose="02070309020205020404" pitchFamily="49" charset="0"/>
+                <a:cs typeface="Courier New" panose="02070309020205020404" pitchFamily="49" charset="0"/>
+              </a:rPr>
+              <a:t>:</a:t>
+            </a:r>
+            <a:r>
+              <a:rPr lang="en-US" b="1" dirty="0">
+                <a:latin typeface="Courier New" panose="02070309020205020404" pitchFamily="49" charset="0"/>
+                <a:cs typeface="Courier New" panose="02070309020205020404" pitchFamily="49" charset="0"/>
+              </a:rPr>
+              <a:t>		</a:t>
+            </a:r>
+            <a:r>
+              <a:rPr lang="en-US" b="1" dirty="0" smtClean="0">
+                <a:latin typeface="Courier New" panose="02070309020205020404" pitchFamily="49" charset="0"/>
+                <a:cs typeface="Courier New" panose="02070309020205020404" pitchFamily="49" charset="0"/>
+              </a:rPr>
+              <a:t>   NPN</a:t>
             </a:r>
             <a:endParaRPr lang="en-US" b="1" dirty="0">
               <a:latin typeface="Courier New" panose="02070309020205020404" pitchFamily="49" charset="0"/>
@@ -4559,28 +5149,21 @@
                 <a:latin typeface="Courier New" panose="02070309020205020404" pitchFamily="49" charset="0"/>
                 <a:cs typeface="Courier New" panose="02070309020205020404" pitchFamily="49" charset="0"/>
               </a:rPr>
-              <a:t>SP1:		</a:t>
-            </a:r>
-            <a:r>
-              <a:rPr lang="en-US" b="1" dirty="0" smtClean="0">
-                <a:latin typeface="Courier New" panose="02070309020205020404" pitchFamily="49" charset="0"/>
-                <a:cs typeface="Courier New" panose="02070309020205020404" pitchFamily="49" charset="0"/>
-              </a:rPr>
-              <a:t>   8Ω</a:t>
-            </a:r>
-            <a:r>
-              <a:rPr lang="en-US" b="1" dirty="0">
-                <a:latin typeface="Courier New" panose="02070309020205020404" pitchFamily="49" charset="0"/>
-                <a:cs typeface="Courier New" panose="02070309020205020404" pitchFamily="49" charset="0"/>
-              </a:rPr>
-              <a:t>, </a:t>
-            </a:r>
-            <a:r>
-              <a:rPr lang="en-US" b="1" dirty="0" smtClean="0">
-                <a:latin typeface="Courier New" panose="02070309020205020404" pitchFamily="49" charset="0"/>
-                <a:cs typeface="Courier New" panose="02070309020205020404" pitchFamily="49" charset="0"/>
-              </a:rPr>
-              <a:t>&gt; 0.15W</a:t>
+              <a:t>Q8:	</a:t>
+            </a:r>
+            <a:r>
+              <a:rPr lang="en-US" b="1" dirty="0" err="1" smtClean="0">
+                <a:latin typeface="Courier New" panose="02070309020205020404" pitchFamily="49" charset="0"/>
+                <a:cs typeface="Courier New" panose="02070309020205020404" pitchFamily="49" charset="0"/>
+              </a:rPr>
+              <a:t>Phototrans</a:t>
+            </a:r>
+            <a:r>
+              <a:rPr lang="en-US" b="1" dirty="0" smtClean="0">
+                <a:latin typeface="Courier New" panose="02070309020205020404" pitchFamily="49" charset="0"/>
+                <a:cs typeface="Courier New" panose="02070309020205020404" pitchFamily="49" charset="0"/>
+              </a:rPr>
+              <a:t>. R27 Adj.</a:t>
             </a:r>
             <a:endParaRPr lang="en-US" b="1" dirty="0">
               <a:latin typeface="Courier New" panose="02070309020205020404" pitchFamily="49" charset="0"/>
@@ -4589,25 +5172,18 @@
           </a:p>
           <a:p>
             <a:r>
-              <a:rPr lang="en-US" b="1" dirty="0" smtClean="0">
-                <a:latin typeface="Courier New" panose="02070309020205020404" pitchFamily="49" charset="0"/>
-                <a:cs typeface="Courier New" panose="02070309020205020404" pitchFamily="49" charset="0"/>
-              </a:rPr>
-              <a:t>Q1-7:</a:t>
-            </a:r>
-            <a:r>
-              <a:rPr lang="en-US" b="1" dirty="0">
-                <a:latin typeface="Courier New" panose="02070309020205020404" pitchFamily="49" charset="0"/>
-                <a:cs typeface="Courier New" panose="02070309020205020404" pitchFamily="49" charset="0"/>
-              </a:rPr>
-              <a:t>		</a:t>
-            </a:r>
-            <a:r>
-              <a:rPr lang="en-US" b="1" dirty="0" smtClean="0">
-                <a:latin typeface="Courier New" panose="02070309020205020404" pitchFamily="49" charset="0"/>
-                <a:cs typeface="Courier New" panose="02070309020205020404" pitchFamily="49" charset="0"/>
-              </a:rPr>
-              <a:t>   NPN</a:t>
+              <a:rPr lang="en-US" b="1" dirty="0">
+                <a:latin typeface="Courier New" panose="02070309020205020404" pitchFamily="49" charset="0"/>
+                <a:cs typeface="Courier New" panose="02070309020205020404" pitchFamily="49" charset="0"/>
+              </a:rPr>
+              <a:t>POT1:		</a:t>
+            </a:r>
+            <a:r>
+              <a:rPr lang="en-US" b="1" dirty="0" smtClean="0">
+                <a:latin typeface="Courier New" panose="02070309020205020404" pitchFamily="49" charset="0"/>
+                <a:cs typeface="Courier New" panose="02070309020205020404" pitchFamily="49" charset="0"/>
+              </a:rPr>
+              <a:t>   10kΩ</a:t>
             </a:r>
             <a:endParaRPr lang="en-US" b="1" dirty="0">
               <a:latin typeface="Courier New" panose="02070309020205020404" pitchFamily="49" charset="0"/>
@@ -4620,21 +5196,14 @@
                 <a:latin typeface="Courier New" panose="02070309020205020404" pitchFamily="49" charset="0"/>
                 <a:cs typeface="Courier New" panose="02070309020205020404" pitchFamily="49" charset="0"/>
               </a:rPr>
-              <a:t>Q8:	</a:t>
-            </a:r>
-            <a:r>
-              <a:rPr lang="en-US" b="1" dirty="0" err="1" smtClean="0">
-                <a:latin typeface="Courier New" panose="02070309020205020404" pitchFamily="49" charset="0"/>
-                <a:cs typeface="Courier New" panose="02070309020205020404" pitchFamily="49" charset="0"/>
-              </a:rPr>
-              <a:t>Phototrans</a:t>
-            </a:r>
-            <a:r>
-              <a:rPr lang="en-US" b="1" dirty="0" smtClean="0">
-                <a:latin typeface="Courier New" panose="02070309020205020404" pitchFamily="49" charset="0"/>
-                <a:cs typeface="Courier New" panose="02070309020205020404" pitchFamily="49" charset="0"/>
-              </a:rPr>
-              <a:t>. R27 Adj.</a:t>
+              <a:t>R1-10, 15-19:	</a:t>
+            </a:r>
+            <a:r>
+              <a:rPr lang="en-US" b="1" dirty="0" smtClean="0">
+                <a:latin typeface="Courier New" panose="02070309020205020404" pitchFamily="49" charset="0"/>
+                <a:cs typeface="Courier New" panose="02070309020205020404" pitchFamily="49" charset="0"/>
+              </a:rPr>
+              <a:t>   47kΩ</a:t>
             </a:r>
             <a:endParaRPr lang="en-US" b="1" dirty="0">
               <a:latin typeface="Courier New" panose="02070309020205020404" pitchFamily="49" charset="0"/>
@@ -4643,18 +5212,25 @@
           </a:p>
           <a:p>
             <a:r>
-              <a:rPr lang="en-US" b="1" dirty="0">
-                <a:latin typeface="Courier New" panose="02070309020205020404" pitchFamily="49" charset="0"/>
-                <a:cs typeface="Courier New" panose="02070309020205020404" pitchFamily="49" charset="0"/>
-              </a:rPr>
-              <a:t>POT1:		</a:t>
-            </a:r>
-            <a:r>
-              <a:rPr lang="en-US" b="1" dirty="0" smtClean="0">
-                <a:latin typeface="Courier New" panose="02070309020205020404" pitchFamily="49" charset="0"/>
-                <a:cs typeface="Courier New" panose="02070309020205020404" pitchFamily="49" charset="0"/>
-              </a:rPr>
-              <a:t>   10kΩ</a:t>
+              <a:rPr lang="en-US" b="1" dirty="0" smtClean="0">
+                <a:latin typeface="Courier New" panose="02070309020205020404" pitchFamily="49" charset="0"/>
+                <a:cs typeface="Courier New" panose="02070309020205020404" pitchFamily="49" charset="0"/>
+              </a:rPr>
+              <a:t>R11-14:</a:t>
+            </a:r>
+            <a:r>
+              <a:rPr lang="en-US" b="1" dirty="0">
+                <a:latin typeface="Courier New" panose="02070309020205020404" pitchFamily="49" charset="0"/>
+                <a:cs typeface="Courier New" panose="02070309020205020404" pitchFamily="49" charset="0"/>
+              </a:rPr>
+              <a:t>	</a:t>
+            </a:r>
+            <a:r>
+              <a:rPr lang="en-US" b="1" dirty="0" smtClean="0">
+                <a:latin typeface="Courier New" panose="02070309020205020404" pitchFamily="49" charset="0"/>
+                <a:cs typeface="Courier New" panose="02070309020205020404" pitchFamily="49" charset="0"/>
+              </a:rPr>
+              <a:t>   220kΩ</a:t>
             </a:r>
             <a:endParaRPr lang="en-US" b="1" dirty="0">
               <a:latin typeface="Courier New" panose="02070309020205020404" pitchFamily="49" charset="0"/>
@@ -4667,14 +5243,14 @@
                 <a:latin typeface="Courier New" panose="02070309020205020404" pitchFamily="49" charset="0"/>
                 <a:cs typeface="Courier New" panose="02070309020205020404" pitchFamily="49" charset="0"/>
               </a:rPr>
-              <a:t>R1-10, 15-19:	</a:t>
-            </a:r>
-            <a:r>
-              <a:rPr lang="en-US" b="1" dirty="0" smtClean="0">
-                <a:latin typeface="Courier New" panose="02070309020205020404" pitchFamily="49" charset="0"/>
-                <a:cs typeface="Courier New" panose="02070309020205020404" pitchFamily="49" charset="0"/>
-              </a:rPr>
-              <a:t>   47kΩ</a:t>
+              <a:t>R20-22:	</a:t>
+            </a:r>
+            <a:r>
+              <a:rPr lang="en-US" b="1" dirty="0" smtClean="0">
+                <a:latin typeface="Courier New" panose="02070309020205020404" pitchFamily="49" charset="0"/>
+                <a:cs typeface="Courier New" panose="02070309020205020404" pitchFamily="49" charset="0"/>
+              </a:rPr>
+              <a:t>   100Ω</a:t>
             </a:r>
             <a:endParaRPr lang="en-US" b="1" dirty="0">
               <a:latin typeface="Courier New" panose="02070309020205020404" pitchFamily="49" charset="0"/>
@@ -4683,32 +5259,77 @@
           </a:p>
           <a:p>
             <a:r>
-              <a:rPr lang="en-US" b="1" dirty="0" smtClean="0">
-                <a:latin typeface="Courier New" panose="02070309020205020404" pitchFamily="49" charset="0"/>
-                <a:cs typeface="Courier New" panose="02070309020205020404" pitchFamily="49" charset="0"/>
-              </a:rPr>
-              <a:t>R11-14</a:t>
-            </a:r>
-            <a:r>
-              <a:rPr lang="en-US" b="1" dirty="0" smtClean="0">
-                <a:latin typeface="Courier New" panose="02070309020205020404" pitchFamily="49" charset="0"/>
-                <a:cs typeface="Courier New" panose="02070309020205020404" pitchFamily="49" charset="0"/>
-              </a:rPr>
-              <a:t>:</a:t>
-            </a:r>
-            <a:r>
-              <a:rPr lang="en-US" b="1" dirty="0">
-                <a:latin typeface="Courier New" panose="02070309020205020404" pitchFamily="49" charset="0"/>
-                <a:cs typeface="Courier New" panose="02070309020205020404" pitchFamily="49" charset="0"/>
-              </a:rPr>
-              <a:t>	</a:t>
-            </a:r>
-            <a:r>
-              <a:rPr lang="en-US" b="1" dirty="0" smtClean="0">
-                <a:latin typeface="Courier New" panose="02070309020205020404" pitchFamily="49" charset="0"/>
-                <a:cs typeface="Courier New" panose="02070309020205020404" pitchFamily="49" charset="0"/>
-              </a:rPr>
-              <a:t>   220kΩ</a:t>
+              <a:rPr lang="en-US" b="1" dirty="0">
+                <a:latin typeface="Courier New" panose="02070309020205020404" pitchFamily="49" charset="0"/>
+                <a:cs typeface="Courier New" panose="02070309020205020404" pitchFamily="49" charset="0"/>
+              </a:rPr>
+              <a:t>R23:		</a:t>
+            </a:r>
+            <a:r>
+              <a:rPr lang="en-US" b="1" dirty="0" smtClean="0">
+                <a:latin typeface="Courier New" panose="02070309020205020404" pitchFamily="49" charset="0"/>
+                <a:cs typeface="Courier New" panose="02070309020205020404" pitchFamily="49" charset="0"/>
+              </a:rPr>
+              <a:t>   22kΩ</a:t>
+            </a:r>
+          </a:p>
+          <a:p>
+            <a:r>
+              <a:rPr lang="en-US" b="1" dirty="0" smtClean="0">
+                <a:latin typeface="Courier New" panose="02070309020205020404" pitchFamily="49" charset="0"/>
+                <a:cs typeface="Courier New" panose="02070309020205020404" pitchFamily="49" charset="0"/>
+              </a:rPr>
+              <a:t>R24:		   200</a:t>
+            </a:r>
+            <a:r>
+              <a:rPr lang="en-US" b="1" dirty="0">
+                <a:latin typeface="Courier New" panose="02070309020205020404" pitchFamily="49" charset="0"/>
+                <a:cs typeface="Courier New" panose="02070309020205020404" pitchFamily="49" charset="0"/>
+              </a:rPr>
+              <a:t>Ω</a:t>
+            </a:r>
+            <a:endParaRPr lang="en-US" b="1" dirty="0" smtClean="0">
+              <a:latin typeface="Courier New" panose="02070309020205020404" pitchFamily="49" charset="0"/>
+              <a:cs typeface="Courier New" panose="02070309020205020404" pitchFamily="49" charset="0"/>
+            </a:endParaRPr>
+          </a:p>
+          <a:p>
+            <a:r>
+              <a:rPr lang="en-US" b="1" dirty="0">
+                <a:latin typeface="Courier New" panose="02070309020205020404" pitchFamily="49" charset="0"/>
+                <a:cs typeface="Courier New" panose="02070309020205020404" pitchFamily="49" charset="0"/>
+              </a:rPr>
+              <a:t>R25, 26:	   </a:t>
+            </a:r>
+            <a:r>
+              <a:rPr lang="en-US" b="1" dirty="0" smtClean="0">
+                <a:latin typeface="Courier New" panose="02070309020205020404" pitchFamily="49" charset="0"/>
+                <a:cs typeface="Courier New" panose="02070309020205020404" pitchFamily="49" charset="0"/>
+              </a:rPr>
+              <a:t>47kΩ</a:t>
+            </a:r>
+          </a:p>
+          <a:p>
+            <a:r>
+              <a:rPr lang="en-US" b="1" dirty="0" smtClean="0">
+                <a:latin typeface="Courier New" panose="02070309020205020404" pitchFamily="49" charset="0"/>
+                <a:cs typeface="Courier New" panose="02070309020205020404" pitchFamily="49" charset="0"/>
+              </a:rPr>
+              <a:t>R27</a:t>
+            </a:r>
+            <a:r>
+              <a:rPr lang="en-US" b="1" dirty="0">
+                <a:latin typeface="Courier New" panose="02070309020205020404" pitchFamily="49" charset="0"/>
+                <a:cs typeface="Courier New" panose="02070309020205020404" pitchFamily="49" charset="0"/>
+              </a:rPr>
+              <a:t>:		   </a:t>
+            </a:r>
+            <a:r>
+              <a:rPr lang="en-US" b="1" dirty="0" smtClean="0">
+                <a:latin typeface="Courier New" panose="02070309020205020404" pitchFamily="49" charset="0"/>
+                <a:cs typeface="Courier New" panose="02070309020205020404" pitchFamily="49" charset="0"/>
+              </a:rPr>
+              <a:t>100kΩ</a:t>
             </a:r>
             <a:endParaRPr lang="en-US" b="1" dirty="0">
               <a:latin typeface="Courier New" panose="02070309020205020404" pitchFamily="49" charset="0"/>
@@ -4717,137 +5338,68 @@
           </a:p>
           <a:p>
             <a:r>
-              <a:rPr lang="en-US" b="1" dirty="0">
-                <a:latin typeface="Courier New" panose="02070309020205020404" pitchFamily="49" charset="0"/>
-                <a:cs typeface="Courier New" panose="02070309020205020404" pitchFamily="49" charset="0"/>
-              </a:rPr>
-              <a:t>R20-22:	</a:t>
-            </a:r>
-            <a:r>
-              <a:rPr lang="en-US" b="1" dirty="0" smtClean="0">
-                <a:latin typeface="Courier New" panose="02070309020205020404" pitchFamily="49" charset="0"/>
-                <a:cs typeface="Courier New" panose="02070309020205020404" pitchFamily="49" charset="0"/>
-              </a:rPr>
-              <a:t>   100Ω</a:t>
+              <a:rPr lang="en-US" b="1" dirty="0" smtClean="0">
+                <a:latin typeface="Courier New" panose="02070309020205020404" pitchFamily="49" charset="0"/>
+                <a:cs typeface="Courier New" panose="02070309020205020404" pitchFamily="49" charset="0"/>
+              </a:rPr>
+              <a:t>R28:	</a:t>
+            </a:r>
+            <a:r>
+              <a:rPr lang="en-US" b="1" dirty="0">
+                <a:latin typeface="Courier New" panose="02070309020205020404" pitchFamily="49" charset="0"/>
+                <a:cs typeface="Courier New" panose="02070309020205020404" pitchFamily="49" charset="0"/>
+              </a:rPr>
+              <a:t>	</a:t>
+            </a:r>
+            <a:r>
+              <a:rPr lang="en-US" b="1" dirty="0" smtClean="0">
+                <a:latin typeface="Courier New" panose="02070309020205020404" pitchFamily="49" charset="0"/>
+                <a:cs typeface="Courier New" panose="02070309020205020404" pitchFamily="49" charset="0"/>
+              </a:rPr>
+              <a:t>   </a:t>
+            </a:r>
+            <a:r>
+              <a:rPr lang="en-US" b="1" dirty="0" smtClean="0">
+                <a:latin typeface="Courier New" panose="02070309020205020404" pitchFamily="49" charset="0"/>
+                <a:cs typeface="Courier New" panose="02070309020205020404" pitchFamily="49" charset="0"/>
+              </a:rPr>
+              <a:t>300Ω</a:t>
+            </a:r>
+          </a:p>
+          <a:p>
+            <a:r>
+              <a:rPr lang="en-US" b="1" dirty="0">
+                <a:latin typeface="Courier New" panose="02070309020205020404" pitchFamily="49" charset="0"/>
+                <a:cs typeface="Courier New" panose="02070309020205020404" pitchFamily="49" charset="0"/>
+              </a:rPr>
+              <a:t>S1-5:		   Mom. NO</a:t>
+            </a:r>
+          </a:p>
+          <a:p>
+            <a:r>
+              <a:rPr lang="en-US" b="1" dirty="0">
+                <a:latin typeface="Courier New" panose="02070309020205020404" pitchFamily="49" charset="0"/>
+                <a:cs typeface="Courier New" panose="02070309020205020404" pitchFamily="49" charset="0"/>
+              </a:rPr>
+              <a:t>S6,7:		   SPDT BBM</a:t>
+            </a:r>
+          </a:p>
+          <a:p>
+            <a:r>
+              <a:rPr lang="en-US" b="1" dirty="0">
+                <a:latin typeface="Courier New" panose="02070309020205020404" pitchFamily="49" charset="0"/>
+                <a:cs typeface="Courier New" panose="02070309020205020404" pitchFamily="49" charset="0"/>
+              </a:rPr>
+              <a:t>SP1:		   8Ω, &gt; </a:t>
+            </a:r>
+            <a:r>
+              <a:rPr lang="en-US" b="1" dirty="0" smtClean="0">
+                <a:latin typeface="Courier New" panose="02070309020205020404" pitchFamily="49" charset="0"/>
+                <a:cs typeface="Courier New" panose="02070309020205020404" pitchFamily="49" charset="0"/>
+              </a:rPr>
+              <a:t>0.15W</a:t>
             </a:r>
             <a:endParaRPr lang="en-US" b="1" dirty="0">
-              <a:latin typeface="Courier New" panose="02070309020205020404" pitchFamily="49" charset="0"/>
-              <a:cs typeface="Courier New" panose="02070309020205020404" pitchFamily="49" charset="0"/>
-            </a:endParaRPr>
-          </a:p>
-          <a:p>
-            <a:r>
-              <a:rPr lang="en-US" b="1" dirty="0">
-                <a:latin typeface="Courier New" panose="02070309020205020404" pitchFamily="49" charset="0"/>
-                <a:cs typeface="Courier New" panose="02070309020205020404" pitchFamily="49" charset="0"/>
-              </a:rPr>
-              <a:t>R23:		</a:t>
-            </a:r>
-            <a:r>
-              <a:rPr lang="en-US" b="1" dirty="0" smtClean="0">
-                <a:latin typeface="Courier New" panose="02070309020205020404" pitchFamily="49" charset="0"/>
-                <a:cs typeface="Courier New" panose="02070309020205020404" pitchFamily="49" charset="0"/>
-              </a:rPr>
-              <a:t>   22kΩ</a:t>
-            </a:r>
-          </a:p>
-          <a:p>
-            <a:r>
-              <a:rPr lang="en-US" b="1" dirty="0" smtClean="0">
-                <a:latin typeface="Courier New" panose="02070309020205020404" pitchFamily="49" charset="0"/>
-                <a:cs typeface="Courier New" panose="02070309020205020404" pitchFamily="49" charset="0"/>
-              </a:rPr>
-              <a:t>R24:		   200</a:t>
-            </a:r>
-            <a:r>
-              <a:rPr lang="en-US" b="1" dirty="0">
-                <a:latin typeface="Courier New" panose="02070309020205020404" pitchFamily="49" charset="0"/>
-                <a:cs typeface="Courier New" panose="02070309020205020404" pitchFamily="49" charset="0"/>
-              </a:rPr>
-              <a:t>Ω</a:t>
-            </a:r>
-            <a:endParaRPr lang="en-US" b="1" dirty="0" smtClean="0">
-              <a:latin typeface="Courier New" panose="02070309020205020404" pitchFamily="49" charset="0"/>
-              <a:cs typeface="Courier New" panose="02070309020205020404" pitchFamily="49" charset="0"/>
-            </a:endParaRPr>
-          </a:p>
-          <a:p>
-            <a:r>
-              <a:rPr lang="en-US" b="1" dirty="0">
-                <a:latin typeface="Courier New" panose="02070309020205020404" pitchFamily="49" charset="0"/>
-                <a:cs typeface="Courier New" panose="02070309020205020404" pitchFamily="49" charset="0"/>
-              </a:rPr>
-              <a:t>R25, 26:	   </a:t>
-            </a:r>
-            <a:r>
-              <a:rPr lang="en-US" b="1" dirty="0" smtClean="0">
-                <a:latin typeface="Courier New" panose="02070309020205020404" pitchFamily="49" charset="0"/>
-                <a:cs typeface="Courier New" panose="02070309020205020404" pitchFamily="49" charset="0"/>
-              </a:rPr>
-              <a:t>47kΩ</a:t>
-            </a:r>
-            <a:endParaRPr lang="en-US" b="1" dirty="0" smtClean="0">
-              <a:latin typeface="Courier New" panose="02070309020205020404" pitchFamily="49" charset="0"/>
-              <a:cs typeface="Courier New" panose="02070309020205020404" pitchFamily="49" charset="0"/>
-            </a:endParaRPr>
-          </a:p>
-          <a:p>
-            <a:r>
-              <a:rPr lang="en-US" b="1" dirty="0" smtClean="0">
-                <a:latin typeface="Courier New" panose="02070309020205020404" pitchFamily="49" charset="0"/>
-                <a:cs typeface="Courier New" panose="02070309020205020404" pitchFamily="49" charset="0"/>
-              </a:rPr>
-              <a:t>R27</a:t>
-            </a:r>
-            <a:r>
-              <a:rPr lang="en-US" b="1" dirty="0">
-                <a:latin typeface="Courier New" panose="02070309020205020404" pitchFamily="49" charset="0"/>
-                <a:cs typeface="Courier New" panose="02070309020205020404" pitchFamily="49" charset="0"/>
-              </a:rPr>
-              <a:t>:		   </a:t>
-            </a:r>
-            <a:r>
-              <a:rPr lang="en-US" b="1" dirty="0" smtClean="0">
-                <a:latin typeface="Courier New" panose="02070309020205020404" pitchFamily="49" charset="0"/>
-                <a:cs typeface="Courier New" panose="02070309020205020404" pitchFamily="49" charset="0"/>
-              </a:rPr>
-              <a:t>100kΩ</a:t>
-            </a:r>
-            <a:endParaRPr lang="en-US" b="1" dirty="0">
-              <a:latin typeface="Courier New" panose="02070309020205020404" pitchFamily="49" charset="0"/>
-              <a:cs typeface="Courier New" panose="02070309020205020404" pitchFamily="49" charset="0"/>
-            </a:endParaRPr>
-          </a:p>
-          <a:p>
-            <a:r>
-              <a:rPr lang="en-US" b="1" dirty="0" smtClean="0">
-                <a:latin typeface="Courier New" panose="02070309020205020404" pitchFamily="49" charset="0"/>
-                <a:cs typeface="Courier New" panose="02070309020205020404" pitchFamily="49" charset="0"/>
-              </a:rPr>
-              <a:t>R28:	</a:t>
-            </a:r>
-            <a:r>
-              <a:rPr lang="en-US" b="1" dirty="0">
-                <a:latin typeface="Courier New" panose="02070309020205020404" pitchFamily="49" charset="0"/>
-                <a:cs typeface="Courier New" panose="02070309020205020404" pitchFamily="49" charset="0"/>
-              </a:rPr>
-              <a:t>	</a:t>
-            </a:r>
-            <a:r>
-              <a:rPr lang="en-US" b="1" dirty="0" smtClean="0">
-                <a:latin typeface="Courier New" panose="02070309020205020404" pitchFamily="49" charset="0"/>
-                <a:cs typeface="Courier New" panose="02070309020205020404" pitchFamily="49" charset="0"/>
-              </a:rPr>
-              <a:t>   </a:t>
-            </a:r>
-            <a:r>
-              <a:rPr lang="en-US" b="1" dirty="0" smtClean="0">
-                <a:latin typeface="Courier New" panose="02070309020205020404" pitchFamily="49" charset="0"/>
-                <a:cs typeface="Courier New" panose="02070309020205020404" pitchFamily="49" charset="0"/>
-              </a:rPr>
-              <a:t>300Ω</a:t>
-            </a:r>
-            <a:endParaRPr lang="en-US" b="1" dirty="0" smtClean="0">
               <a:latin typeface="Courier New" panose="02070309020205020404" pitchFamily="49" charset="0"/>
               <a:cs typeface="Courier New" panose="02070309020205020404" pitchFamily="49" charset="0"/>
             </a:endParaRPr>

</xml_diff>